<commit_message>
change UI to the desired UI prototype
</commit_message>
<xml_diff>
--- a/docs/diagrams/Diagrams.pptx
+++ b/docs/diagrams/Diagrams.pptx
@@ -115,6 +115,22 @@
       </a:defRPr>
     </a:lvl9pPr>
   </p:defaultTextStyle>
+  <p:extLst>
+    <p:ext uri="{EFAFB233-063F-42B5-8137-9DF3F51BA10A}">
+      <p15:sldGuideLst xmlns:p15="http://schemas.microsoft.com/office/powerpoint/2012/main">
+        <p15:guide id="1" orient="horz" pos="1488">
+          <p15:clr>
+            <a:srgbClr val="A4A3A4"/>
+          </p15:clr>
+        </p15:guide>
+        <p15:guide id="2" pos="2880">
+          <p15:clr>
+            <a:srgbClr val="A4A3A4"/>
+          </p15:clr>
+        </p15:guide>
+      </p15:sldGuideLst>
+    </p:ext>
+  </p:extLst>
 </p:presentation>
 </file>
 
@@ -200,7 +216,7 @@
           <a:p>
             <a:fld id="{F5CC4B3F-88C1-4FFA-B1B6-F41C21DC6924}" type="datetimeFigureOut">
               <a:rPr lang="en-US" smtClean="0"/>
-              <a:t>9/30/2016</a:t>
+              <a:t>10/7/16</a:t>
             </a:fld>
             <a:endParaRPr lang="en-US"/>
           </a:p>
@@ -468,6 +484,90 @@
 </p:notesMaster>
 </file>
 
+<file path=ppt/notesSlides/notesSlide1.xml><?xml version="1.0" encoding="utf-8"?>
+<p:notes xmlns:a="http://schemas.openxmlformats.org/drawingml/2006/main" xmlns:r="http://schemas.openxmlformats.org/officeDocument/2006/relationships" xmlns:p="http://schemas.openxmlformats.org/presentationml/2006/main">
+  <p:cSld>
+    <p:spTree>
+      <p:nvGrpSpPr>
+        <p:cNvPr id="1" name=""/>
+        <p:cNvGrpSpPr/>
+        <p:nvPr/>
+      </p:nvGrpSpPr>
+      <p:grpSpPr>
+        <a:xfrm>
+          <a:off x="0" y="0"/>
+          <a:ext cx="0" cy="0"/>
+          <a:chOff x="0" y="0"/>
+          <a:chExt cx="0" cy="0"/>
+        </a:xfrm>
+      </p:grpSpPr>
+      <p:sp>
+        <p:nvSpPr>
+          <p:cNvPr id="2" name="Slide Image Placeholder 1"/>
+          <p:cNvSpPr>
+            <a:spLocks noGrp="1" noRot="1" noChangeAspect="1"/>
+          </p:cNvSpPr>
+          <p:nvPr>
+            <p:ph type="sldImg"/>
+          </p:nvPr>
+        </p:nvSpPr>
+        <p:spPr/>
+      </p:sp>
+      <p:sp>
+        <p:nvSpPr>
+          <p:cNvPr id="3" name="Notes Placeholder 2"/>
+          <p:cNvSpPr>
+            <a:spLocks noGrp="1"/>
+          </p:cNvSpPr>
+          <p:nvPr>
+            <p:ph type="body" idx="1"/>
+          </p:nvPr>
+        </p:nvSpPr>
+        <p:spPr/>
+        <p:txBody>
+          <a:bodyPr/>
+          <a:lstStyle/>
+          <a:p>
+            <a:endParaRPr lang="en-US" dirty="0"/>
+          </a:p>
+        </p:txBody>
+      </p:sp>
+      <p:sp>
+        <p:nvSpPr>
+          <p:cNvPr id="4" name="Slide Number Placeholder 3"/>
+          <p:cNvSpPr>
+            <a:spLocks noGrp="1"/>
+          </p:cNvSpPr>
+          <p:nvPr>
+            <p:ph type="sldNum" sz="quarter" idx="10"/>
+          </p:nvPr>
+        </p:nvSpPr>
+        <p:spPr/>
+        <p:txBody>
+          <a:bodyPr/>
+          <a:lstStyle/>
+          <a:p>
+            <a:fld id="{5A7AB025-77E3-4BD1-A2FD-B3183DBA47A3}" type="slidenum">
+              <a:rPr lang="en-US" smtClean="0"/>
+              <a:t>4</a:t>
+            </a:fld>
+            <a:endParaRPr lang="en-US"/>
+          </a:p>
+        </p:txBody>
+      </p:sp>
+    </p:spTree>
+    <p:extLst>
+      <p:ext uri="{BB962C8B-B14F-4D97-AF65-F5344CB8AC3E}">
+        <p14:creationId xmlns:p14="http://schemas.microsoft.com/office/powerpoint/2010/main" val="475796926"/>
+      </p:ext>
+    </p:extLst>
+  </p:cSld>
+  <p:clrMapOvr>
+    <a:masterClrMapping/>
+  </p:clrMapOvr>
+</p:notes>
+</file>
+
 <file path=ppt/slideLayouts/slideLayout1.xml><?xml version="1.0" encoding="utf-8"?>
 <p:sldLayout xmlns:a="http://schemas.openxmlformats.org/drawingml/2006/main" xmlns:r="http://schemas.openxmlformats.org/officeDocument/2006/relationships" xmlns:p="http://schemas.openxmlformats.org/presentationml/2006/main" type="title" preserve="1">
   <p:cSld name="Title Slide">
@@ -649,7 +749,7 @@
           <a:p>
             <a:fld id="{78C97017-6FC3-485B-9764-EAC9E56C1D49}" type="datetimeFigureOut">
               <a:rPr lang="en-US" smtClean="0"/>
-              <a:t>9/30/2016</a:t>
+              <a:t>10/7/16</a:t>
             </a:fld>
             <a:endParaRPr lang="en-US"/>
           </a:p>
@@ -819,7 +919,7 @@
           <a:p>
             <a:fld id="{78C97017-6FC3-485B-9764-EAC9E56C1D49}" type="datetimeFigureOut">
               <a:rPr lang="en-US" smtClean="0"/>
-              <a:t>9/30/2016</a:t>
+              <a:t>10/7/16</a:t>
             </a:fld>
             <a:endParaRPr lang="en-US"/>
           </a:p>
@@ -999,7 +1099,7 @@
           <a:p>
             <a:fld id="{78C97017-6FC3-485B-9764-EAC9E56C1D49}" type="datetimeFigureOut">
               <a:rPr lang="en-US" smtClean="0"/>
-              <a:t>9/30/2016</a:t>
+              <a:t>10/7/16</a:t>
             </a:fld>
             <a:endParaRPr lang="en-US"/>
           </a:p>
@@ -1169,7 +1269,7 @@
           <a:p>
             <a:fld id="{78C97017-6FC3-485B-9764-EAC9E56C1D49}" type="datetimeFigureOut">
               <a:rPr lang="en-US" smtClean="0"/>
-              <a:t>9/30/2016</a:t>
+              <a:t>10/7/16</a:t>
             </a:fld>
             <a:endParaRPr lang="en-US"/>
           </a:p>
@@ -1415,7 +1515,7 @@
           <a:p>
             <a:fld id="{78C97017-6FC3-485B-9764-EAC9E56C1D49}" type="datetimeFigureOut">
               <a:rPr lang="en-US" smtClean="0"/>
-              <a:t>9/30/2016</a:t>
+              <a:t>10/7/16</a:t>
             </a:fld>
             <a:endParaRPr lang="en-US"/>
           </a:p>
@@ -1703,7 +1803,7 @@
           <a:p>
             <a:fld id="{78C97017-6FC3-485B-9764-EAC9E56C1D49}" type="datetimeFigureOut">
               <a:rPr lang="en-US" smtClean="0"/>
-              <a:t>9/30/2016</a:t>
+              <a:t>10/7/16</a:t>
             </a:fld>
             <a:endParaRPr lang="en-US"/>
           </a:p>
@@ -2125,7 +2225,7 @@
           <a:p>
             <a:fld id="{78C97017-6FC3-485B-9764-EAC9E56C1D49}" type="datetimeFigureOut">
               <a:rPr lang="en-US" smtClean="0"/>
-              <a:t>9/30/2016</a:t>
+              <a:t>10/7/16</a:t>
             </a:fld>
             <a:endParaRPr lang="en-US"/>
           </a:p>
@@ -2243,7 +2343,7 @@
           <a:p>
             <a:fld id="{78C97017-6FC3-485B-9764-EAC9E56C1D49}" type="datetimeFigureOut">
               <a:rPr lang="en-US" smtClean="0"/>
-              <a:t>9/30/2016</a:t>
+              <a:t>10/7/16</a:t>
             </a:fld>
             <a:endParaRPr lang="en-US"/>
           </a:p>
@@ -2338,7 +2438,7 @@
           <a:p>
             <a:fld id="{78C97017-6FC3-485B-9764-EAC9E56C1D49}" type="datetimeFigureOut">
               <a:rPr lang="en-US" smtClean="0"/>
-              <a:t>9/30/2016</a:t>
+              <a:t>10/7/16</a:t>
             </a:fld>
             <a:endParaRPr lang="en-US"/>
           </a:p>
@@ -2615,7 +2715,7 @@
           <a:p>
             <a:fld id="{78C97017-6FC3-485B-9764-EAC9E56C1D49}" type="datetimeFigureOut">
               <a:rPr lang="en-US" smtClean="0"/>
-              <a:t>9/30/2016</a:t>
+              <a:t>10/7/16</a:t>
             </a:fld>
             <a:endParaRPr lang="en-US"/>
           </a:p>
@@ -2868,7 +2968,7 @@
           <a:p>
             <a:fld id="{78C97017-6FC3-485B-9764-EAC9E56C1D49}" type="datetimeFigureOut">
               <a:rPr lang="en-US" smtClean="0"/>
-              <a:t>9/30/2016</a:t>
+              <a:t>10/7/16</a:t>
             </a:fld>
             <a:endParaRPr lang="en-US"/>
           </a:p>
@@ -3081,7 +3181,7 @@
           <a:p>
             <a:fld id="{78C97017-6FC3-485B-9764-EAC9E56C1D49}" type="datetimeFigureOut">
               <a:rPr lang="en-US" smtClean="0"/>
-              <a:t>9/30/2016</a:t>
+              <a:t>10/7/16</a:t>
             </a:fld>
             <a:endParaRPr lang="en-US"/>
           </a:p>
@@ -7546,8 +7646,8 @@
         </p:nvSpPr>
         <p:spPr>
           <a:xfrm>
-            <a:off x="1217465" y="1447800"/>
-            <a:ext cx="4917083" cy="3962400"/>
+            <a:off x="1371600" y="381000"/>
+            <a:ext cx="4917083" cy="5943600"/>
           </a:xfrm>
           <a:prstGeom prst="roundRect">
             <a:avLst>
@@ -7608,7 +7708,7 @@
         </p:nvSpPr>
         <p:spPr>
           <a:xfrm>
-            <a:off x="2095948" y="2341220"/>
+            <a:off x="2250083" y="1274420"/>
             <a:ext cx="1093635" cy="346760"/>
           </a:xfrm>
           <a:prstGeom prst="rect">
@@ -7668,7 +7768,7 @@
         </p:nvSpPr>
         <p:spPr>
           <a:xfrm>
-            <a:off x="2592528" y="3179160"/>
+            <a:off x="2746663" y="2112360"/>
             <a:ext cx="1093635" cy="236841"/>
           </a:xfrm>
           <a:prstGeom prst="rect">
@@ -7728,7 +7828,7 @@
         </p:nvSpPr>
         <p:spPr>
           <a:xfrm>
-            <a:off x="2092842" y="1770924"/>
+            <a:off x="2246977" y="704124"/>
             <a:ext cx="1093635" cy="346760"/>
           </a:xfrm>
           <a:prstGeom prst="rect">
@@ -7790,7 +7890,7 @@
         </p:nvCxnSpPr>
         <p:spPr>
           <a:xfrm rot="16200000" flipH="1">
-            <a:off x="2529445" y="2227899"/>
+            <a:off x="2683580" y="1161099"/>
             <a:ext cx="223536" cy="3106"/>
           </a:xfrm>
           <a:prstGeom prst="bentConnector3">
@@ -7830,7 +7930,7 @@
         </p:nvSpPr>
         <p:spPr>
           <a:xfrm rot="10800000" flipV="1">
-            <a:off x="5394717" y="2110477"/>
+            <a:off x="5548852" y="1043677"/>
             <a:ext cx="270504" cy="175523"/>
           </a:xfrm>
           <a:prstGeom prst="triangle">
@@ -7878,7 +7978,7 @@
         </p:nvCxnSpPr>
         <p:spPr>
           <a:xfrm flipV="1">
-            <a:off x="644735" y="2991937"/>
+            <a:off x="798870" y="1925137"/>
             <a:ext cx="684904" cy="1"/>
           </a:xfrm>
           <a:prstGeom prst="bentConnector3">
@@ -7921,7 +8021,7 @@
         </p:nvSpPr>
         <p:spPr>
           <a:xfrm rot="16200000">
-            <a:off x="5703829" y="2464877"/>
+            <a:off x="5857964" y="1398077"/>
             <a:ext cx="2362201" cy="328045"/>
           </a:xfrm>
           <a:prstGeom prst="roundRect">
@@ -7981,8 +8081,8 @@
         </p:nvSpPr>
         <p:spPr>
           <a:xfrm>
-            <a:off x="2592528" y="3649359"/>
-            <a:ext cx="1093635" cy="236841"/>
+            <a:off x="2746663" y="2582559"/>
+            <a:ext cx="1167165" cy="257822"/>
           </a:xfrm>
           <a:prstGeom prst="rect">
             <a:avLst/>
@@ -8014,16 +8114,26 @@
           <a:p>
             <a:pPr algn="ctr"/>
             <a:r>
-              <a:rPr lang="en-US" sz="1050" b="1" dirty="0" err="1">
+              <a:rPr lang="en-US" sz="1050" b="1" smtClean="0">
                 <a:solidFill>
                   <a:schemeClr val="accent3">
                     <a:lumMod val="75000"/>
                   </a:schemeClr>
                 </a:solidFill>
               </a:rPr>
-              <a:t>BrowserPanel</a:t>
-            </a:r>
-            <a:endParaRPr lang="en-SG" sz="1050" b="1" dirty="0">
+              <a:t>TimeCategory</a:t>
+            </a:r>
+            <a:r>
+              <a:rPr lang="en-US" altLang="zh-CN" sz="1050" b="1" smtClean="0">
+                <a:solidFill>
+                  <a:schemeClr val="accent3">
+                    <a:lumMod val="75000"/>
+                  </a:schemeClr>
+                </a:solidFill>
+              </a:rPr>
+              <a:t>List</a:t>
+            </a:r>
+            <a:endParaRPr lang="en-US" sz="1050" b="1" dirty="0">
               <a:solidFill>
                 <a:schemeClr val="accent3">
                   <a:lumMod val="75000"/>
@@ -8041,7 +8151,7 @@
         </p:nvSpPr>
         <p:spPr>
           <a:xfrm>
-            <a:off x="2592527" y="4563759"/>
+            <a:off x="2746661" y="5560384"/>
             <a:ext cx="1093635" cy="236841"/>
           </a:xfrm>
           <a:prstGeom prst="rect">
@@ -8101,8 +8211,8 @@
         </p:nvSpPr>
         <p:spPr>
           <a:xfrm>
-            <a:off x="2592526" y="3991960"/>
-            <a:ext cx="1093635" cy="236841"/>
+            <a:off x="2731983" y="3790782"/>
+            <a:ext cx="1179068" cy="200315"/>
           </a:xfrm>
           <a:prstGeom prst="rect">
             <a:avLst/>
@@ -8134,14 +8244,24 @@
           <a:p>
             <a:pPr algn="ctr"/>
             <a:r>
-              <a:rPr lang="en-US" sz="1050" b="1" dirty="0" err="1">
+              <a:rPr lang="en-US" altLang="zh-CN" sz="1050" b="1" dirty="0" err="1" smtClean="0">
                 <a:solidFill>
                   <a:schemeClr val="accent3">
                     <a:lumMod val="75000"/>
                   </a:schemeClr>
                 </a:solidFill>
               </a:rPr>
-              <a:t>PersonListPanel</a:t>
+              <a:t>Task</a:t>
+            </a:r>
+            <a:r>
+              <a:rPr lang="en-US" sz="1050" b="1" dirty="0" err="1" smtClean="0">
+                <a:solidFill>
+                  <a:schemeClr val="accent3">
+                    <a:lumMod val="75000"/>
+                  </a:schemeClr>
+                </a:solidFill>
+              </a:rPr>
+              <a:t>ListPanel</a:t>
             </a:r>
             <a:endParaRPr lang="en-SG" sz="1050" b="1" dirty="0">
               <a:solidFill>
@@ -8161,7 +8281,7 @@
         </p:nvSpPr>
         <p:spPr>
           <a:xfrm>
-            <a:off x="3839323" y="4228801"/>
+            <a:off x="4098920" y="4071902"/>
             <a:ext cx="1040906" cy="236841"/>
           </a:xfrm>
           <a:prstGeom prst="rect">
@@ -8194,14 +8314,14 @@
           <a:p>
             <a:pPr algn="ctr"/>
             <a:r>
-              <a:rPr lang="en-US" sz="1050" b="1" dirty="0" err="1">
+              <a:rPr lang="en-US" altLang="zh-CN" sz="1050" b="1" dirty="0" err="1" smtClean="0">
                 <a:solidFill>
                   <a:schemeClr val="accent3">
                     <a:lumMod val="75000"/>
                   </a:schemeClr>
                 </a:solidFill>
               </a:rPr>
-              <a:t>PersonCard</a:t>
+              <a:t>TaskListHeader</a:t>
             </a:r>
             <a:endParaRPr lang="en-SG" sz="1050" b="1" dirty="0">
               <a:solidFill>
@@ -8221,7 +8341,7 @@
         </p:nvSpPr>
         <p:spPr>
           <a:xfrm>
-            <a:off x="2592528" y="4966000"/>
+            <a:off x="2735092" y="5915646"/>
             <a:ext cx="1093635" cy="236841"/>
           </a:xfrm>
           <a:prstGeom prst="rect">
@@ -8281,7 +8401,7 @@
         </p:nvSpPr>
         <p:spPr>
           <a:xfrm>
-            <a:off x="2324548" y="2706452"/>
+            <a:off x="2478683" y="1639652"/>
             <a:ext cx="183156" cy="161573"/>
           </a:xfrm>
           <a:prstGeom prst="flowChartDecision">
@@ -8332,7 +8452,7 @@
         </p:nvCxnSpPr>
         <p:spPr>
           <a:xfrm rot="16200000" flipH="1">
-            <a:off x="2289549" y="2994602"/>
+            <a:off x="2443684" y="1927802"/>
             <a:ext cx="429556" cy="176402"/>
           </a:xfrm>
           <a:prstGeom prst="bentConnector2">
@@ -8370,7 +8490,7 @@
         </p:nvSpPr>
         <p:spPr>
           <a:xfrm>
-            <a:off x="3759694" y="3416961"/>
+            <a:off x="4066229" y="2350161"/>
             <a:ext cx="1040906" cy="236841"/>
           </a:xfrm>
           <a:prstGeom prst="rect">
@@ -8433,8 +8553,8 @@
         </p:nvCxnSpPr>
         <p:spPr>
           <a:xfrm rot="16200000" flipH="1">
-            <a:off x="2054450" y="3229701"/>
-            <a:ext cx="899755" cy="176402"/>
+            <a:off x="2203340" y="2168146"/>
+            <a:ext cx="910245" cy="176402"/>
           </a:xfrm>
           <a:prstGeom prst="bentConnector2">
             <a:avLst/>
@@ -8474,8 +8594,8 @@
         </p:nvCxnSpPr>
         <p:spPr>
           <a:xfrm rot="16200000" flipH="1">
-            <a:off x="1883148" y="3401003"/>
-            <a:ext cx="1242356" cy="176400"/>
+            <a:off x="1606265" y="2765221"/>
+            <a:ext cx="2089715" cy="161722"/>
           </a:xfrm>
           <a:prstGeom prst="bentConnector2">
             <a:avLst/>
@@ -8515,8 +8635,8 @@
         </p:nvCxnSpPr>
         <p:spPr>
           <a:xfrm rot="16200000" flipH="1">
-            <a:off x="1597249" y="3686901"/>
-            <a:ext cx="1814155" cy="176401"/>
+            <a:off x="719671" y="3651815"/>
+            <a:ext cx="3877580" cy="176400"/>
           </a:xfrm>
           <a:prstGeom prst="bentConnector2">
             <a:avLst/>
@@ -8555,8 +8675,8 @@
         </p:nvCxnSpPr>
         <p:spPr>
           <a:xfrm rot="16200000" flipH="1">
-            <a:off x="1184119" y="3676012"/>
-            <a:ext cx="2396440" cy="420377"/>
+            <a:off x="318240" y="3617215"/>
+            <a:ext cx="4420260" cy="413443"/>
           </a:xfrm>
           <a:prstGeom prst="bentConnector2">
             <a:avLst/>
@@ -8593,7 +8713,7 @@
         </p:nvSpPr>
         <p:spPr>
           <a:xfrm>
-            <a:off x="5143948" y="1770924"/>
+            <a:off x="5298083" y="704124"/>
             <a:ext cx="772043" cy="346760"/>
           </a:xfrm>
           <a:prstGeom prst="rect">
@@ -8675,8 +8795,8 @@
         </p:nvCxnSpPr>
         <p:spPr>
           <a:xfrm flipV="1">
-            <a:off x="4800600" y="2286000"/>
-            <a:ext cx="729369" cy="1249382"/>
+            <a:off x="5107135" y="1219200"/>
+            <a:ext cx="576969" cy="1249382"/>
           </a:xfrm>
           <a:prstGeom prst="bentConnector2">
             <a:avLst/>
@@ -8716,8 +8836,8 @@
         </p:nvCxnSpPr>
         <p:spPr>
           <a:xfrm rot="5400000">
-            <a:off x="4174488" y="2991741"/>
-            <a:ext cx="2061222" cy="649740"/>
+            <a:off x="3926404" y="2432622"/>
+            <a:ext cx="2971123" cy="544278"/>
           </a:xfrm>
           <a:prstGeom prst="bentConnector2">
             <a:avLst/>
@@ -8757,8 +8877,8 @@
         </p:nvCxnSpPr>
         <p:spPr>
           <a:xfrm rot="5400000">
-            <a:off x="3867176" y="2104987"/>
-            <a:ext cx="1481780" cy="1843806"/>
+            <a:off x="4052831" y="1080197"/>
+            <a:ext cx="1492270" cy="1770276"/>
           </a:xfrm>
           <a:prstGeom prst="bentConnector2">
             <a:avLst/>
@@ -8798,7 +8918,7 @@
         </p:nvCxnSpPr>
         <p:spPr>
           <a:xfrm flipV="1">
-            <a:off x="3189583" y="2286000"/>
+            <a:off x="3343718" y="1219200"/>
             <a:ext cx="2340386" cy="228600"/>
           </a:xfrm>
           <a:prstGeom prst="bentConnector2">
@@ -8832,15 +8952,14 @@
         <p:nvCxnSpPr>
           <p:cNvPr id="91" name="Elbow Connector 63"/>
           <p:cNvCxnSpPr>
-            <a:stCxn id="16" idx="3"/>
             <a:endCxn id="35" idx="3"/>
           </p:cNvCxnSpPr>
           <p:nvPr/>
         </p:nvCxnSpPr>
         <p:spPr>
           <a:xfrm rot="5400000">
-            <a:off x="3409976" y="2562187"/>
-            <a:ext cx="2396180" cy="1843807"/>
+            <a:off x="2787528" y="2782228"/>
+            <a:ext cx="3949345" cy="1843808"/>
           </a:xfrm>
           <a:prstGeom prst="bentConnector2">
             <a:avLst/>
@@ -8873,15 +8992,14 @@
         <p:nvCxnSpPr>
           <p:cNvPr id="94" name="Elbow Connector 63"/>
           <p:cNvCxnSpPr>
-            <a:stCxn id="16" idx="3"/>
             <a:endCxn id="38" idx="3"/>
           </p:cNvCxnSpPr>
           <p:nvPr/>
         </p:nvCxnSpPr>
         <p:spPr>
           <a:xfrm rot="5400000">
-            <a:off x="3208856" y="2763307"/>
-            <a:ext cx="2798421" cy="1843806"/>
+            <a:off x="2604111" y="2954075"/>
+            <a:ext cx="4304608" cy="1855376"/>
           </a:xfrm>
           <a:prstGeom prst="bentConnector2">
             <a:avLst/>
@@ -8918,7 +9036,7 @@
         </p:nvSpPr>
         <p:spPr>
           <a:xfrm>
-            <a:off x="3657600" y="1770924"/>
+            <a:off x="3811735" y="704124"/>
             <a:ext cx="1031399" cy="346760"/>
           </a:xfrm>
           <a:prstGeom prst="rect">
@@ -8979,7 +9097,7 @@
         </p:nvCxnSpPr>
         <p:spPr>
           <a:xfrm rot="5400000" flipH="1" flipV="1">
-            <a:off x="4594921" y="-355061"/>
+            <a:off x="4749056" y="-1421861"/>
             <a:ext cx="170724" cy="4081246"/>
           </a:xfrm>
           <a:prstGeom prst="bentConnector2">
@@ -9018,7 +9136,7 @@
         </p:nvCxnSpPr>
         <p:spPr>
           <a:xfrm flipV="1">
-            <a:off x="3198609" y="1944304"/>
+            <a:off x="3352744" y="877504"/>
             <a:ext cx="484448" cy="2308"/>
           </a:xfrm>
           <a:prstGeom prst="straightConnector1">
@@ -9058,7 +9176,7 @@
         </p:nvCxnSpPr>
         <p:spPr>
           <a:xfrm flipV="1">
-            <a:off x="4714456" y="1944304"/>
+            <a:off x="4868591" y="877504"/>
             <a:ext cx="429492" cy="2308"/>
           </a:xfrm>
           <a:prstGeom prst="straightConnector1">
@@ -9097,8 +9215,8 @@
         </p:nvSpPr>
         <p:spPr>
           <a:xfrm rot="16200000">
-            <a:off x="6213739" y="4560376"/>
-            <a:ext cx="1371599" cy="328045"/>
+            <a:off x="5969012" y="4299166"/>
+            <a:ext cx="2194390" cy="328045"/>
           </a:xfrm>
           <a:prstGeom prst="roundRect">
             <a:avLst/>
@@ -9157,7 +9275,7 @@
         </p:nvSpPr>
         <p:spPr>
           <a:xfrm rot="16200000">
-            <a:off x="956202" y="2861202"/>
+            <a:off x="1110337" y="1794402"/>
             <a:ext cx="1093635" cy="346760"/>
           </a:xfrm>
           <a:prstGeom prst="rect">
@@ -9227,7 +9345,7 @@
         </p:nvSpPr>
         <p:spPr>
           <a:xfrm flipV="1">
-            <a:off x="1367767" y="2286001"/>
+            <a:off x="1521902" y="1219201"/>
             <a:ext cx="270504" cy="175523"/>
           </a:xfrm>
           <a:prstGeom prst="triangle">
@@ -9278,7 +9396,7 @@
         </p:nvCxnSpPr>
         <p:spPr>
           <a:xfrm rot="10800000" flipV="1">
-            <a:off x="1503020" y="1944303"/>
+            <a:off x="1657155" y="877503"/>
             <a:ext cx="589823" cy="341697"/>
           </a:xfrm>
           <a:prstGeom prst="bentConnector2">
@@ -9320,8 +9438,8 @@
         </p:nvCxnSpPr>
         <p:spPr>
           <a:xfrm rot="16200000" flipH="1">
-            <a:off x="3389830" y="3165517"/>
-            <a:ext cx="119381" cy="620348"/>
+            <a:off x="3620165" y="2022517"/>
+            <a:ext cx="119381" cy="772748"/>
           </a:xfrm>
           <a:prstGeom prst="bentConnector2">
             <a:avLst/>
@@ -9361,7 +9479,7 @@
         </p:nvCxnSpPr>
         <p:spPr>
           <a:xfrm rot="5400000">
-            <a:off x="4102276" y="1869887"/>
+            <a:off x="4256411" y="803087"/>
             <a:ext cx="1011581" cy="1843806"/>
           </a:xfrm>
           <a:prstGeom prst="bentConnector2">
@@ -9402,8 +9520,8 @@
         </p:nvCxnSpPr>
         <p:spPr>
           <a:xfrm rot="16200000" flipH="1">
-            <a:off x="3430123" y="3938021"/>
-            <a:ext cx="118421" cy="699979"/>
+            <a:off x="3610605" y="3702008"/>
+            <a:ext cx="199226" cy="777403"/>
           </a:xfrm>
           <a:prstGeom prst="bentConnector2">
             <a:avLst/>
@@ -9436,15 +9554,14 @@
         <p:nvCxnSpPr>
           <p:cNvPr id="140" name="Elbow Connector 63"/>
           <p:cNvCxnSpPr>
-            <a:stCxn id="16" idx="3"/>
             <a:endCxn id="36" idx="3"/>
           </p:cNvCxnSpPr>
           <p:nvPr/>
         </p:nvCxnSpPr>
         <p:spPr>
           <a:xfrm rot="5400000">
-            <a:off x="3695875" y="2276286"/>
-            <a:ext cx="1824381" cy="1843808"/>
+            <a:off x="3259763" y="1478002"/>
+            <a:ext cx="3064227" cy="1761649"/>
           </a:xfrm>
           <a:prstGeom prst="bentConnector2">
             <a:avLst/>
@@ -9481,7 +9598,7 @@
         </p:nvSpPr>
         <p:spPr>
           <a:xfrm>
-            <a:off x="5435896" y="2895600"/>
+            <a:off x="5590031" y="1828800"/>
             <a:ext cx="229325" cy="166560"/>
           </a:xfrm>
           <a:prstGeom prst="rect">
@@ -9534,7 +9651,7 @@
         </p:nvSpPr>
         <p:spPr>
           <a:xfrm>
-            <a:off x="3687515" y="2981202"/>
+            <a:off x="3841650" y="1914402"/>
             <a:ext cx="3048000" cy="203200"/>
           </a:xfrm>
           <a:custGeom>
@@ -9616,7 +9733,7 @@
         </p:nvSpPr>
         <p:spPr>
           <a:xfrm>
-            <a:off x="5431573" y="4488138"/>
+            <a:off x="5585708" y="3421338"/>
             <a:ext cx="229325" cy="160062"/>
           </a:xfrm>
           <a:prstGeom prst="rect">
@@ -9669,8 +9786,8 @@
         </p:nvSpPr>
         <p:spPr>
           <a:xfrm flipV="1">
-            <a:off x="4114799" y="4472708"/>
-            <a:ext cx="2642195" cy="101600"/>
+            <a:off x="4452637" y="5190849"/>
+            <a:ext cx="2449545" cy="140901"/>
           </a:xfrm>
           <a:custGeom>
             <a:avLst/>
@@ -9743,6 +9860,711 @@
           </a:p>
         </p:txBody>
       </p:sp>
+      <p:sp>
+        <p:nvSpPr>
+          <p:cNvPr id="71" name="Rectangle 11"/>
+          <p:cNvSpPr/>
+          <p:nvPr/>
+        </p:nvSpPr>
+        <p:spPr>
+          <a:xfrm>
+            <a:off x="4128259" y="2883608"/>
+            <a:ext cx="1040906" cy="236841"/>
+          </a:xfrm>
+          <a:prstGeom prst="rect">
+            <a:avLst/>
+          </a:prstGeom>
+          <a:ln w="19050">
+            <a:solidFill>
+              <a:schemeClr val="accent3"/>
+            </a:solidFill>
+          </a:ln>
+          <a:effectLst/>
+        </p:spPr>
+        <p:style>
+          <a:lnRef idx="1">
+            <a:schemeClr val="accent3"/>
+          </a:lnRef>
+          <a:fillRef idx="2">
+            <a:schemeClr val="accent3"/>
+          </a:fillRef>
+          <a:effectRef idx="1">
+            <a:schemeClr val="accent3"/>
+          </a:effectRef>
+          <a:fontRef idx="minor">
+            <a:schemeClr val="dk1"/>
+          </a:fontRef>
+        </p:style>
+        <p:txBody>
+          <a:bodyPr rtlCol="0" anchor="ctr"/>
+          <a:lstStyle/>
+          <a:p>
+            <a:pPr algn="ctr"/>
+            <a:r>
+              <a:rPr lang="en-US" altLang="zh-CN" sz="1050" b="1" dirty="0" err="1" smtClean="0">
+                <a:solidFill>
+                  <a:schemeClr val="accent3">
+                    <a:lumMod val="75000"/>
+                  </a:schemeClr>
+                </a:solidFill>
+              </a:rPr>
+              <a:t>CategoryCard</a:t>
+            </a:r>
+            <a:endParaRPr lang="en-SG" sz="1050" b="1" dirty="0">
+              <a:solidFill>
+                <a:schemeClr val="accent3">
+                  <a:lumMod val="75000"/>
+                </a:schemeClr>
+              </a:solidFill>
+            </a:endParaRPr>
+          </a:p>
+        </p:txBody>
+      </p:sp>
+      <p:cxnSp>
+        <p:nvCxnSpPr>
+          <p:cNvPr id="72" name="Elbow Connector 71"/>
+          <p:cNvCxnSpPr>
+            <a:stCxn id="34" idx="2"/>
+            <a:endCxn id="71" idx="1"/>
+          </p:cNvCxnSpPr>
+          <p:nvPr/>
+        </p:nvCxnSpPr>
+        <p:spPr>
+          <a:xfrm rot="16200000" flipH="1">
+            <a:off x="3648428" y="2522198"/>
+            <a:ext cx="161648" cy="798013"/>
+          </a:xfrm>
+          <a:prstGeom prst="bentConnector2">
+            <a:avLst/>
+          </a:prstGeom>
+          <a:ln w="19050">
+            <a:solidFill>
+              <a:schemeClr val="accent3"/>
+            </a:solidFill>
+            <a:headEnd type="none" w="med" len="med"/>
+            <a:tailEnd type="arrow" w="med" len="med"/>
+          </a:ln>
+          <a:effectLst/>
+        </p:spPr>
+        <p:style>
+          <a:lnRef idx="1">
+            <a:schemeClr val="accent2"/>
+          </a:lnRef>
+          <a:fillRef idx="2">
+            <a:schemeClr val="accent2"/>
+          </a:fillRef>
+          <a:effectRef idx="1">
+            <a:schemeClr val="accent2"/>
+          </a:effectRef>
+          <a:fontRef idx="minor">
+            <a:schemeClr val="dk1"/>
+          </a:fontRef>
+        </p:style>
+      </p:cxnSp>
+      <p:sp>
+        <p:nvSpPr>
+          <p:cNvPr id="75" name="Rectangle 11"/>
+          <p:cNvSpPr/>
+          <p:nvPr/>
+        </p:nvSpPr>
+        <p:spPr>
+          <a:xfrm>
+            <a:off x="2743886" y="3166984"/>
+            <a:ext cx="1167165" cy="257822"/>
+          </a:xfrm>
+          <a:prstGeom prst="rect">
+            <a:avLst/>
+          </a:prstGeom>
+          <a:ln w="19050">
+            <a:solidFill>
+              <a:schemeClr val="accent3"/>
+            </a:solidFill>
+          </a:ln>
+          <a:effectLst/>
+        </p:spPr>
+        <p:style>
+          <a:lnRef idx="1">
+            <a:schemeClr val="accent3"/>
+          </a:lnRef>
+          <a:fillRef idx="2">
+            <a:schemeClr val="accent3"/>
+          </a:fillRef>
+          <a:effectRef idx="1">
+            <a:schemeClr val="accent3"/>
+          </a:effectRef>
+          <a:fontRef idx="minor">
+            <a:schemeClr val="dk1"/>
+          </a:fontRef>
+        </p:style>
+        <p:txBody>
+          <a:bodyPr rtlCol="0" anchor="ctr"/>
+          <a:lstStyle/>
+          <a:p>
+            <a:pPr algn="ctr"/>
+            <a:r>
+              <a:rPr lang="en-US" sz="1050" b="1" dirty="0" err="1" smtClean="0">
+                <a:solidFill>
+                  <a:schemeClr val="accent3">
+                    <a:lumMod val="75000"/>
+                  </a:schemeClr>
+                </a:solidFill>
+              </a:rPr>
+              <a:t>Category</a:t>
+            </a:r>
+            <a:r>
+              <a:rPr lang="en-US" altLang="zh-CN" sz="1050" b="1" dirty="0" err="1" smtClean="0">
+                <a:solidFill>
+                  <a:schemeClr val="accent3">
+                    <a:lumMod val="75000"/>
+                  </a:schemeClr>
+                </a:solidFill>
+              </a:rPr>
+              <a:t>List</a:t>
+            </a:r>
+            <a:endParaRPr lang="en-US" sz="1050" b="1" dirty="0">
+              <a:solidFill>
+                <a:schemeClr val="accent3">
+                  <a:lumMod val="75000"/>
+                </a:schemeClr>
+              </a:solidFill>
+            </a:endParaRPr>
+          </a:p>
+        </p:txBody>
+      </p:sp>
+      <p:cxnSp>
+        <p:nvCxnSpPr>
+          <p:cNvPr id="78" name="Elbow Connector 63"/>
+          <p:cNvCxnSpPr>
+            <a:stCxn id="39" idx="2"/>
+            <a:endCxn id="75" idx="1"/>
+          </p:cNvCxnSpPr>
+          <p:nvPr/>
+        </p:nvCxnSpPr>
+        <p:spPr>
+          <a:xfrm rot="16200000" flipH="1">
+            <a:off x="1909738" y="2461747"/>
+            <a:ext cx="1494670" cy="173625"/>
+          </a:xfrm>
+          <a:prstGeom prst="bentConnector2">
+            <a:avLst/>
+          </a:prstGeom>
+          <a:ln w="19050">
+            <a:solidFill>
+              <a:schemeClr val="accent3"/>
+            </a:solidFill>
+            <a:headEnd type="none" w="med" len="med"/>
+            <a:tailEnd type="arrow" w="med" len="med"/>
+          </a:ln>
+          <a:effectLst/>
+        </p:spPr>
+        <p:style>
+          <a:lnRef idx="1">
+            <a:schemeClr val="accent2"/>
+          </a:lnRef>
+          <a:fillRef idx="2">
+            <a:schemeClr val="accent2"/>
+          </a:fillRef>
+          <a:effectRef idx="1">
+            <a:schemeClr val="accent2"/>
+          </a:effectRef>
+          <a:fontRef idx="minor">
+            <a:schemeClr val="dk1"/>
+          </a:fontRef>
+        </p:style>
+      </p:cxnSp>
+      <p:cxnSp>
+        <p:nvCxnSpPr>
+          <p:cNvPr id="85" name="Elbow Connector 63"/>
+          <p:cNvCxnSpPr>
+            <a:stCxn id="16" idx="3"/>
+            <a:endCxn id="71" idx="3"/>
+          </p:cNvCxnSpPr>
+          <p:nvPr/>
+        </p:nvCxnSpPr>
+        <p:spPr>
+          <a:xfrm rot="5400000">
+            <a:off x="4535221" y="1853145"/>
+            <a:ext cx="1782829" cy="514939"/>
+          </a:xfrm>
+          <a:prstGeom prst="bentConnector2">
+            <a:avLst/>
+          </a:prstGeom>
+          <a:ln w="6350">
+            <a:solidFill>
+              <a:schemeClr val="accent3"/>
+            </a:solidFill>
+            <a:headEnd type="none" w="med" len="med"/>
+            <a:tailEnd type="none" w="med" len="med"/>
+          </a:ln>
+          <a:effectLst/>
+        </p:spPr>
+        <p:style>
+          <a:lnRef idx="1">
+            <a:schemeClr val="accent2"/>
+          </a:lnRef>
+          <a:fillRef idx="2">
+            <a:schemeClr val="accent2"/>
+          </a:fillRef>
+          <a:effectRef idx="1">
+            <a:schemeClr val="accent2"/>
+          </a:effectRef>
+          <a:fontRef idx="minor">
+            <a:schemeClr val="dk1"/>
+          </a:fontRef>
+        </p:style>
+      </p:cxnSp>
+      <p:cxnSp>
+        <p:nvCxnSpPr>
+          <p:cNvPr id="89" name="Elbow Connector 88"/>
+          <p:cNvCxnSpPr>
+            <a:stCxn id="75" idx="3"/>
+            <a:endCxn id="71" idx="2"/>
+          </p:cNvCxnSpPr>
+          <p:nvPr/>
+        </p:nvCxnSpPr>
+        <p:spPr>
+          <a:xfrm flipV="1">
+            <a:off x="3911051" y="3120449"/>
+            <a:ext cx="737661" cy="175446"/>
+          </a:xfrm>
+          <a:prstGeom prst="bentConnector2">
+            <a:avLst/>
+          </a:prstGeom>
+          <a:ln w="19050">
+            <a:solidFill>
+              <a:schemeClr val="accent3"/>
+            </a:solidFill>
+            <a:headEnd type="none" w="med" len="med"/>
+            <a:tailEnd type="arrow" w="med" len="med"/>
+          </a:ln>
+          <a:effectLst/>
+        </p:spPr>
+        <p:style>
+          <a:lnRef idx="1">
+            <a:schemeClr val="accent2"/>
+          </a:lnRef>
+          <a:fillRef idx="2">
+            <a:schemeClr val="accent2"/>
+          </a:fillRef>
+          <a:effectRef idx="1">
+            <a:schemeClr val="accent2"/>
+          </a:effectRef>
+          <a:fontRef idx="minor">
+            <a:schemeClr val="dk1"/>
+          </a:fontRef>
+        </p:style>
+      </p:cxnSp>
+      <p:sp>
+        <p:nvSpPr>
+          <p:cNvPr id="92" name="Freeform 91"/>
+          <p:cNvSpPr/>
+          <p:nvPr/>
+        </p:nvSpPr>
+        <p:spPr>
+          <a:xfrm flipV="1">
+            <a:off x="4834419" y="3123074"/>
+            <a:ext cx="2055232" cy="412852"/>
+          </a:xfrm>
+          <a:custGeom>
+            <a:avLst/>
+            <a:gdLst>
+              <a:gd name="connsiteX0" fmla="*/ 0 w 3048000"/>
+              <a:gd name="connsiteY0" fmla="*/ 203200 h 203200"/>
+              <a:gd name="connsiteX1" fmla="*/ 221673 w 3048000"/>
+              <a:gd name="connsiteY1" fmla="*/ 0 h 203200"/>
+              <a:gd name="connsiteX2" fmla="*/ 3048000 w 3048000"/>
+              <a:gd name="connsiteY2" fmla="*/ 0 h 203200"/>
+            </a:gdLst>
+            <a:ahLst/>
+            <a:cxnLst>
+              <a:cxn ang="0">
+                <a:pos x="connsiteX0" y="connsiteY0"/>
+              </a:cxn>
+              <a:cxn ang="0">
+                <a:pos x="connsiteX1" y="connsiteY1"/>
+              </a:cxn>
+              <a:cxn ang="0">
+                <a:pos x="connsiteX2" y="connsiteY2"/>
+              </a:cxn>
+            </a:cxnLst>
+            <a:rect l="l" t="t" r="r" b="b"/>
+            <a:pathLst>
+              <a:path w="3048000" h="203200">
+                <a:moveTo>
+                  <a:pt x="0" y="203200"/>
+                </a:moveTo>
+                <a:lnTo>
+                  <a:pt x="221673" y="0"/>
+                </a:lnTo>
+                <a:lnTo>
+                  <a:pt x="3048000" y="0"/>
+                </a:lnTo>
+              </a:path>
+            </a:pathLst>
+          </a:custGeom>
+          <a:noFill/>
+          <a:ln w="19050">
+            <a:solidFill>
+              <a:schemeClr val="accent3"/>
+            </a:solidFill>
+            <a:prstDash val="sysDot"/>
+            <a:headEnd type="none" w="med" len="med"/>
+            <a:tailEnd type="arrow" w="med" len="med"/>
+          </a:ln>
+          <a:effectLst/>
+        </p:spPr>
+        <p:style>
+          <a:lnRef idx="1">
+            <a:schemeClr val="accent2"/>
+          </a:lnRef>
+          <a:fillRef idx="2">
+            <a:schemeClr val="accent2"/>
+          </a:fillRef>
+          <a:effectRef idx="1">
+            <a:schemeClr val="accent2"/>
+          </a:effectRef>
+          <a:fontRef idx="minor">
+            <a:schemeClr val="dk1"/>
+          </a:fontRef>
+        </p:style>
+        <p:txBody>
+          <a:bodyPr rtlCol="0" anchor="ctr"/>
+          <a:lstStyle/>
+          <a:p>
+            <a:pPr algn="ctr"/>
+            <a:endParaRPr lang="en-SG"/>
+          </a:p>
+        </p:txBody>
+      </p:sp>
+      <p:sp>
+        <p:nvSpPr>
+          <p:cNvPr id="108" name="Rectangle 11"/>
+          <p:cNvSpPr/>
+          <p:nvPr/>
+        </p:nvSpPr>
+        <p:spPr>
+          <a:xfrm>
+            <a:off x="3592712" y="4567971"/>
+            <a:ext cx="1199164" cy="218575"/>
+          </a:xfrm>
+          <a:prstGeom prst="rect">
+            <a:avLst/>
+          </a:prstGeom>
+          <a:ln w="19050">
+            <a:solidFill>
+              <a:schemeClr val="accent3"/>
+            </a:solidFill>
+          </a:ln>
+          <a:effectLst/>
+        </p:spPr>
+        <p:style>
+          <a:lnRef idx="1">
+            <a:schemeClr val="accent3"/>
+          </a:lnRef>
+          <a:fillRef idx="2">
+            <a:schemeClr val="accent3"/>
+          </a:fillRef>
+          <a:effectRef idx="1">
+            <a:schemeClr val="accent3"/>
+          </a:effectRef>
+          <a:fontRef idx="minor">
+            <a:schemeClr val="dk1"/>
+          </a:fontRef>
+        </p:style>
+        <p:txBody>
+          <a:bodyPr rtlCol="0" anchor="ctr"/>
+          <a:lstStyle/>
+          <a:p>
+            <a:pPr algn="ctr"/>
+            <a:r>
+              <a:rPr lang="en-US" altLang="zh-CN" sz="1050" b="1" dirty="0" err="1" smtClean="0">
+                <a:solidFill>
+                  <a:schemeClr val="accent3">
+                    <a:lumMod val="75000"/>
+                  </a:schemeClr>
+                </a:solidFill>
+              </a:rPr>
+              <a:t>TaskListSection</a:t>
+            </a:r>
+            <a:endParaRPr lang="en-SG" sz="1050" b="1" dirty="0">
+              <a:solidFill>
+                <a:schemeClr val="accent3">
+                  <a:lumMod val="75000"/>
+                </a:schemeClr>
+              </a:solidFill>
+            </a:endParaRPr>
+          </a:p>
+        </p:txBody>
+      </p:sp>
+      <p:cxnSp>
+        <p:nvCxnSpPr>
+          <p:cNvPr id="109" name="Elbow Connector 108"/>
+          <p:cNvCxnSpPr>
+            <a:stCxn id="36" idx="2"/>
+            <a:endCxn id="108" idx="1"/>
+          </p:cNvCxnSpPr>
+          <p:nvPr/>
+        </p:nvCxnSpPr>
+        <p:spPr>
+          <a:xfrm rot="16200000" flipH="1">
+            <a:off x="3114033" y="4198580"/>
+            <a:ext cx="686162" cy="271195"/>
+          </a:xfrm>
+          <a:prstGeom prst="bentConnector2">
+            <a:avLst/>
+          </a:prstGeom>
+          <a:ln w="19050">
+            <a:solidFill>
+              <a:schemeClr val="accent3"/>
+            </a:solidFill>
+            <a:headEnd type="none" w="med" len="med"/>
+            <a:tailEnd type="arrow" w="med" len="med"/>
+          </a:ln>
+          <a:effectLst/>
+        </p:spPr>
+        <p:style>
+          <a:lnRef idx="1">
+            <a:schemeClr val="accent2"/>
+          </a:lnRef>
+          <a:fillRef idx="2">
+            <a:schemeClr val="accent2"/>
+          </a:fillRef>
+          <a:effectRef idx="1">
+            <a:schemeClr val="accent2"/>
+          </a:effectRef>
+          <a:fontRef idx="minor">
+            <a:schemeClr val="dk1"/>
+          </a:fontRef>
+        </p:style>
+      </p:cxnSp>
+      <p:cxnSp>
+        <p:nvCxnSpPr>
+          <p:cNvPr id="113" name="Elbow Connector 63"/>
+          <p:cNvCxnSpPr>
+            <a:stCxn id="16" idx="3"/>
+            <a:endCxn id="108" idx="3"/>
+          </p:cNvCxnSpPr>
+          <p:nvPr/>
+        </p:nvCxnSpPr>
+        <p:spPr>
+          <a:xfrm rot="5400000">
+            <a:off x="3508961" y="2502115"/>
+            <a:ext cx="3458059" cy="892228"/>
+          </a:xfrm>
+          <a:prstGeom prst="bentConnector2">
+            <a:avLst/>
+          </a:prstGeom>
+          <a:ln w="6350">
+            <a:solidFill>
+              <a:schemeClr val="accent3"/>
+            </a:solidFill>
+            <a:headEnd type="none" w="med" len="med"/>
+            <a:tailEnd type="none" w="med" len="med"/>
+          </a:ln>
+          <a:effectLst/>
+        </p:spPr>
+        <p:style>
+          <a:lnRef idx="1">
+            <a:schemeClr val="accent2"/>
+          </a:lnRef>
+          <a:fillRef idx="2">
+            <a:schemeClr val="accent2"/>
+          </a:fillRef>
+          <a:effectRef idx="1">
+            <a:schemeClr val="accent2"/>
+          </a:effectRef>
+          <a:fontRef idx="minor">
+            <a:schemeClr val="dk1"/>
+          </a:fontRef>
+        </p:style>
+      </p:cxnSp>
+      <p:cxnSp>
+        <p:nvCxnSpPr>
+          <p:cNvPr id="122" name="Elbow Connector 121"/>
+          <p:cNvCxnSpPr>
+            <a:stCxn id="108" idx="0"/>
+            <a:endCxn id="37" idx="2"/>
+          </p:cNvCxnSpPr>
+          <p:nvPr/>
+        </p:nvCxnSpPr>
+        <p:spPr>
+          <a:xfrm rot="5400000" flipH="1" flipV="1">
+            <a:off x="4276219" y="4224818"/>
+            <a:ext cx="259228" cy="427079"/>
+          </a:xfrm>
+          <a:prstGeom prst="bentConnector3">
+            <a:avLst>
+              <a:gd name="adj1" fmla="val -848"/>
+            </a:avLst>
+          </a:prstGeom>
+          <a:ln w="19050">
+            <a:solidFill>
+              <a:schemeClr val="accent3"/>
+            </a:solidFill>
+            <a:headEnd type="none" w="med" len="med"/>
+            <a:tailEnd type="arrow" w="med" len="med"/>
+          </a:ln>
+          <a:effectLst/>
+        </p:spPr>
+        <p:style>
+          <a:lnRef idx="1">
+            <a:schemeClr val="accent2"/>
+          </a:lnRef>
+          <a:fillRef idx="2">
+            <a:schemeClr val="accent2"/>
+          </a:fillRef>
+          <a:effectRef idx="1">
+            <a:schemeClr val="accent2"/>
+          </a:effectRef>
+          <a:fontRef idx="minor">
+            <a:schemeClr val="dk1"/>
+          </a:fontRef>
+        </p:style>
+      </p:cxnSp>
+      <p:sp>
+        <p:nvSpPr>
+          <p:cNvPr id="134" name="Rectangle 11"/>
+          <p:cNvSpPr/>
+          <p:nvPr/>
+        </p:nvSpPr>
+        <p:spPr>
+          <a:xfrm>
+            <a:off x="3970001" y="5016647"/>
+            <a:ext cx="864418" cy="178438"/>
+          </a:xfrm>
+          <a:prstGeom prst="rect">
+            <a:avLst/>
+          </a:prstGeom>
+          <a:ln w="19050">
+            <a:solidFill>
+              <a:schemeClr val="accent3"/>
+            </a:solidFill>
+          </a:ln>
+          <a:effectLst/>
+        </p:spPr>
+        <p:style>
+          <a:lnRef idx="1">
+            <a:schemeClr val="accent3"/>
+          </a:lnRef>
+          <a:fillRef idx="2">
+            <a:schemeClr val="accent3"/>
+          </a:fillRef>
+          <a:effectRef idx="1">
+            <a:schemeClr val="accent3"/>
+          </a:effectRef>
+          <a:fontRef idx="minor">
+            <a:schemeClr val="dk1"/>
+          </a:fontRef>
+        </p:style>
+        <p:txBody>
+          <a:bodyPr rtlCol="0" anchor="ctr"/>
+          <a:lstStyle/>
+          <a:p>
+            <a:pPr algn="ctr"/>
+            <a:r>
+              <a:rPr lang="en-US" altLang="zh-CN" sz="1050" b="1" smtClean="0">
+                <a:solidFill>
+                  <a:schemeClr val="accent3">
+                    <a:lumMod val="75000"/>
+                  </a:schemeClr>
+                </a:solidFill>
+              </a:rPr>
+              <a:t>TaskCard</a:t>
+            </a:r>
+            <a:endParaRPr lang="en-SG" sz="1050" b="1" dirty="0">
+              <a:solidFill>
+                <a:schemeClr val="accent3">
+                  <a:lumMod val="75000"/>
+                </a:schemeClr>
+              </a:solidFill>
+            </a:endParaRPr>
+          </a:p>
+        </p:txBody>
+      </p:sp>
+      <p:cxnSp>
+        <p:nvCxnSpPr>
+          <p:cNvPr id="135" name="Elbow Connector 134"/>
+          <p:cNvCxnSpPr>
+            <a:stCxn id="108" idx="2"/>
+            <a:endCxn id="134" idx="1"/>
+          </p:cNvCxnSpPr>
+          <p:nvPr/>
+        </p:nvCxnSpPr>
+        <p:spPr>
+          <a:xfrm rot="5400000">
+            <a:off x="3921488" y="4835060"/>
+            <a:ext cx="319320" cy="222293"/>
+          </a:xfrm>
+          <a:prstGeom prst="bentConnector4">
+            <a:avLst>
+              <a:gd name="adj1" fmla="val 1108"/>
+              <a:gd name="adj2" fmla="val 202837"/>
+            </a:avLst>
+          </a:prstGeom>
+          <a:ln w="19050">
+            <a:solidFill>
+              <a:schemeClr val="accent3"/>
+            </a:solidFill>
+            <a:headEnd type="none" w="med" len="med"/>
+            <a:tailEnd type="arrow" w="med" len="med"/>
+          </a:ln>
+          <a:effectLst/>
+        </p:spPr>
+        <p:style>
+          <a:lnRef idx="1">
+            <a:schemeClr val="accent2"/>
+          </a:lnRef>
+          <a:fillRef idx="2">
+            <a:schemeClr val="accent2"/>
+          </a:fillRef>
+          <a:effectRef idx="1">
+            <a:schemeClr val="accent2"/>
+          </a:effectRef>
+          <a:fontRef idx="minor">
+            <a:schemeClr val="dk1"/>
+          </a:fontRef>
+        </p:style>
+      </p:cxnSp>
+      <p:cxnSp>
+        <p:nvCxnSpPr>
+          <p:cNvPr id="145" name="Elbow Connector 63"/>
+          <p:cNvCxnSpPr>
+            <a:endCxn id="134" idx="3"/>
+          </p:cNvCxnSpPr>
+          <p:nvPr/>
+        </p:nvCxnSpPr>
+        <p:spPr>
+          <a:xfrm rot="5400000">
+            <a:off x="3333164" y="2769105"/>
+            <a:ext cx="3838017" cy="835505"/>
+          </a:xfrm>
+          <a:prstGeom prst="bentConnector2">
+            <a:avLst/>
+          </a:prstGeom>
+          <a:ln w="6350">
+            <a:solidFill>
+              <a:schemeClr val="accent3"/>
+            </a:solidFill>
+            <a:headEnd type="none" w="med" len="med"/>
+            <a:tailEnd type="none" w="med" len="med"/>
+          </a:ln>
+          <a:effectLst/>
+        </p:spPr>
+        <p:style>
+          <a:lnRef idx="1">
+            <a:schemeClr val="accent2"/>
+          </a:lnRef>
+          <a:fillRef idx="2">
+            <a:schemeClr val="accent2"/>
+          </a:fillRef>
+          <a:effectRef idx="1">
+            <a:schemeClr val="accent2"/>
+          </a:effectRef>
+          <a:fontRef idx="minor">
+            <a:schemeClr val="dk1"/>
+          </a:fontRef>
+        </p:style>
+      </p:cxnSp>
     </p:spTree>
     <p:extLst>
       <p:ext uri="{BB962C8B-B14F-4D97-AF65-F5344CB8AC3E}">
@@ -12280,7 +13102,6 @@
               <a:rPr lang="en-US" dirty="0"/>
               <a:t>execute()</a:t>
             </a:r>
-            <a:endParaRPr lang="en-US" dirty="0"/>
           </a:p>
         </p:txBody>
       </p:sp>

</xml_diff>

<commit_message>
Spot an error in the documentation and remedied it already; from person to task
</commit_message>
<xml_diff>
--- a/docs/diagrams/Diagrams.pptx
+++ b/docs/diagrams/Diagrams.pptx
@@ -216,7 +216,7 @@
           <a:p>
             <a:fld id="{F5CC4B3F-88C1-4FFA-B1B6-F41C21DC6924}" type="datetimeFigureOut">
               <a:rPr lang="en-US" smtClean="0"/>
-              <a:t>10/7/16</a:t>
+              <a:t>11/2/2016</a:t>
             </a:fld>
             <a:endParaRPr lang="en-US"/>
           </a:p>
@@ -280,38 +280,37 @@
           <a:p>
             <a:pPr lvl="0"/>
             <a:r>
-              <a:rPr lang="en-US" smtClean="0"/>
+              <a:rPr lang="en-US"/>
               <a:t>Click to edit Master text styles</a:t>
             </a:r>
           </a:p>
           <a:p>
             <a:pPr lvl="1"/>
             <a:r>
-              <a:rPr lang="en-US" smtClean="0"/>
+              <a:rPr lang="en-US"/>
               <a:t>Second level</a:t>
             </a:r>
           </a:p>
           <a:p>
             <a:pPr lvl="2"/>
             <a:r>
-              <a:rPr lang="en-US" smtClean="0"/>
+              <a:rPr lang="en-US"/>
               <a:t>Third level</a:t>
             </a:r>
           </a:p>
           <a:p>
             <a:pPr lvl="3"/>
             <a:r>
-              <a:rPr lang="en-US" smtClean="0"/>
+              <a:rPr lang="en-US"/>
               <a:t>Fourth level</a:t>
             </a:r>
           </a:p>
           <a:p>
             <a:pPr lvl="4"/>
             <a:r>
-              <a:rPr lang="en-US" smtClean="0"/>
+              <a:rPr lang="en-US"/>
               <a:t>Fifth level</a:t>
             </a:r>
-            <a:endParaRPr lang="en-US"/>
           </a:p>
         </p:txBody>
       </p:sp>
@@ -606,10 +605,9 @@
           <a:lstStyle/>
           <a:p>
             <a:r>
-              <a:rPr lang="en-US" smtClean="0"/>
+              <a:rPr lang="en-US"/>
               <a:t>Click to edit Master title style</a:t>
             </a:r>
-            <a:endParaRPr lang="en-US"/>
           </a:p>
         </p:txBody>
       </p:sp>
@@ -725,10 +723,9 @@
           </a:lstStyle>
           <a:p>
             <a:r>
-              <a:rPr lang="en-US" smtClean="0"/>
+              <a:rPr lang="en-US"/>
               <a:t>Click to edit Master subtitle style</a:t>
             </a:r>
-            <a:endParaRPr lang="en-US"/>
           </a:p>
         </p:txBody>
       </p:sp>
@@ -749,7 +746,7 @@
           <a:p>
             <a:fld id="{78C97017-6FC3-485B-9764-EAC9E56C1D49}" type="datetimeFigureOut">
               <a:rPr lang="en-US" smtClean="0"/>
-              <a:t>10/7/16</a:t>
+              <a:t>11/2/2016</a:t>
             </a:fld>
             <a:endParaRPr lang="en-US"/>
           </a:p>
@@ -843,10 +840,9 @@
           <a:lstStyle/>
           <a:p>
             <a:r>
-              <a:rPr lang="en-US" smtClean="0"/>
+              <a:rPr lang="en-US"/>
               <a:t>Click to edit Master title style</a:t>
             </a:r>
-            <a:endParaRPr lang="en-US"/>
           </a:p>
         </p:txBody>
       </p:sp>
@@ -867,38 +863,37 @@
           <a:p>
             <a:pPr lvl="0"/>
             <a:r>
-              <a:rPr lang="en-US" smtClean="0"/>
+              <a:rPr lang="en-US"/>
               <a:t>Click to edit Master text styles</a:t>
             </a:r>
           </a:p>
           <a:p>
             <a:pPr lvl="1"/>
             <a:r>
-              <a:rPr lang="en-US" smtClean="0"/>
+              <a:rPr lang="en-US"/>
               <a:t>Second level</a:t>
             </a:r>
           </a:p>
           <a:p>
             <a:pPr lvl="2"/>
             <a:r>
-              <a:rPr lang="en-US" smtClean="0"/>
+              <a:rPr lang="en-US"/>
               <a:t>Third level</a:t>
             </a:r>
           </a:p>
           <a:p>
             <a:pPr lvl="3"/>
             <a:r>
-              <a:rPr lang="en-US" smtClean="0"/>
+              <a:rPr lang="en-US"/>
               <a:t>Fourth level</a:t>
             </a:r>
           </a:p>
           <a:p>
             <a:pPr lvl="4"/>
             <a:r>
-              <a:rPr lang="en-US" smtClean="0"/>
+              <a:rPr lang="en-US"/>
               <a:t>Fifth level</a:t>
             </a:r>
-            <a:endParaRPr lang="en-US"/>
           </a:p>
         </p:txBody>
       </p:sp>
@@ -919,7 +914,7 @@
           <a:p>
             <a:fld id="{78C97017-6FC3-485B-9764-EAC9E56C1D49}" type="datetimeFigureOut">
               <a:rPr lang="en-US" smtClean="0"/>
-              <a:t>10/7/16</a:t>
+              <a:t>11/2/2016</a:t>
             </a:fld>
             <a:endParaRPr lang="en-US"/>
           </a:p>
@@ -1018,10 +1013,9 @@
           <a:lstStyle/>
           <a:p>
             <a:r>
-              <a:rPr lang="en-US" smtClean="0"/>
+              <a:rPr lang="en-US"/>
               <a:t>Click to edit Master title style</a:t>
             </a:r>
-            <a:endParaRPr lang="en-US"/>
           </a:p>
         </p:txBody>
       </p:sp>
@@ -1047,38 +1041,37 @@
           <a:p>
             <a:pPr lvl="0"/>
             <a:r>
-              <a:rPr lang="en-US" smtClean="0"/>
+              <a:rPr lang="en-US"/>
               <a:t>Click to edit Master text styles</a:t>
             </a:r>
           </a:p>
           <a:p>
             <a:pPr lvl="1"/>
             <a:r>
-              <a:rPr lang="en-US" smtClean="0"/>
+              <a:rPr lang="en-US"/>
               <a:t>Second level</a:t>
             </a:r>
           </a:p>
           <a:p>
             <a:pPr lvl="2"/>
             <a:r>
-              <a:rPr lang="en-US" smtClean="0"/>
+              <a:rPr lang="en-US"/>
               <a:t>Third level</a:t>
             </a:r>
           </a:p>
           <a:p>
             <a:pPr lvl="3"/>
             <a:r>
-              <a:rPr lang="en-US" smtClean="0"/>
+              <a:rPr lang="en-US"/>
               <a:t>Fourth level</a:t>
             </a:r>
           </a:p>
           <a:p>
             <a:pPr lvl="4"/>
             <a:r>
-              <a:rPr lang="en-US" smtClean="0"/>
+              <a:rPr lang="en-US"/>
               <a:t>Fifth level</a:t>
             </a:r>
-            <a:endParaRPr lang="en-US"/>
           </a:p>
         </p:txBody>
       </p:sp>
@@ -1099,7 +1092,7 @@
           <a:p>
             <a:fld id="{78C97017-6FC3-485B-9764-EAC9E56C1D49}" type="datetimeFigureOut">
               <a:rPr lang="en-US" smtClean="0"/>
-              <a:t>10/7/16</a:t>
+              <a:t>11/2/2016</a:t>
             </a:fld>
             <a:endParaRPr lang="en-US"/>
           </a:p>
@@ -1193,10 +1186,9 @@
           <a:lstStyle/>
           <a:p>
             <a:r>
-              <a:rPr lang="en-US" smtClean="0"/>
+              <a:rPr lang="en-US"/>
               <a:t>Click to edit Master title style</a:t>
             </a:r>
-            <a:endParaRPr lang="en-US"/>
           </a:p>
         </p:txBody>
       </p:sp>
@@ -1217,38 +1209,37 @@
           <a:p>
             <a:pPr lvl="0"/>
             <a:r>
-              <a:rPr lang="en-US" smtClean="0"/>
+              <a:rPr lang="en-US"/>
               <a:t>Click to edit Master text styles</a:t>
             </a:r>
           </a:p>
           <a:p>
             <a:pPr lvl="1"/>
             <a:r>
-              <a:rPr lang="en-US" smtClean="0"/>
+              <a:rPr lang="en-US"/>
               <a:t>Second level</a:t>
             </a:r>
           </a:p>
           <a:p>
             <a:pPr lvl="2"/>
             <a:r>
-              <a:rPr lang="en-US" smtClean="0"/>
+              <a:rPr lang="en-US"/>
               <a:t>Third level</a:t>
             </a:r>
           </a:p>
           <a:p>
             <a:pPr lvl="3"/>
             <a:r>
-              <a:rPr lang="en-US" smtClean="0"/>
+              <a:rPr lang="en-US"/>
               <a:t>Fourth level</a:t>
             </a:r>
           </a:p>
           <a:p>
             <a:pPr lvl="4"/>
             <a:r>
-              <a:rPr lang="en-US" smtClean="0"/>
+              <a:rPr lang="en-US"/>
               <a:t>Fifth level</a:t>
             </a:r>
-            <a:endParaRPr lang="en-US"/>
           </a:p>
         </p:txBody>
       </p:sp>
@@ -1269,7 +1260,7 @@
           <a:p>
             <a:fld id="{78C97017-6FC3-485B-9764-EAC9E56C1D49}" type="datetimeFigureOut">
               <a:rPr lang="en-US" smtClean="0"/>
-              <a:t>10/7/16</a:t>
+              <a:t>11/2/2016</a:t>
             </a:fld>
             <a:endParaRPr lang="en-US"/>
           </a:p>
@@ -1372,10 +1363,9 @@
           </a:lstStyle>
           <a:p>
             <a:r>
-              <a:rPr lang="en-US" smtClean="0"/>
+              <a:rPr lang="en-US"/>
               <a:t>Click to edit Master title style</a:t>
             </a:r>
-            <a:endParaRPr lang="en-US"/>
           </a:p>
         </p:txBody>
       </p:sp>
@@ -1492,7 +1482,7 @@
           <a:p>
             <a:pPr lvl="0"/>
             <a:r>
-              <a:rPr lang="en-US" smtClean="0"/>
+              <a:rPr lang="en-US"/>
               <a:t>Click to edit Master text styles</a:t>
             </a:r>
           </a:p>
@@ -1515,7 +1505,7 @@
           <a:p>
             <a:fld id="{78C97017-6FC3-485B-9764-EAC9E56C1D49}" type="datetimeFigureOut">
               <a:rPr lang="en-US" smtClean="0"/>
-              <a:t>10/7/16</a:t>
+              <a:t>11/2/2016</a:t>
             </a:fld>
             <a:endParaRPr lang="en-US"/>
           </a:p>
@@ -1609,10 +1599,9 @@
           <a:lstStyle/>
           <a:p>
             <a:r>
-              <a:rPr lang="en-US" smtClean="0"/>
+              <a:rPr lang="en-US"/>
               <a:t>Click to edit Master title style</a:t>
             </a:r>
-            <a:endParaRPr lang="en-US"/>
           </a:p>
         </p:txBody>
       </p:sp>
@@ -1666,38 +1655,37 @@
           <a:p>
             <a:pPr lvl="0"/>
             <a:r>
-              <a:rPr lang="en-US" smtClean="0"/>
+              <a:rPr lang="en-US"/>
               <a:t>Click to edit Master text styles</a:t>
             </a:r>
           </a:p>
           <a:p>
             <a:pPr lvl="1"/>
             <a:r>
-              <a:rPr lang="en-US" smtClean="0"/>
+              <a:rPr lang="en-US"/>
               <a:t>Second level</a:t>
             </a:r>
           </a:p>
           <a:p>
             <a:pPr lvl="2"/>
             <a:r>
-              <a:rPr lang="en-US" smtClean="0"/>
+              <a:rPr lang="en-US"/>
               <a:t>Third level</a:t>
             </a:r>
           </a:p>
           <a:p>
             <a:pPr lvl="3"/>
             <a:r>
-              <a:rPr lang="en-US" smtClean="0"/>
+              <a:rPr lang="en-US"/>
               <a:t>Fourth level</a:t>
             </a:r>
           </a:p>
           <a:p>
             <a:pPr lvl="4"/>
             <a:r>
-              <a:rPr lang="en-US" smtClean="0"/>
+              <a:rPr lang="en-US"/>
               <a:t>Fifth level</a:t>
             </a:r>
-            <a:endParaRPr lang="en-US"/>
           </a:p>
         </p:txBody>
       </p:sp>
@@ -1751,38 +1739,37 @@
           <a:p>
             <a:pPr lvl="0"/>
             <a:r>
-              <a:rPr lang="en-US" smtClean="0"/>
+              <a:rPr lang="en-US"/>
               <a:t>Click to edit Master text styles</a:t>
             </a:r>
           </a:p>
           <a:p>
             <a:pPr lvl="1"/>
             <a:r>
-              <a:rPr lang="en-US" smtClean="0"/>
+              <a:rPr lang="en-US"/>
               <a:t>Second level</a:t>
             </a:r>
           </a:p>
           <a:p>
             <a:pPr lvl="2"/>
             <a:r>
-              <a:rPr lang="en-US" smtClean="0"/>
+              <a:rPr lang="en-US"/>
               <a:t>Third level</a:t>
             </a:r>
           </a:p>
           <a:p>
             <a:pPr lvl="3"/>
             <a:r>
-              <a:rPr lang="en-US" smtClean="0"/>
+              <a:rPr lang="en-US"/>
               <a:t>Fourth level</a:t>
             </a:r>
           </a:p>
           <a:p>
             <a:pPr lvl="4"/>
             <a:r>
-              <a:rPr lang="en-US" smtClean="0"/>
+              <a:rPr lang="en-US"/>
               <a:t>Fifth level</a:t>
             </a:r>
-            <a:endParaRPr lang="en-US"/>
           </a:p>
         </p:txBody>
       </p:sp>
@@ -1803,7 +1790,7 @@
           <a:p>
             <a:fld id="{78C97017-6FC3-485B-9764-EAC9E56C1D49}" type="datetimeFigureOut">
               <a:rPr lang="en-US" smtClean="0"/>
-              <a:t>10/7/16</a:t>
+              <a:t>11/2/2016</a:t>
             </a:fld>
             <a:endParaRPr lang="en-US"/>
           </a:p>
@@ -1901,10 +1888,9 @@
           </a:lstStyle>
           <a:p>
             <a:r>
-              <a:rPr lang="en-US" smtClean="0"/>
+              <a:rPr lang="en-US"/>
               <a:t>Click to edit Master title style</a:t>
             </a:r>
-            <a:endParaRPr lang="en-US"/>
           </a:p>
         </p:txBody>
       </p:sp>
@@ -1967,7 +1953,7 @@
           <a:p>
             <a:pPr lvl="0"/>
             <a:r>
-              <a:rPr lang="en-US" smtClean="0"/>
+              <a:rPr lang="en-US"/>
               <a:t>Click to edit Master text styles</a:t>
             </a:r>
           </a:p>
@@ -2023,38 +2009,37 @@
           <a:p>
             <a:pPr lvl="0"/>
             <a:r>
-              <a:rPr lang="en-US" smtClean="0"/>
+              <a:rPr lang="en-US"/>
               <a:t>Click to edit Master text styles</a:t>
             </a:r>
           </a:p>
           <a:p>
             <a:pPr lvl="1"/>
             <a:r>
-              <a:rPr lang="en-US" smtClean="0"/>
+              <a:rPr lang="en-US"/>
               <a:t>Second level</a:t>
             </a:r>
           </a:p>
           <a:p>
             <a:pPr lvl="2"/>
             <a:r>
-              <a:rPr lang="en-US" smtClean="0"/>
+              <a:rPr lang="en-US"/>
               <a:t>Third level</a:t>
             </a:r>
           </a:p>
           <a:p>
             <a:pPr lvl="3"/>
             <a:r>
-              <a:rPr lang="en-US" smtClean="0"/>
+              <a:rPr lang="en-US"/>
               <a:t>Fourth level</a:t>
             </a:r>
           </a:p>
           <a:p>
             <a:pPr lvl="4"/>
             <a:r>
-              <a:rPr lang="en-US" smtClean="0"/>
+              <a:rPr lang="en-US"/>
               <a:t>Fifth level</a:t>
             </a:r>
-            <a:endParaRPr lang="en-US"/>
           </a:p>
         </p:txBody>
       </p:sp>
@@ -2117,7 +2102,7 @@
           <a:p>
             <a:pPr lvl="0"/>
             <a:r>
-              <a:rPr lang="en-US" smtClean="0"/>
+              <a:rPr lang="en-US"/>
               <a:t>Click to edit Master text styles</a:t>
             </a:r>
           </a:p>
@@ -2173,38 +2158,37 @@
           <a:p>
             <a:pPr lvl="0"/>
             <a:r>
-              <a:rPr lang="en-US" smtClean="0"/>
+              <a:rPr lang="en-US"/>
               <a:t>Click to edit Master text styles</a:t>
             </a:r>
           </a:p>
           <a:p>
             <a:pPr lvl="1"/>
             <a:r>
-              <a:rPr lang="en-US" smtClean="0"/>
+              <a:rPr lang="en-US"/>
               <a:t>Second level</a:t>
             </a:r>
           </a:p>
           <a:p>
             <a:pPr lvl="2"/>
             <a:r>
-              <a:rPr lang="en-US" smtClean="0"/>
+              <a:rPr lang="en-US"/>
               <a:t>Third level</a:t>
             </a:r>
           </a:p>
           <a:p>
             <a:pPr lvl="3"/>
             <a:r>
-              <a:rPr lang="en-US" smtClean="0"/>
+              <a:rPr lang="en-US"/>
               <a:t>Fourth level</a:t>
             </a:r>
           </a:p>
           <a:p>
             <a:pPr lvl="4"/>
             <a:r>
-              <a:rPr lang="en-US" smtClean="0"/>
+              <a:rPr lang="en-US"/>
               <a:t>Fifth level</a:t>
             </a:r>
-            <a:endParaRPr lang="en-US"/>
           </a:p>
         </p:txBody>
       </p:sp>
@@ -2225,7 +2209,7 @@
           <a:p>
             <a:fld id="{78C97017-6FC3-485B-9764-EAC9E56C1D49}" type="datetimeFigureOut">
               <a:rPr lang="en-US" smtClean="0"/>
-              <a:t>10/7/16</a:t>
+              <a:t>11/2/2016</a:t>
             </a:fld>
             <a:endParaRPr lang="en-US"/>
           </a:p>
@@ -2319,10 +2303,9 @@
           <a:lstStyle/>
           <a:p>
             <a:r>
-              <a:rPr lang="en-US" smtClean="0"/>
+              <a:rPr lang="en-US"/>
               <a:t>Click to edit Master title style</a:t>
             </a:r>
-            <a:endParaRPr lang="en-US"/>
           </a:p>
         </p:txBody>
       </p:sp>
@@ -2343,7 +2326,7 @@
           <a:p>
             <a:fld id="{78C97017-6FC3-485B-9764-EAC9E56C1D49}" type="datetimeFigureOut">
               <a:rPr lang="en-US" smtClean="0"/>
-              <a:t>10/7/16</a:t>
+              <a:t>11/2/2016</a:t>
             </a:fld>
             <a:endParaRPr lang="en-US"/>
           </a:p>
@@ -2438,7 +2421,7 @@
           <a:p>
             <a:fld id="{78C97017-6FC3-485B-9764-EAC9E56C1D49}" type="datetimeFigureOut">
               <a:rPr lang="en-US" smtClean="0"/>
-              <a:t>10/7/16</a:t>
+              <a:t>11/2/2016</a:t>
             </a:fld>
             <a:endParaRPr lang="en-US"/>
           </a:p>
@@ -2541,10 +2524,9 @@
           </a:lstStyle>
           <a:p>
             <a:r>
-              <a:rPr lang="en-US" smtClean="0"/>
+              <a:rPr lang="en-US"/>
               <a:t>Click to edit Master title style</a:t>
             </a:r>
-            <a:endParaRPr lang="en-US"/>
           </a:p>
         </p:txBody>
       </p:sp>
@@ -2598,38 +2580,37 @@
           <a:p>
             <a:pPr lvl="0"/>
             <a:r>
-              <a:rPr lang="en-US" smtClean="0"/>
+              <a:rPr lang="en-US"/>
               <a:t>Click to edit Master text styles</a:t>
             </a:r>
           </a:p>
           <a:p>
             <a:pPr lvl="1"/>
             <a:r>
-              <a:rPr lang="en-US" smtClean="0"/>
+              <a:rPr lang="en-US"/>
               <a:t>Second level</a:t>
             </a:r>
           </a:p>
           <a:p>
             <a:pPr lvl="2"/>
             <a:r>
-              <a:rPr lang="en-US" smtClean="0"/>
+              <a:rPr lang="en-US"/>
               <a:t>Third level</a:t>
             </a:r>
           </a:p>
           <a:p>
             <a:pPr lvl="3"/>
             <a:r>
-              <a:rPr lang="en-US" smtClean="0"/>
+              <a:rPr lang="en-US"/>
               <a:t>Fourth level</a:t>
             </a:r>
           </a:p>
           <a:p>
             <a:pPr lvl="4"/>
             <a:r>
-              <a:rPr lang="en-US" smtClean="0"/>
+              <a:rPr lang="en-US"/>
               <a:t>Fifth level</a:t>
             </a:r>
-            <a:endParaRPr lang="en-US"/>
           </a:p>
         </p:txBody>
       </p:sp>
@@ -2692,7 +2673,7 @@
           <a:p>
             <a:pPr lvl="0"/>
             <a:r>
-              <a:rPr lang="en-US" smtClean="0"/>
+              <a:rPr lang="en-US"/>
               <a:t>Click to edit Master text styles</a:t>
             </a:r>
           </a:p>
@@ -2715,7 +2696,7 @@
           <a:p>
             <a:fld id="{78C97017-6FC3-485B-9764-EAC9E56C1D49}" type="datetimeFigureOut">
               <a:rPr lang="en-US" smtClean="0"/>
-              <a:t>10/7/16</a:t>
+              <a:t>11/2/2016</a:t>
             </a:fld>
             <a:endParaRPr lang="en-US"/>
           </a:p>
@@ -2818,10 +2799,9 @@
           </a:lstStyle>
           <a:p>
             <a:r>
-              <a:rPr lang="en-US" smtClean="0"/>
+              <a:rPr lang="en-US"/>
               <a:t>Click to edit Master title style</a:t>
             </a:r>
-            <a:endParaRPr lang="en-US"/>
           </a:p>
         </p:txBody>
       </p:sp>
@@ -2945,7 +2925,7 @@
           <a:p>
             <a:pPr lvl="0"/>
             <a:r>
-              <a:rPr lang="en-US" smtClean="0"/>
+              <a:rPr lang="en-US"/>
               <a:t>Click to edit Master text styles</a:t>
             </a:r>
           </a:p>
@@ -2968,7 +2948,7 @@
           <a:p>
             <a:fld id="{78C97017-6FC3-485B-9764-EAC9E56C1D49}" type="datetimeFigureOut">
               <a:rPr lang="en-US" smtClean="0"/>
-              <a:t>10/7/16</a:t>
+              <a:t>11/2/2016</a:t>
             </a:fld>
             <a:endParaRPr lang="en-US"/>
           </a:p>
@@ -3077,10 +3057,9 @@
           <a:lstStyle/>
           <a:p>
             <a:r>
-              <a:rPr lang="en-US" smtClean="0"/>
+              <a:rPr lang="en-US"/>
               <a:t>Click to edit Master title style</a:t>
             </a:r>
-            <a:endParaRPr lang="en-US"/>
           </a:p>
         </p:txBody>
       </p:sp>
@@ -3111,38 +3090,37 @@
           <a:p>
             <a:pPr lvl="0"/>
             <a:r>
-              <a:rPr lang="en-US" smtClean="0"/>
+              <a:rPr lang="en-US"/>
               <a:t>Click to edit Master text styles</a:t>
             </a:r>
           </a:p>
           <a:p>
             <a:pPr lvl="1"/>
             <a:r>
-              <a:rPr lang="en-US" smtClean="0"/>
+              <a:rPr lang="en-US"/>
               <a:t>Second level</a:t>
             </a:r>
           </a:p>
           <a:p>
             <a:pPr lvl="2"/>
             <a:r>
-              <a:rPr lang="en-US" smtClean="0"/>
+              <a:rPr lang="en-US"/>
               <a:t>Third level</a:t>
             </a:r>
           </a:p>
           <a:p>
             <a:pPr lvl="3"/>
             <a:r>
-              <a:rPr lang="en-US" smtClean="0"/>
+              <a:rPr lang="en-US"/>
               <a:t>Fourth level</a:t>
             </a:r>
           </a:p>
           <a:p>
             <a:pPr lvl="4"/>
             <a:r>
-              <a:rPr lang="en-US" smtClean="0"/>
+              <a:rPr lang="en-US"/>
               <a:t>Fifth level</a:t>
             </a:r>
-            <a:endParaRPr lang="en-US"/>
           </a:p>
         </p:txBody>
       </p:sp>
@@ -3181,7 +3159,7 @@
           <a:p>
             <a:fld id="{78C97017-6FC3-485B-9764-EAC9E56C1D49}" type="datetimeFigureOut">
               <a:rPr lang="en-US" smtClean="0"/>
-              <a:t>10/7/16</a:t>
+              <a:t>11/2/2016</a:t>
             </a:fld>
             <a:endParaRPr lang="en-US"/>
           </a:p>
@@ -3572,14 +3550,13 @@
           <a:lstStyle/>
           <a:p>
             <a:r>
-              <a:rPr lang="en-US" dirty="0" err="1" smtClean="0"/>
+              <a:rPr lang="en-US" dirty="0" err="1"/>
               <a:t>AddressBook</a:t>
             </a:r>
             <a:r>
-              <a:rPr lang="en-US" dirty="0" smtClean="0"/>
+              <a:rPr lang="en-US" dirty="0"/>
               <a:t> – Level 4</a:t>
             </a:r>
-            <a:endParaRPr lang="en-US" dirty="0"/>
           </a:p>
         </p:txBody>
       </p:sp>
@@ -3599,10 +3576,9 @@
           <a:lstStyle/>
           <a:p>
             <a:r>
-              <a:rPr lang="en-US" dirty="0" smtClean="0"/>
+              <a:rPr lang="en-US" dirty="0"/>
               <a:t>Diagrams</a:t>
             </a:r>
-            <a:endParaRPr lang="en-US" dirty="0"/>
           </a:p>
         </p:txBody>
       </p:sp>
@@ -3734,7 +3710,7 @@
           <a:p>
             <a:pPr algn="ctr"/>
             <a:r>
-              <a:rPr lang="en-US" sz="1600" dirty="0" smtClean="0">
+              <a:rPr lang="en-US" sz="1600" dirty="0">
                 <a:solidFill>
                   <a:schemeClr val="bg1"/>
                 </a:solidFill>
@@ -3793,7 +3769,7 @@
           <a:p>
             <a:pPr algn="ctr"/>
             <a:r>
-              <a:rPr lang="en-US" sz="1600" dirty="0" smtClean="0">
+              <a:rPr lang="en-US" sz="1600" dirty="0">
                 <a:solidFill>
                   <a:schemeClr val="bg1"/>
                 </a:solidFill>
@@ -3856,7 +3832,7 @@
           <a:p>
             <a:pPr algn="ctr"/>
             <a:r>
-              <a:rPr lang="en-US" sz="1600" dirty="0" smtClean="0">
+              <a:rPr lang="en-US" sz="1600" dirty="0">
                 <a:solidFill>
                   <a:schemeClr val="bg1"/>
                 </a:solidFill>
@@ -3915,7 +3891,7 @@
           <a:p>
             <a:pPr algn="ctr"/>
             <a:r>
-              <a:rPr lang="en-US" sz="1600" dirty="0" smtClean="0">
+              <a:rPr lang="en-US" sz="1600" dirty="0">
                 <a:solidFill>
                   <a:schemeClr val="bg1"/>
                 </a:solidFill>
@@ -4501,7 +4477,7 @@
           <a:p>
             <a:pPr algn="ctr"/>
             <a:r>
-              <a:rPr lang="en-US" sz="1600" dirty="0" smtClean="0">
+              <a:rPr lang="en-US" sz="1600" dirty="0">
                 <a:solidFill>
                   <a:schemeClr val="bg1"/>
                 </a:solidFill>
@@ -4852,7 +4828,7 @@
           <a:p>
             <a:pPr algn="ctr"/>
             <a:r>
-              <a:rPr lang="en-US" sz="1600" dirty="0" smtClean="0">
+              <a:rPr lang="en-US" sz="1600" dirty="0">
                 <a:solidFill>
                   <a:schemeClr val="bg1"/>
                 </a:solidFill>
@@ -4860,25 +4836,20 @@
               <a:t>Logs</a:t>
             </a:r>
             <a:br>
-              <a:rPr lang="en-US" sz="1600" dirty="0" smtClean="0">
+              <a:rPr lang="en-US" sz="1600" dirty="0">
                 <a:solidFill>
                   <a:schemeClr val="bg1"/>
                 </a:solidFill>
               </a:rPr>
             </a:br>
             <a:r>
-              <a:rPr lang="en-US" sz="1600" dirty="0" smtClean="0">
+              <a:rPr lang="en-US" sz="1600" dirty="0">
                 <a:solidFill>
                   <a:schemeClr val="bg1"/>
                 </a:solidFill>
               </a:rPr>
               <a:t>Center</a:t>
             </a:r>
-            <a:endParaRPr lang="en-US" sz="1600" dirty="0">
-              <a:solidFill>
-                <a:schemeClr val="bg1"/>
-              </a:solidFill>
-            </a:endParaRPr>
           </a:p>
         </p:txBody>
       </p:sp>
@@ -5035,7 +5006,7 @@
           <a:p>
             <a:pPr algn="ctr"/>
             <a:r>
-              <a:rPr lang="en-US" sz="1600" dirty="0" smtClean="0">
+              <a:rPr lang="en-US" sz="1600" dirty="0">
                 <a:solidFill>
                   <a:schemeClr val="bg1"/>
                 </a:solidFill>
@@ -5399,7 +5370,7 @@
           <a:p>
             <a:pPr algn="ctr"/>
             <a:r>
-              <a:rPr lang="en-US" sz="1600" dirty="0" smtClean="0">
+              <a:rPr lang="en-US" sz="1600" dirty="0">
                 <a:solidFill>
                   <a:schemeClr val="bg1"/>
                 </a:solidFill>
@@ -5546,7 +5517,7 @@
           <a:p>
             <a:pPr algn="ctr"/>
             <a:r>
-              <a:rPr lang="en-US" sz="1600" dirty="0" smtClean="0">
+              <a:rPr lang="en-US" sz="1600" dirty="0">
                 <a:solidFill>
                   <a:schemeClr val="bg1"/>
                 </a:solidFill>
@@ -5708,10 +5679,9 @@
           <a:lstStyle/>
           <a:p>
             <a:r>
-              <a:rPr lang="en-US" sz="1400" dirty="0" smtClean="0"/>
+              <a:rPr lang="en-US" sz="1400" dirty="0"/>
               <a:t>delete 1</a:t>
             </a:r>
-            <a:endParaRPr lang="en-US" sz="1400" dirty="0"/>
           </a:p>
         </p:txBody>
       </p:sp>
@@ -5774,18 +5744,13 @@
           <a:lstStyle/>
           <a:p>
             <a:r>
-              <a:rPr lang="en-US" sz="1400" dirty="0" smtClean="0">
+              <a:rPr lang="en-US" sz="1400" dirty="0">
                 <a:solidFill>
                   <a:srgbClr val="0070C0"/>
                 </a:solidFill>
               </a:rPr>
               <a:t>execute(“delete 1”)</a:t>
             </a:r>
-            <a:endParaRPr lang="en-US" sz="1400" dirty="0">
-              <a:solidFill>
-                <a:srgbClr val="0070C0"/>
-              </a:solidFill>
-            </a:endParaRPr>
           </a:p>
         </p:txBody>
       </p:sp>
@@ -5848,7 +5813,7 @@
           <a:lstStyle/>
           <a:p>
             <a:r>
-              <a:rPr lang="en-US" sz="1400" dirty="0" err="1" smtClean="0">
+              <a:rPr lang="en-US" sz="1400" dirty="0" err="1">
                 <a:solidFill>
                   <a:srgbClr val="7030A0"/>
                 </a:solidFill>
@@ -5856,18 +5821,13 @@
               <a:t>deletePerson</a:t>
             </a:r>
             <a:r>
-              <a:rPr lang="en-US" sz="1400" dirty="0" smtClean="0">
+              <a:rPr lang="en-US" sz="1400" dirty="0">
                 <a:solidFill>
                   <a:srgbClr val="7030A0"/>
                 </a:solidFill>
               </a:rPr>
               <a:t>(p)</a:t>
             </a:r>
-            <a:endParaRPr lang="en-US" sz="1400" dirty="0">
-              <a:solidFill>
-                <a:srgbClr val="7030A0"/>
-              </a:solidFill>
-            </a:endParaRPr>
           </a:p>
         </p:txBody>
       </p:sp>
@@ -5894,7 +5854,7 @@
           <a:lstStyle/>
           <a:p>
             <a:r>
-              <a:rPr lang="en-US" sz="1400" dirty="0" smtClean="0">
+              <a:rPr lang="en-US" sz="1400" dirty="0">
                 <a:solidFill>
                   <a:schemeClr val="accent5">
                     <a:lumMod val="75000"/>
@@ -5904,7 +5864,7 @@
               <a:t>post(</a:t>
             </a:r>
             <a:r>
-              <a:rPr lang="en-US" sz="1400" dirty="0" err="1" smtClean="0">
+              <a:rPr lang="en-US" sz="1400" dirty="0" err="1">
                 <a:solidFill>
                   <a:schemeClr val="accent5">
                     <a:lumMod val="75000"/>
@@ -5914,7 +5874,7 @@
               <a:t>AddressBookChangedEvent</a:t>
             </a:r>
             <a:r>
-              <a:rPr lang="en-US" sz="1400" dirty="0" smtClean="0">
+              <a:rPr lang="en-US" sz="1400" dirty="0">
                 <a:solidFill>
                   <a:schemeClr val="accent5">
                     <a:lumMod val="75000"/>
@@ -5923,13 +5883,6 @@
               </a:rPr>
               <a:t>)</a:t>
             </a:r>
-            <a:endParaRPr lang="en-US" sz="1400" dirty="0">
-              <a:solidFill>
-                <a:schemeClr val="accent5">
-                  <a:lumMod val="75000"/>
-                </a:schemeClr>
-              </a:solidFill>
-            </a:endParaRPr>
           </a:p>
         </p:txBody>
       </p:sp>
@@ -6095,7 +6048,7 @@
           <a:p>
             <a:pPr algn="ctr"/>
             <a:r>
-              <a:rPr lang="en-US" sz="1600" dirty="0" smtClean="0">
+              <a:rPr lang="en-US" sz="1600" dirty="0">
                 <a:solidFill>
                   <a:schemeClr val="bg1"/>
                 </a:solidFill>
@@ -6103,7 +6056,7 @@
               <a:t>:</a:t>
             </a:r>
             <a:r>
-              <a:rPr lang="en-US" sz="1600" dirty="0" err="1" smtClean="0">
+              <a:rPr lang="en-US" sz="1600" dirty="0" err="1">
                 <a:solidFill>
                   <a:schemeClr val="bg1"/>
                 </a:solidFill>
@@ -6336,7 +6289,7 @@
           <a:p>
             <a:pPr algn="ctr"/>
             <a:r>
-              <a:rPr lang="en-US" sz="1600" dirty="0" smtClean="0">
+              <a:rPr lang="en-US" sz="1600" dirty="0">
                 <a:solidFill>
                   <a:schemeClr val="bg1"/>
                 </a:solidFill>
@@ -6468,7 +6421,7 @@
           <a:lstStyle/>
           <a:p>
             <a:r>
-              <a:rPr lang="en-US" sz="1400" dirty="0" smtClean="0">
+              <a:rPr lang="en-US" sz="1400" dirty="0">
                 <a:solidFill>
                   <a:schemeClr val="accent5">
                     <a:lumMod val="75000"/>
@@ -6478,7 +6431,7 @@
               <a:t>post(</a:t>
             </a:r>
             <a:r>
-              <a:rPr lang="en-US" sz="1400" dirty="0" err="1" smtClean="0">
+              <a:rPr lang="en-US" sz="1400" dirty="0" err="1">
                 <a:solidFill>
                   <a:schemeClr val="accent5">
                     <a:lumMod val="75000"/>
@@ -6488,7 +6441,7 @@
               <a:t>AddressBookChangedEvent</a:t>
             </a:r>
             <a:r>
-              <a:rPr lang="en-US" sz="1400" dirty="0" smtClean="0">
+              <a:rPr lang="en-US" sz="1400" dirty="0">
                 <a:solidFill>
                   <a:schemeClr val="accent5">
                     <a:lumMod val="75000"/>
@@ -6497,13 +6450,6 @@
               </a:rPr>
               <a:t>)</a:t>
             </a:r>
-            <a:endParaRPr lang="en-US" sz="1400" dirty="0">
-              <a:solidFill>
-                <a:schemeClr val="accent5">
-                  <a:lumMod val="75000"/>
-                </a:schemeClr>
-              </a:solidFill>
-            </a:endParaRPr>
           </a:p>
         </p:txBody>
       </p:sp>
@@ -6595,7 +6541,7 @@
           <a:p>
             <a:pPr algn="ctr"/>
             <a:r>
-              <a:rPr lang="en-US" sz="1600" dirty="0" smtClean="0">
+              <a:rPr lang="en-US" sz="1600" dirty="0">
                 <a:solidFill>
                   <a:schemeClr val="bg1"/>
                 </a:solidFill>
@@ -6603,7 +6549,7 @@
               <a:t>:</a:t>
             </a:r>
             <a:r>
-              <a:rPr lang="en-US" sz="1600" dirty="0" err="1" smtClean="0">
+              <a:rPr lang="en-US" sz="1600" dirty="0" err="1">
                 <a:solidFill>
                   <a:schemeClr val="bg1"/>
                 </a:solidFill>
@@ -6850,7 +6796,7 @@
           <a:lstStyle/>
           <a:p>
             <a:r>
-              <a:rPr lang="en-US" sz="1400" dirty="0" err="1" smtClean="0">
+              <a:rPr lang="en-US" sz="1400" dirty="0" err="1">
                 <a:solidFill>
                   <a:schemeClr val="accent6">
                     <a:lumMod val="75000"/>
@@ -6860,7 +6806,7 @@
               <a:t>handleAddresssBookChangedEvent</a:t>
             </a:r>
             <a:r>
-              <a:rPr lang="en-US" sz="1400" dirty="0" smtClean="0">
+              <a:rPr lang="en-US" sz="1400" dirty="0">
                 <a:solidFill>
                   <a:schemeClr val="accent6">
                     <a:lumMod val="75000"/>
@@ -6869,13 +6815,6 @@
               </a:rPr>
               <a:t>()</a:t>
             </a:r>
-            <a:endParaRPr lang="en-US" sz="1400" dirty="0">
-              <a:solidFill>
-                <a:schemeClr val="accent6">
-                  <a:lumMod val="75000"/>
-                </a:schemeClr>
-              </a:solidFill>
-            </a:endParaRPr>
           </a:p>
         </p:txBody>
       </p:sp>
@@ -6960,7 +6899,7 @@
           <a:p>
             <a:pPr algn="ctr"/>
             <a:r>
-              <a:rPr lang="en-US" sz="1600" dirty="0" smtClean="0">
+              <a:rPr lang="en-US" sz="1600" dirty="0">
                 <a:solidFill>
                   <a:schemeClr val="bg1"/>
                 </a:solidFill>
@@ -7163,7 +7102,7 @@
           <a:lstStyle/>
           <a:p>
             <a:r>
-              <a:rPr lang="en-US" sz="1400" dirty="0" err="1" smtClean="0">
+              <a:rPr lang="en-US" sz="1400" dirty="0" err="1">
                 <a:solidFill>
                   <a:srgbClr val="00B050"/>
                 </a:solidFill>
@@ -7171,18 +7110,13 @@
               <a:t>handleAddresssBookChangedEvent</a:t>
             </a:r>
             <a:r>
-              <a:rPr lang="en-US" sz="1400" dirty="0" smtClean="0">
+              <a:rPr lang="en-US" sz="1400" dirty="0">
                 <a:solidFill>
                   <a:srgbClr val="00B050"/>
                 </a:solidFill>
               </a:rPr>
               <a:t>()</a:t>
             </a:r>
-            <a:endParaRPr lang="en-US" sz="1400" dirty="0">
-              <a:solidFill>
-                <a:srgbClr val="00B050"/>
-              </a:solidFill>
-            </a:endParaRPr>
           </a:p>
         </p:txBody>
       </p:sp>
@@ -7369,18 +7303,13 @@
           <a:p>
             <a:pPr algn="r"/>
             <a:r>
-              <a:rPr lang="en-US" sz="1400" dirty="0" smtClean="0">
+              <a:rPr lang="en-US" sz="1400" dirty="0">
                 <a:solidFill>
                   <a:srgbClr val="00B050"/>
                 </a:solidFill>
               </a:rPr>
               <a:t>Update status bar</a:t>
             </a:r>
-            <a:endParaRPr lang="en-US" sz="1400" dirty="0">
-              <a:solidFill>
-                <a:srgbClr val="00B050"/>
-              </a:solidFill>
-            </a:endParaRPr>
           </a:p>
         </p:txBody>
       </p:sp>
@@ -7570,7 +7499,7 @@
           <a:lstStyle/>
           <a:p>
             <a:r>
-              <a:rPr lang="en-US" sz="1400" dirty="0" smtClean="0">
+              <a:rPr lang="en-US" sz="1400" dirty="0">
                 <a:solidFill>
                   <a:schemeClr val="accent6">
                     <a:lumMod val="75000"/>
@@ -7580,7 +7509,7 @@
               <a:t>Save </a:t>
             </a:r>
             <a:br>
-              <a:rPr lang="en-US" sz="1400" dirty="0" smtClean="0">
+              <a:rPr lang="en-US" sz="1400" dirty="0">
                 <a:solidFill>
                   <a:schemeClr val="accent6">
                     <a:lumMod val="75000"/>
@@ -7589,7 +7518,7 @@
               </a:rPr>
             </a:br>
             <a:r>
-              <a:rPr lang="en-US" sz="1400" dirty="0" smtClean="0">
+              <a:rPr lang="en-US" sz="1400" dirty="0">
                 <a:solidFill>
                   <a:schemeClr val="accent6">
                     <a:lumMod val="75000"/>
@@ -7598,13 +7527,6 @@
               </a:rPr>
               <a:t>to file</a:t>
             </a:r>
-            <a:endParaRPr lang="en-US" sz="1400" dirty="0">
-              <a:solidFill>
-                <a:schemeClr val="accent6">
-                  <a:lumMod val="75000"/>
-                </a:schemeClr>
-              </a:solidFill>
-            </a:endParaRPr>
           </a:p>
         </p:txBody>
       </p:sp>
@@ -7681,7 +7603,7 @@
           <a:lstStyle/>
           <a:p>
             <a:r>
-              <a:rPr lang="en-US" sz="1200" b="1" dirty="0" smtClean="0">
+              <a:rPr lang="en-US" sz="1200" b="1" dirty="0">
                 <a:solidFill>
                   <a:schemeClr val="accent3">
                     <a:lumMod val="75000"/>
@@ -7864,7 +7786,7 @@
           <a:p>
             <a:pPr algn="ctr"/>
             <a:r>
-              <a:rPr lang="en-US" sz="1050" dirty="0" err="1" smtClean="0">
+              <a:rPr lang="en-US" sz="1050" dirty="0" err="1">
                 <a:solidFill>
                   <a:schemeClr val="bg1"/>
                 </a:solidFill>
@@ -8114,7 +8036,7 @@
           <a:p>
             <a:pPr algn="ctr"/>
             <a:r>
-              <a:rPr lang="en-US" sz="1050" b="1" smtClean="0">
+              <a:rPr lang="en-US" sz="1050" b="1">
                 <a:solidFill>
                   <a:schemeClr val="accent3">
                     <a:lumMod val="75000"/>
@@ -8124,7 +8046,7 @@
               <a:t>TimeCategory</a:t>
             </a:r>
             <a:r>
-              <a:rPr lang="en-US" altLang="zh-CN" sz="1050" b="1" smtClean="0">
+              <a:rPr lang="en-US" altLang="zh-CN" sz="1050" b="1">
                 <a:solidFill>
                   <a:schemeClr val="accent3">
                     <a:lumMod val="75000"/>
@@ -8244,7 +8166,7 @@
           <a:p>
             <a:pPr algn="ctr"/>
             <a:r>
-              <a:rPr lang="en-US" altLang="zh-CN" sz="1050" b="1" dirty="0" err="1" smtClean="0">
+              <a:rPr lang="en-US" altLang="zh-CN" sz="1050" b="1" dirty="0" err="1">
                 <a:solidFill>
                   <a:schemeClr val="accent3">
                     <a:lumMod val="75000"/>
@@ -8254,7 +8176,7 @@
               <a:t>Task</a:t>
             </a:r>
             <a:r>
-              <a:rPr lang="en-US" sz="1050" b="1" dirty="0" err="1" smtClean="0">
+              <a:rPr lang="en-US" sz="1050" b="1" dirty="0" err="1">
                 <a:solidFill>
                   <a:schemeClr val="accent3">
                     <a:lumMod val="75000"/>
@@ -8314,7 +8236,7 @@
           <a:p>
             <a:pPr algn="ctr"/>
             <a:r>
-              <a:rPr lang="en-US" altLang="zh-CN" sz="1050" b="1" dirty="0" err="1" smtClean="0">
+              <a:rPr lang="en-US" altLang="zh-CN" sz="1050" b="1" dirty="0" err="1">
                 <a:solidFill>
                   <a:schemeClr val="accent3">
                     <a:lumMod val="75000"/>
@@ -8746,7 +8668,7 @@
           <a:p>
             <a:pPr algn="ctr"/>
             <a:r>
-              <a:rPr lang="en-US" sz="1050" b="1" dirty="0" smtClean="0">
+              <a:rPr lang="en-US" sz="1050" b="1" dirty="0">
                 <a:solidFill>
                   <a:schemeClr val="accent3">
                     <a:lumMod val="75000"/>
@@ -8756,7 +8678,7 @@
               <a:t>{abstract}</a:t>
             </a:r>
             <a:br>
-              <a:rPr lang="en-US" sz="1050" b="1" dirty="0" smtClean="0">
+              <a:rPr lang="en-US" sz="1050" b="1" dirty="0">
                 <a:solidFill>
                   <a:schemeClr val="accent3">
                     <a:lumMod val="75000"/>
@@ -8765,7 +8687,7 @@
               </a:rPr>
             </a:br>
             <a:r>
-              <a:rPr lang="en-US" sz="1050" b="1" dirty="0" err="1" smtClean="0">
+              <a:rPr lang="en-US" sz="1050" b="1" dirty="0" err="1">
                 <a:solidFill>
                   <a:schemeClr val="accent3">
                     <a:lumMod val="75000"/>
@@ -9252,7 +9174,7 @@
           <a:p>
             <a:pPr algn="ctr"/>
             <a:r>
-              <a:rPr lang="en-US" sz="1100" b="1" dirty="0" smtClean="0">
+              <a:rPr lang="en-US" sz="1100" b="1" dirty="0">
                 <a:solidFill>
                   <a:schemeClr val="bg1"/>
                 </a:solidFill>
@@ -9311,7 +9233,7 @@
           <a:p>
             <a:pPr algn="ctr"/>
             <a:r>
-              <a:rPr lang="en-US" sz="1050" dirty="0" smtClean="0">
+              <a:rPr lang="en-US" sz="1050" dirty="0">
                 <a:solidFill>
                   <a:schemeClr val="bg1"/>
                 </a:solidFill>
@@ -9322,7 +9244,7 @@
           <a:p>
             <a:pPr algn="ctr"/>
             <a:r>
-              <a:rPr lang="en-US" sz="1050" dirty="0" err="1" smtClean="0">
+              <a:rPr lang="en-US" sz="1050" dirty="0" err="1">
                 <a:solidFill>
                   <a:schemeClr val="bg1"/>
                 </a:solidFill>
@@ -9901,7 +9823,7 @@
           <a:p>
             <a:pPr algn="ctr"/>
             <a:r>
-              <a:rPr lang="en-US" altLang="zh-CN" sz="1050" b="1" dirty="0" err="1" smtClean="0">
+              <a:rPr lang="en-US" altLang="zh-CN" sz="1050" b="1" dirty="0" err="1">
                 <a:solidFill>
                   <a:schemeClr val="accent3">
                     <a:lumMod val="75000"/>
@@ -10002,7 +9924,7 @@
           <a:p>
             <a:pPr algn="ctr"/>
             <a:r>
-              <a:rPr lang="en-US" sz="1050" b="1" dirty="0" err="1" smtClean="0">
+              <a:rPr lang="en-US" sz="1050" b="1" dirty="0" err="1">
                 <a:solidFill>
                   <a:schemeClr val="accent3">
                     <a:lumMod val="75000"/>
@@ -10012,7 +9934,7 @@
               <a:t>Category</a:t>
             </a:r>
             <a:r>
-              <a:rPr lang="en-US" altLang="zh-CN" sz="1050" b="1" dirty="0" err="1" smtClean="0">
+              <a:rPr lang="en-US" altLang="zh-CN" sz="1050" b="1" dirty="0" err="1">
                 <a:solidFill>
                   <a:schemeClr val="accent3">
                     <a:lumMod val="75000"/>
@@ -10277,7 +10199,7 @@
           <a:p>
             <a:pPr algn="ctr"/>
             <a:r>
-              <a:rPr lang="en-US" altLang="zh-CN" sz="1050" b="1" dirty="0" err="1" smtClean="0">
+              <a:rPr lang="en-US" altLang="zh-CN" sz="1050" b="1" dirty="0" err="1">
                 <a:solidFill>
                   <a:schemeClr val="accent3">
                     <a:lumMod val="75000"/>
@@ -10462,7 +10384,7 @@
           <a:p>
             <a:pPr algn="ctr"/>
             <a:r>
-              <a:rPr lang="en-US" altLang="zh-CN" sz="1050" b="1" smtClean="0">
+              <a:rPr lang="en-US" altLang="zh-CN" sz="1050" b="1">
                 <a:solidFill>
                   <a:schemeClr val="accent3">
                     <a:lumMod val="75000"/>
@@ -10575,13 +10497,6 @@
   <p:clrMapOvr>
     <a:masterClrMapping/>
   </p:clrMapOvr>
-  <p:timing>
-    <p:tnLst>
-      <p:par>
-        <p:cTn id="1" dur="indefinite" restart="never" nodeType="tmRoot"/>
-      </p:par>
-    </p:tnLst>
-  </p:timing>
 </p:sld>
 </file>
 
@@ -10648,7 +10563,7 @@
           <a:lstStyle/>
           <a:p>
             <a:r>
-              <a:rPr lang="en-US" sz="1200" b="1" dirty="0" smtClean="0">
+              <a:rPr lang="en-US" sz="1200" b="1" dirty="0">
                 <a:solidFill>
                   <a:srgbClr val="0070C0"/>
                 </a:solidFill>
@@ -10822,7 +10737,7 @@
           <a:p>
             <a:pPr algn="ctr"/>
             <a:r>
-              <a:rPr lang="en-US" sz="1050" dirty="0" err="1" smtClean="0">
+              <a:rPr lang="en-US" sz="1050" dirty="0" err="1">
                 <a:solidFill>
                   <a:schemeClr val="bg1"/>
                 </a:solidFill>
@@ -11184,7 +11099,7 @@
           <a:p>
             <a:pPr algn="ctr"/>
             <a:r>
-              <a:rPr lang="en-US" sz="1050" b="1" dirty="0" smtClean="0">
+              <a:rPr lang="en-US" sz="1050" b="1" dirty="0">
                 <a:solidFill>
                   <a:srgbClr val="0070C0"/>
                 </a:solidFill>
@@ -11192,14 +11107,14 @@
               <a:t>{abstract}</a:t>
             </a:r>
             <a:br>
-              <a:rPr lang="en-US" sz="1050" b="1" dirty="0" smtClean="0">
+              <a:rPr lang="en-US" sz="1050" b="1" dirty="0">
                 <a:solidFill>
                   <a:srgbClr val="0070C0"/>
                 </a:solidFill>
               </a:rPr>
             </a:br>
             <a:r>
-              <a:rPr lang="en-US" sz="1050" b="1" dirty="0" smtClean="0">
+              <a:rPr lang="en-US" sz="1050" b="1" dirty="0">
                 <a:solidFill>
                   <a:srgbClr val="0070C0"/>
                 </a:solidFill>
@@ -11860,7 +11775,7 @@
             <a:p>
               <a:pPr algn="r"/>
               <a:r>
-                <a:rPr lang="en-US" sz="1100" dirty="0" smtClean="0">
+                <a:rPr lang="en-US" sz="1100" dirty="0">
                   <a:solidFill>
                     <a:srgbClr val="0070C0"/>
                   </a:solidFill>
@@ -11959,7 +11874,7 @@
             <a:lstStyle/>
             <a:p>
               <a:r>
-                <a:rPr lang="en-US" sz="1100" dirty="0" smtClean="0">
+                <a:rPr lang="en-US" sz="1100" dirty="0">
                   <a:solidFill>
                     <a:srgbClr val="0070C0"/>
                   </a:solidFill>
@@ -12045,7 +11960,7 @@
           <a:p>
             <a:pPr algn="r"/>
             <a:r>
-              <a:rPr lang="en-US" sz="1100" dirty="0" smtClean="0">
+              <a:rPr lang="en-US" sz="1100" dirty="0">
                 <a:solidFill>
                   <a:srgbClr val="0070C0"/>
                 </a:solidFill>
@@ -12084,7 +11999,7 @@
           <a:p>
             <a:pPr algn="r"/>
             <a:r>
-              <a:rPr lang="en-US" sz="1100" dirty="0" smtClean="0">
+              <a:rPr lang="en-US" sz="1100" dirty="0">
                 <a:solidFill>
                   <a:srgbClr val="0070C0"/>
                 </a:solidFill>
@@ -12137,7 +12052,7 @@
             <a:p>
               <a:pPr algn="r"/>
               <a:r>
-                <a:rPr lang="en-US" sz="1100" dirty="0" smtClean="0">
+                <a:rPr lang="en-US" sz="1100" dirty="0">
                   <a:solidFill>
                     <a:srgbClr val="0070C0"/>
                   </a:solidFill>
@@ -12240,7 +12155,7 @@
           <a:p>
             <a:pPr algn="ctr"/>
             <a:r>
-              <a:rPr lang="en-US" sz="1050" b="1" dirty="0" smtClean="0">
+              <a:rPr lang="en-US" sz="1050" b="1" dirty="0">
                 <a:solidFill>
                   <a:srgbClr val="0070C0"/>
                 </a:solidFill>
@@ -12248,14 +12163,14 @@
               <a:t>Incorrect</a:t>
             </a:r>
             <a:br>
-              <a:rPr lang="en-US" sz="1050" b="1" dirty="0" smtClean="0">
+              <a:rPr lang="en-US" sz="1050" b="1" dirty="0">
                 <a:solidFill>
                   <a:srgbClr val="0070C0"/>
                 </a:solidFill>
               </a:rPr>
             </a:br>
             <a:r>
-              <a:rPr lang="en-US" sz="1050" b="1" dirty="0" smtClean="0">
+              <a:rPr lang="en-US" sz="1050" b="1" dirty="0">
                 <a:solidFill>
                   <a:srgbClr val="0070C0"/>
                 </a:solidFill>
@@ -12364,13 +12279,6 @@
   <p:clrMapOvr>
     <a:masterClrMapping/>
   </p:clrMapOvr>
-  <p:timing>
-    <p:tnLst>
-      <p:par>
-        <p:cTn id="1" dur="indefinite" restart="never" nodeType="tmRoot"/>
-      </p:par>
-    </p:tnLst>
-  </p:timing>
 </p:sld>
 </file>
 
@@ -12437,7 +12345,7 @@
           <a:lstStyle/>
           <a:p>
             <a:r>
-              <a:rPr lang="en-US" sz="1200" b="1" dirty="0" smtClean="0">
+              <a:rPr lang="en-US" sz="1200" b="1" dirty="0">
                 <a:solidFill>
                   <a:srgbClr val="0070C0"/>
                 </a:solidFill>
@@ -12647,7 +12555,7 @@
           <a:p>
             <a:pPr algn="ctr"/>
             <a:r>
-              <a:rPr lang="en-US" sz="1600" dirty="0" smtClean="0">
+              <a:rPr lang="en-US" sz="1600" dirty="0">
                 <a:solidFill>
                   <a:schemeClr val="bg1"/>
                 </a:solidFill>
@@ -12794,20 +12702,12 @@
           <a:p>
             <a:pPr algn="ctr"/>
             <a:r>
-              <a:rPr lang="en-US" sz="1600" dirty="0" smtClean="0">
+              <a:rPr lang="en-US" sz="1600" dirty="0">
                 <a:solidFill>
                   <a:schemeClr val="bg1"/>
                 </a:solidFill>
               </a:rPr>
               <a:t>d:Delete</a:t>
-            </a:r>
-            <a:r>
-              <a:rPr lang="en-US" sz="1600" dirty="0">
-                <a:solidFill>
-                  <a:schemeClr val="bg1"/>
-                </a:solidFill>
-              </a:rPr>
-              <a:t/>
             </a:r>
             <a:br>
               <a:rPr lang="en-US" sz="1600" dirty="0">
@@ -13012,18 +12912,13 @@
           <a:p>
             <a:pPr algn="r"/>
             <a:r>
-              <a:rPr lang="en-US" sz="1400" dirty="0" smtClean="0">
+              <a:rPr lang="en-US" sz="1400" dirty="0">
                 <a:solidFill>
                   <a:srgbClr val="0070C0"/>
                 </a:solidFill>
               </a:rPr>
               <a:t>execute(“delete 1”)</a:t>
             </a:r>
-            <a:endParaRPr lang="en-US" sz="1400" dirty="0">
-              <a:solidFill>
-                <a:srgbClr val="0070C0"/>
-              </a:solidFill>
-            </a:endParaRPr>
           </a:p>
         </p:txBody>
       </p:sp>
@@ -13613,26 +13508,21 @@
           </a:lstStyle>
           <a:p>
             <a:r>
-              <a:rPr lang="en-US" dirty="0" err="1" smtClean="0">
+              <a:rPr lang="en-US" dirty="0" err="1">
                 <a:solidFill>
                   <a:srgbClr val="7030A0"/>
                 </a:solidFill>
               </a:rPr>
-              <a:t>deletePerson</a:t>
-            </a:r>
-            <a:r>
-              <a:rPr lang="en-US" dirty="0" smtClean="0">
+              <a:t>deleteTask</a:t>
+            </a:r>
+            <a:r>
+              <a:rPr lang="en-US" dirty="0">
                 <a:solidFill>
                   <a:srgbClr val="7030A0"/>
                 </a:solidFill>
               </a:rPr>
               <a:t>(p)</a:t>
             </a:r>
-            <a:endParaRPr lang="en-US" dirty="0">
-              <a:solidFill>
-                <a:srgbClr val="7030A0"/>
-              </a:solidFill>
-            </a:endParaRPr>
           </a:p>
         </p:txBody>
       </p:sp>
@@ -13670,10 +13560,9 @@
           </a:lstStyle>
           <a:p>
             <a:r>
-              <a:rPr lang="en-US" dirty="0" smtClean="0"/>
+              <a:rPr lang="en-US" dirty="0"/>
               <a:t>create()</a:t>
             </a:r>
-            <a:endParaRPr lang="en-US" dirty="0"/>
           </a:p>
         </p:txBody>
       </p:sp>
@@ -13711,10 +13600,9 @@
           </a:lstStyle>
           <a:p>
             <a:r>
-              <a:rPr lang="en-US" dirty="0" smtClean="0"/>
+              <a:rPr lang="en-US" dirty="0"/>
               <a:t>parse(“delete 1”)</a:t>
             </a:r>
-            <a:endParaRPr lang="en-US" dirty="0"/>
           </a:p>
         </p:txBody>
       </p:sp>
@@ -13752,10 +13640,9 @@
           </a:lstStyle>
           <a:p>
             <a:r>
-              <a:rPr lang="en-US" dirty="0" smtClean="0"/>
+              <a:rPr lang="en-US" dirty="0"/>
               <a:t>result</a:t>
             </a:r>
-            <a:endParaRPr lang="en-US" dirty="0"/>
           </a:p>
         </p:txBody>
       </p:sp>
@@ -13793,10 +13680,9 @@
           </a:lstStyle>
           <a:p>
             <a:r>
-              <a:rPr lang="en-US" dirty="0" smtClean="0"/>
+              <a:rPr lang="en-US" dirty="0"/>
               <a:t>result</a:t>
             </a:r>
-            <a:endParaRPr lang="en-US" dirty="0"/>
           </a:p>
         </p:txBody>
       </p:sp>
@@ -13844,7 +13730,7 @@
           <a:p>
             <a:pPr algn="ctr"/>
             <a:r>
-              <a:rPr lang="en-US" sz="1600" dirty="0" smtClean="0">
+              <a:rPr lang="en-US" sz="1600" dirty="0">
                 <a:solidFill>
                   <a:schemeClr val="bg1"/>
                 </a:solidFill>
@@ -13852,14 +13738,14 @@
               <a:t>result:</a:t>
             </a:r>
             <a:br>
-              <a:rPr lang="en-US" sz="1600" dirty="0" smtClean="0">
+              <a:rPr lang="en-US" sz="1600" dirty="0">
                 <a:solidFill>
                   <a:schemeClr val="bg1"/>
                 </a:solidFill>
               </a:rPr>
             </a:br>
             <a:r>
-              <a:rPr lang="en-US" sz="1600" dirty="0" err="1" smtClean="0">
+              <a:rPr lang="en-US" sz="1600" dirty="0" err="1">
                 <a:solidFill>
                   <a:schemeClr val="bg1"/>
                 </a:solidFill>
@@ -14029,10 +13915,9 @@
           </a:lstStyle>
           <a:p>
             <a:r>
-              <a:rPr lang="en-US" dirty="0" smtClean="0"/>
+              <a:rPr lang="en-US" dirty="0"/>
               <a:t>d</a:t>
             </a:r>
-            <a:endParaRPr lang="en-US" dirty="0"/>
           </a:p>
         </p:txBody>
       </p:sp>
@@ -14112,7 +13997,7 @@
           <a:lstStyle/>
           <a:p>
             <a:r>
-              <a:rPr lang="en-US" sz="1200" b="1" dirty="0" smtClean="0">
+              <a:rPr lang="en-US" sz="1200" b="1" dirty="0">
                 <a:solidFill>
                   <a:srgbClr val="7030A0"/>
                 </a:solidFill>
@@ -14171,7 +14056,7 @@
           <a:p>
             <a:pPr algn="ctr"/>
             <a:r>
-              <a:rPr lang="en-US" sz="1050" dirty="0" err="1" smtClean="0">
+              <a:rPr lang="en-US" sz="1050" dirty="0" err="1">
                 <a:solidFill>
                   <a:schemeClr val="bg1"/>
                 </a:solidFill>
@@ -14230,7 +14115,7 @@
           <a:p>
             <a:pPr algn="ctr"/>
             <a:r>
-              <a:rPr lang="en-US" sz="1050" dirty="0" err="1" smtClean="0">
+              <a:rPr lang="en-US" sz="1050" dirty="0" err="1">
                 <a:solidFill>
                   <a:schemeClr val="bg1"/>
                 </a:solidFill>
@@ -14386,7 +14271,7 @@
           <a:p>
             <a:pPr algn="ctr"/>
             <a:r>
-              <a:rPr lang="en-US" sz="1050" dirty="0" smtClean="0">
+              <a:rPr lang="en-US" sz="1050" dirty="0">
                 <a:solidFill>
                   <a:schemeClr val="bg1"/>
                 </a:solidFill>
@@ -14752,7 +14637,7 @@
           <a:p>
             <a:pPr algn="ctr"/>
             <a:r>
-              <a:rPr lang="en-US" sz="1050" dirty="0" err="1" smtClean="0">
+              <a:rPr lang="en-US" sz="1050" dirty="0" err="1">
                 <a:solidFill>
                   <a:srgbClr val="7030A0"/>
                 </a:solidFill>
@@ -14894,7 +14779,7 @@
           <a:p>
             <a:pPr algn="ctr"/>
             <a:r>
-              <a:rPr lang="en-US" sz="1050" dirty="0" err="1" smtClean="0">
+              <a:rPr lang="en-US" sz="1050" dirty="0" err="1">
                 <a:solidFill>
                   <a:srgbClr val="7030A0"/>
                 </a:solidFill>
@@ -15038,7 +14923,7 @@
           <a:p>
             <a:pPr algn="ctr"/>
             <a:r>
-              <a:rPr lang="en-US" sz="1050" dirty="0" err="1" smtClean="0">
+              <a:rPr lang="en-US" sz="1050" dirty="0" err="1">
                 <a:solidFill>
                   <a:srgbClr val="7030A0"/>
                 </a:solidFill>
@@ -15137,7 +15022,7 @@
           <a:p>
             <a:pPr algn="ctr"/>
             <a:r>
-              <a:rPr lang="en-US" sz="1050" dirty="0" smtClean="0">
+              <a:rPr lang="en-US" sz="1050" dirty="0">
                 <a:solidFill>
                   <a:srgbClr val="7030A0"/>
                 </a:solidFill>
@@ -15279,7 +15164,7 @@
           <a:p>
             <a:pPr algn="ctr"/>
             <a:r>
-              <a:rPr lang="en-US" sz="1050" dirty="0" smtClean="0">
+              <a:rPr lang="en-US" sz="1050" dirty="0">
                 <a:solidFill>
                   <a:srgbClr val="7030A0"/>
                 </a:solidFill>
@@ -15421,7 +15306,7 @@
           <a:p>
             <a:pPr algn="ctr"/>
             <a:r>
-              <a:rPr lang="en-US" sz="1050" dirty="0" smtClean="0">
+              <a:rPr lang="en-US" sz="1050" dirty="0">
                 <a:solidFill>
                   <a:srgbClr val="7030A0"/>
                 </a:solidFill>
@@ -15429,14 +15314,14 @@
               <a:t>&lt;&lt;interface&gt;&gt;</a:t>
             </a:r>
             <a:br>
-              <a:rPr lang="en-US" sz="1050" dirty="0" smtClean="0">
+              <a:rPr lang="en-US" sz="1050" dirty="0">
                 <a:solidFill>
                   <a:srgbClr val="7030A0"/>
                 </a:solidFill>
               </a:rPr>
             </a:br>
             <a:r>
-              <a:rPr lang="en-US" sz="1050" dirty="0" err="1" smtClean="0">
+              <a:rPr lang="en-US" sz="1050" dirty="0" err="1">
                 <a:solidFill>
                   <a:srgbClr val="7030A0"/>
                 </a:solidFill>
@@ -15492,7 +15377,7 @@
           <a:p>
             <a:pPr algn="ctr"/>
             <a:r>
-              <a:rPr lang="en-US" sz="1050" dirty="0" smtClean="0">
+              <a:rPr lang="en-US" sz="1050" dirty="0">
                 <a:solidFill>
                   <a:srgbClr val="7030A0"/>
                 </a:solidFill>
@@ -15636,7 +15521,7 @@
           <a:p>
             <a:pPr algn="ctr"/>
             <a:r>
-              <a:rPr lang="en-US" sz="1050" dirty="0" smtClean="0">
+              <a:rPr lang="en-US" sz="1050" dirty="0">
                 <a:solidFill>
                   <a:srgbClr val="7030A0"/>
                 </a:solidFill>
@@ -15733,7 +15618,7 @@
           <a:p>
             <a:pPr algn="ctr"/>
             <a:r>
-              <a:rPr lang="en-US" sz="1050" dirty="0" smtClean="0">
+              <a:rPr lang="en-US" sz="1050" dirty="0">
                 <a:solidFill>
                   <a:srgbClr val="7030A0"/>
                 </a:solidFill>
@@ -15830,7 +15715,7 @@
           <a:p>
             <a:pPr algn="ctr"/>
             <a:r>
-              <a:rPr lang="en-US" sz="1050" dirty="0" smtClean="0">
+              <a:rPr lang="en-US" sz="1050" dirty="0">
                 <a:solidFill>
                   <a:srgbClr val="7030A0"/>
                 </a:solidFill>
@@ -16018,130 +15903,12 @@
           <a:p>
             <a:pPr algn="ctr"/>
             <a:r>
-              <a:rPr lang="en-US" sz="1050" dirty="0" smtClean="0">
+              <a:rPr lang="en-US" sz="1050" dirty="0">
                 <a:solidFill>
                   <a:srgbClr val="7030A0"/>
                 </a:solidFill>
               </a:rPr>
               <a:t>&lt;&lt;interface&gt;&gt;</a:t>
-            </a:r>
-            <a:br>
-              <a:rPr lang="en-US" sz="1050" dirty="0" smtClean="0">
-                <a:solidFill>
-                  <a:srgbClr val="7030A0"/>
-                </a:solidFill>
-              </a:rPr>
-            </a:br>
-            <a:r>
-              <a:rPr lang="en-US" sz="1050" dirty="0" err="1" smtClean="0">
-                <a:solidFill>
-                  <a:srgbClr val="7030A0"/>
-                </a:solidFill>
-              </a:rPr>
-              <a:t>ReadOnlyAddressBook</a:t>
-            </a:r>
-            <a:endParaRPr lang="en-SG" sz="1050" dirty="0">
-              <a:solidFill>
-                <a:srgbClr val="7030A0"/>
-              </a:solidFill>
-            </a:endParaRPr>
-          </a:p>
-        </p:txBody>
-      </p:sp>
-      <p:sp>
-        <p:nvSpPr>
-          <p:cNvPr id="114" name="TextBox 113"/>
-          <p:cNvSpPr txBox="1"/>
-          <p:nvPr/>
-        </p:nvSpPr>
-        <p:spPr>
-          <a:xfrm rot="16200000">
-            <a:off x="6581354" y="3514530"/>
-            <a:ext cx="881018" cy="261610"/>
-          </a:xfrm>
-          <a:prstGeom prst="rect">
-            <a:avLst/>
-          </a:prstGeom>
-          <a:noFill/>
-        </p:spPr>
-        <p:txBody>
-          <a:bodyPr wrap="square" rtlCol="0">
-            <a:spAutoFit/>
-          </a:bodyPr>
-          <a:lstStyle/>
-          <a:p>
-            <a:pPr algn="r"/>
-            <a:r>
-              <a:rPr lang="en-US" sz="1100" dirty="0" smtClean="0">
-                <a:solidFill>
-                  <a:srgbClr val="7030A0"/>
-                </a:solidFill>
-              </a:rPr>
-              <a:t>filtered list</a:t>
-            </a:r>
-            <a:endParaRPr lang="en-SG" sz="1100" dirty="0">
-              <a:solidFill>
-                <a:srgbClr val="7030A0"/>
-              </a:solidFill>
-            </a:endParaRPr>
-          </a:p>
-        </p:txBody>
-      </p:sp>
-      <p:sp>
-        <p:nvSpPr>
-          <p:cNvPr id="122" name="Rectangle 8"/>
-          <p:cNvSpPr/>
-          <p:nvPr/>
-        </p:nvSpPr>
-        <p:spPr>
-          <a:xfrm>
-            <a:off x="2057400" y="4239491"/>
-            <a:ext cx="1775949" cy="346760"/>
-          </a:xfrm>
-          <a:prstGeom prst="rect">
-            <a:avLst/>
-          </a:prstGeom>
-          <a:ln w="19050">
-            <a:solidFill>
-              <a:srgbClr val="7030A0"/>
-            </a:solidFill>
-          </a:ln>
-          <a:effectLst/>
-        </p:spPr>
-        <p:style>
-          <a:lnRef idx="1">
-            <a:schemeClr val="accent4"/>
-          </a:lnRef>
-          <a:fillRef idx="2">
-            <a:schemeClr val="accent4"/>
-          </a:fillRef>
-          <a:effectRef idx="1">
-            <a:schemeClr val="accent4"/>
-          </a:effectRef>
-          <a:fontRef idx="minor">
-            <a:schemeClr val="dk1"/>
-          </a:fontRef>
-        </p:style>
-        <p:txBody>
-          <a:bodyPr rtlCol="0" anchor="ctr"/>
-          <a:lstStyle/>
-          <a:p>
-            <a:pPr algn="ctr"/>
-            <a:r>
-              <a:rPr lang="en-US" sz="1050" dirty="0" smtClean="0">
-                <a:solidFill>
-                  <a:srgbClr val="7030A0"/>
-                </a:solidFill>
-              </a:rPr>
-              <a:t>&lt;&lt;interface&gt;&gt;</a:t>
-            </a:r>
-            <a:r>
-              <a:rPr lang="en-US" sz="1050" dirty="0">
-                <a:solidFill>
-                  <a:srgbClr val="7030A0"/>
-                </a:solidFill>
-              </a:rPr>
-              <a:t/>
             </a:r>
             <a:br>
               <a:rPr lang="en-US" sz="1050" dirty="0">
@@ -16151,7 +15918,117 @@
               </a:rPr>
             </a:br>
             <a:r>
-              <a:rPr lang="en-US" sz="1050" dirty="0" err="1" smtClean="0">
+              <a:rPr lang="en-US" sz="1050" dirty="0" err="1">
+                <a:solidFill>
+                  <a:srgbClr val="7030A0"/>
+                </a:solidFill>
+              </a:rPr>
+              <a:t>ReadOnlyAddressBook</a:t>
+            </a:r>
+            <a:endParaRPr lang="en-SG" sz="1050" dirty="0">
+              <a:solidFill>
+                <a:srgbClr val="7030A0"/>
+              </a:solidFill>
+            </a:endParaRPr>
+          </a:p>
+        </p:txBody>
+      </p:sp>
+      <p:sp>
+        <p:nvSpPr>
+          <p:cNvPr id="114" name="TextBox 113"/>
+          <p:cNvSpPr txBox="1"/>
+          <p:nvPr/>
+        </p:nvSpPr>
+        <p:spPr>
+          <a:xfrm rot="16200000">
+            <a:off x="6581354" y="3514530"/>
+            <a:ext cx="881018" cy="261610"/>
+          </a:xfrm>
+          <a:prstGeom prst="rect">
+            <a:avLst/>
+          </a:prstGeom>
+          <a:noFill/>
+        </p:spPr>
+        <p:txBody>
+          <a:bodyPr wrap="square" rtlCol="0">
+            <a:spAutoFit/>
+          </a:bodyPr>
+          <a:lstStyle/>
+          <a:p>
+            <a:pPr algn="r"/>
+            <a:r>
+              <a:rPr lang="en-US" sz="1100" dirty="0">
+                <a:solidFill>
+                  <a:srgbClr val="7030A0"/>
+                </a:solidFill>
+              </a:rPr>
+              <a:t>filtered list</a:t>
+            </a:r>
+            <a:endParaRPr lang="en-SG" sz="1100" dirty="0">
+              <a:solidFill>
+                <a:srgbClr val="7030A0"/>
+              </a:solidFill>
+            </a:endParaRPr>
+          </a:p>
+        </p:txBody>
+      </p:sp>
+      <p:sp>
+        <p:nvSpPr>
+          <p:cNvPr id="122" name="Rectangle 8"/>
+          <p:cNvSpPr/>
+          <p:nvPr/>
+        </p:nvSpPr>
+        <p:spPr>
+          <a:xfrm>
+            <a:off x="2057400" y="4239491"/>
+            <a:ext cx="1775949" cy="346760"/>
+          </a:xfrm>
+          <a:prstGeom prst="rect">
+            <a:avLst/>
+          </a:prstGeom>
+          <a:ln w="19050">
+            <a:solidFill>
+              <a:srgbClr val="7030A0"/>
+            </a:solidFill>
+          </a:ln>
+          <a:effectLst/>
+        </p:spPr>
+        <p:style>
+          <a:lnRef idx="1">
+            <a:schemeClr val="accent4"/>
+          </a:lnRef>
+          <a:fillRef idx="2">
+            <a:schemeClr val="accent4"/>
+          </a:fillRef>
+          <a:effectRef idx="1">
+            <a:schemeClr val="accent4"/>
+          </a:effectRef>
+          <a:fontRef idx="minor">
+            <a:schemeClr val="dk1"/>
+          </a:fontRef>
+        </p:style>
+        <p:txBody>
+          <a:bodyPr rtlCol="0" anchor="ctr"/>
+          <a:lstStyle/>
+          <a:p>
+            <a:pPr algn="ctr"/>
+            <a:r>
+              <a:rPr lang="en-US" sz="1050" dirty="0">
+                <a:solidFill>
+                  <a:srgbClr val="7030A0"/>
+                </a:solidFill>
+              </a:rPr>
+              <a:t>&lt;&lt;interface&gt;&gt;</a:t>
+            </a:r>
+            <a:br>
+              <a:rPr lang="en-US" sz="1050" dirty="0">
+                <a:solidFill>
+                  <a:srgbClr val="7030A0"/>
+                </a:solidFill>
+              </a:rPr>
+            </a:br>
+            <a:r>
+              <a:rPr lang="en-US" sz="1050" dirty="0" err="1">
                 <a:solidFill>
                   <a:srgbClr val="7030A0"/>
                 </a:solidFill>
@@ -16218,13 +16095,6 @@
   <p:clrMapOvr>
     <a:masterClrMapping/>
   </p:clrMapOvr>
-  <p:timing>
-    <p:tnLst>
-      <p:par>
-        <p:cTn id="1" dur="indefinite" restart="never" nodeType="tmRoot"/>
-      </p:par>
-    </p:tnLst>
-  </p:timing>
 </p:sld>
 </file>
 
@@ -16291,7 +16161,7 @@
           <a:lstStyle/>
           <a:p>
             <a:r>
-              <a:rPr lang="en-US" sz="1200" b="1" dirty="0" smtClean="0">
+              <a:rPr lang="en-US" sz="1200" b="1" dirty="0">
                 <a:solidFill>
                   <a:schemeClr val="accent6">
                     <a:lumMod val="75000"/>
@@ -16358,147 +16228,6 @@
           <a:p>
             <a:pPr algn="ctr"/>
             <a:r>
-              <a:rPr lang="en-US" sz="1050" dirty="0" smtClean="0">
-                <a:solidFill>
-                  <a:schemeClr val="bg1"/>
-                </a:solidFill>
-              </a:rPr>
-              <a:t>&lt;&lt;interface&gt;&gt;</a:t>
-            </a:r>
-            <a:br>
-              <a:rPr lang="en-US" sz="1050" dirty="0" smtClean="0">
-                <a:solidFill>
-                  <a:schemeClr val="bg1"/>
-                </a:solidFill>
-              </a:rPr>
-            </a:br>
-            <a:r>
-              <a:rPr lang="en-US" sz="1050" dirty="0" err="1" smtClean="0">
-                <a:solidFill>
-                  <a:schemeClr val="bg1"/>
-                </a:solidFill>
-              </a:rPr>
-              <a:t>AddressBookStorage</a:t>
-            </a:r>
-            <a:endParaRPr lang="en-SG" sz="1050" dirty="0">
-              <a:solidFill>
-                <a:schemeClr val="bg1"/>
-              </a:solidFill>
-            </a:endParaRPr>
-          </a:p>
-        </p:txBody>
-      </p:sp>
-      <p:sp>
-        <p:nvSpPr>
-          <p:cNvPr id="9" name="Rectangle 62"/>
-          <p:cNvSpPr/>
-          <p:nvPr/>
-        </p:nvSpPr>
-        <p:spPr>
-          <a:xfrm rot="16200000">
-            <a:off x="1683963" y="2868687"/>
-            <a:ext cx="1093635" cy="346760"/>
-          </a:xfrm>
-          <a:prstGeom prst="rect">
-            <a:avLst/>
-          </a:prstGeom>
-          <a:solidFill>
-            <a:schemeClr val="accent6">
-              <a:lumMod val="75000"/>
-            </a:schemeClr>
-          </a:solidFill>
-          <a:ln w="19050">
-            <a:solidFill>
-              <a:schemeClr val="accent6">
-                <a:lumMod val="75000"/>
-              </a:schemeClr>
-            </a:solidFill>
-          </a:ln>
-          <a:effectLst/>
-        </p:spPr>
-        <p:style>
-          <a:lnRef idx="1">
-            <a:schemeClr val="accent2"/>
-          </a:lnRef>
-          <a:fillRef idx="2">
-            <a:schemeClr val="accent2"/>
-          </a:fillRef>
-          <a:effectRef idx="1">
-            <a:schemeClr val="accent2"/>
-          </a:effectRef>
-          <a:fontRef idx="minor">
-            <a:schemeClr val="dk1"/>
-          </a:fontRef>
-        </p:style>
-        <p:txBody>
-          <a:bodyPr rtlCol="0" anchor="ctr"/>
-          <a:lstStyle/>
-          <a:p>
-            <a:pPr algn="ctr"/>
-            <a:r>
-              <a:rPr lang="en-US" sz="1050" dirty="0" err="1" smtClean="0">
-                <a:solidFill>
-                  <a:schemeClr val="bg1"/>
-                </a:solidFill>
-              </a:rPr>
-              <a:t>StorageManager</a:t>
-            </a:r>
-            <a:endParaRPr lang="en-SG" sz="1050" dirty="0">
-              <a:solidFill>
-                <a:schemeClr val="bg1"/>
-              </a:solidFill>
-            </a:endParaRPr>
-          </a:p>
-        </p:txBody>
-      </p:sp>
-      <p:sp>
-        <p:nvSpPr>
-          <p:cNvPr id="119" name="Rectangle 62"/>
-          <p:cNvSpPr/>
-          <p:nvPr/>
-        </p:nvSpPr>
-        <p:spPr>
-          <a:xfrm rot="16200000">
-            <a:off x="956202" y="2861202"/>
-            <a:ext cx="1093635" cy="346760"/>
-          </a:xfrm>
-          <a:prstGeom prst="rect">
-            <a:avLst/>
-          </a:prstGeom>
-          <a:solidFill>
-            <a:schemeClr val="accent6">
-              <a:lumMod val="75000"/>
-            </a:schemeClr>
-          </a:solidFill>
-          <a:ln w="19050">
-            <a:solidFill>
-              <a:schemeClr val="accent6">
-                <a:lumMod val="75000"/>
-              </a:schemeClr>
-            </a:solidFill>
-          </a:ln>
-          <a:effectLst/>
-        </p:spPr>
-        <p:style>
-          <a:lnRef idx="1">
-            <a:schemeClr val="accent2"/>
-          </a:lnRef>
-          <a:fillRef idx="2">
-            <a:schemeClr val="accent2"/>
-          </a:fillRef>
-          <a:effectRef idx="1">
-            <a:schemeClr val="accent2"/>
-          </a:effectRef>
-          <a:fontRef idx="minor">
-            <a:schemeClr val="dk1"/>
-          </a:fontRef>
-        </p:style>
-        <p:txBody>
-          <a:bodyPr rtlCol="0" anchor="ctr"/>
-          <a:lstStyle/>
-          <a:p>
-            <a:pPr algn="ctr"/>
-            <a:r>
               <a:rPr lang="en-US" sz="1050" dirty="0">
                 <a:solidFill>
                   <a:schemeClr val="bg1"/>
@@ -16506,11 +16235,152 @@
               </a:rPr>
               <a:t>&lt;&lt;interface&gt;&gt;</a:t>
             </a:r>
-          </a:p>
+            <a:br>
+              <a:rPr lang="en-US" sz="1050" dirty="0">
+                <a:solidFill>
+                  <a:schemeClr val="bg1"/>
+                </a:solidFill>
+              </a:rPr>
+            </a:br>
+            <a:r>
+              <a:rPr lang="en-US" sz="1050" dirty="0" err="1">
+                <a:solidFill>
+                  <a:schemeClr val="bg1"/>
+                </a:solidFill>
+              </a:rPr>
+              <a:t>AddressBookStorage</a:t>
+            </a:r>
+            <a:endParaRPr lang="en-SG" sz="1050" dirty="0">
+              <a:solidFill>
+                <a:schemeClr val="bg1"/>
+              </a:solidFill>
+            </a:endParaRPr>
+          </a:p>
+        </p:txBody>
+      </p:sp>
+      <p:sp>
+        <p:nvSpPr>
+          <p:cNvPr id="9" name="Rectangle 62"/>
+          <p:cNvSpPr/>
+          <p:nvPr/>
+        </p:nvSpPr>
+        <p:spPr>
+          <a:xfrm rot="16200000">
+            <a:off x="1683963" y="2868687"/>
+            <a:ext cx="1093635" cy="346760"/>
+          </a:xfrm>
+          <a:prstGeom prst="rect">
+            <a:avLst/>
+          </a:prstGeom>
+          <a:solidFill>
+            <a:schemeClr val="accent6">
+              <a:lumMod val="75000"/>
+            </a:schemeClr>
+          </a:solidFill>
+          <a:ln w="19050">
+            <a:solidFill>
+              <a:schemeClr val="accent6">
+                <a:lumMod val="75000"/>
+              </a:schemeClr>
+            </a:solidFill>
+          </a:ln>
+          <a:effectLst/>
+        </p:spPr>
+        <p:style>
+          <a:lnRef idx="1">
+            <a:schemeClr val="accent2"/>
+          </a:lnRef>
+          <a:fillRef idx="2">
+            <a:schemeClr val="accent2"/>
+          </a:fillRef>
+          <a:effectRef idx="1">
+            <a:schemeClr val="accent2"/>
+          </a:effectRef>
+          <a:fontRef idx="minor">
+            <a:schemeClr val="dk1"/>
+          </a:fontRef>
+        </p:style>
+        <p:txBody>
+          <a:bodyPr rtlCol="0" anchor="ctr"/>
+          <a:lstStyle/>
           <a:p>
             <a:pPr algn="ctr"/>
             <a:r>
-              <a:rPr lang="en-US" sz="1050" dirty="0" smtClean="0">
+              <a:rPr lang="en-US" sz="1050" dirty="0" err="1">
+                <a:solidFill>
+                  <a:schemeClr val="bg1"/>
+                </a:solidFill>
+              </a:rPr>
+              <a:t>StorageManager</a:t>
+            </a:r>
+            <a:endParaRPr lang="en-SG" sz="1050" dirty="0">
+              <a:solidFill>
+                <a:schemeClr val="bg1"/>
+              </a:solidFill>
+            </a:endParaRPr>
+          </a:p>
+        </p:txBody>
+      </p:sp>
+      <p:sp>
+        <p:nvSpPr>
+          <p:cNvPr id="119" name="Rectangle 62"/>
+          <p:cNvSpPr/>
+          <p:nvPr/>
+        </p:nvSpPr>
+        <p:spPr>
+          <a:xfrm rot="16200000">
+            <a:off x="956202" y="2861202"/>
+            <a:ext cx="1093635" cy="346760"/>
+          </a:xfrm>
+          <a:prstGeom prst="rect">
+            <a:avLst/>
+          </a:prstGeom>
+          <a:solidFill>
+            <a:schemeClr val="accent6">
+              <a:lumMod val="75000"/>
+            </a:schemeClr>
+          </a:solidFill>
+          <a:ln w="19050">
+            <a:solidFill>
+              <a:schemeClr val="accent6">
+                <a:lumMod val="75000"/>
+              </a:schemeClr>
+            </a:solidFill>
+          </a:ln>
+          <a:effectLst/>
+        </p:spPr>
+        <p:style>
+          <a:lnRef idx="1">
+            <a:schemeClr val="accent2"/>
+          </a:lnRef>
+          <a:fillRef idx="2">
+            <a:schemeClr val="accent2"/>
+          </a:fillRef>
+          <a:effectRef idx="1">
+            <a:schemeClr val="accent2"/>
+          </a:effectRef>
+          <a:fontRef idx="minor">
+            <a:schemeClr val="dk1"/>
+          </a:fontRef>
+        </p:style>
+        <p:txBody>
+          <a:bodyPr rtlCol="0" anchor="ctr"/>
+          <a:lstStyle/>
+          <a:p>
+            <a:pPr algn="ctr"/>
+            <a:r>
+              <a:rPr lang="en-US" sz="1050" dirty="0">
+                <a:solidFill>
+                  <a:schemeClr val="bg1"/>
+                </a:solidFill>
+              </a:rPr>
+              <a:t>&lt;&lt;interface&gt;&gt;</a:t>
+            </a:r>
+          </a:p>
+          <a:p>
+            <a:pPr algn="ctr"/>
+            <a:r>
+              <a:rPr lang="en-US" sz="1050" dirty="0">
                 <a:solidFill>
                   <a:schemeClr val="bg1"/>
                 </a:solidFill>
@@ -16944,7 +16814,7 @@
           <a:p>
             <a:pPr algn="ctr"/>
             <a:r>
-              <a:rPr lang="en-US" sz="1050" b="1" dirty="0" err="1" smtClean="0">
+              <a:rPr lang="en-US" sz="1050" b="1" dirty="0" err="1">
                 <a:solidFill>
                   <a:schemeClr val="accent6">
                     <a:lumMod val="75000"/>
@@ -16953,18 +16823,8 @@
               </a:rPr>
               <a:t>XmlAddressBook</a:t>
             </a:r>
-            <a:r>
-              <a:rPr lang="en-US" sz="1050" b="1" dirty="0" smtClean="0">
-                <a:solidFill>
-                  <a:schemeClr val="accent6">
-                    <a:lumMod val="75000"/>
-                  </a:schemeClr>
-                </a:solidFill>
-              </a:rPr>
-              <a:t/>
-            </a:r>
             <a:br>
-              <a:rPr lang="en-US" sz="1050" b="1" dirty="0" smtClean="0">
+              <a:rPr lang="en-US" sz="1050" b="1" dirty="0">
                 <a:solidFill>
                   <a:schemeClr val="accent6">
                     <a:lumMod val="75000"/>
@@ -16973,7 +16833,7 @@
               </a:rPr>
             </a:br>
             <a:r>
-              <a:rPr lang="en-US" sz="1050" b="1" dirty="0" smtClean="0">
+              <a:rPr lang="en-US" sz="1050" b="1" dirty="0">
                 <a:solidFill>
                   <a:schemeClr val="accent6">
                     <a:lumMod val="75000"/>
@@ -17040,7 +16900,7 @@
           <a:p>
             <a:pPr algn="ctr"/>
             <a:r>
-              <a:rPr lang="en-US" sz="1050" dirty="0" smtClean="0">
+              <a:rPr lang="en-US" sz="1050" dirty="0">
                 <a:solidFill>
                   <a:schemeClr val="bg1"/>
                 </a:solidFill>
@@ -17048,14 +16908,14 @@
               <a:t>&lt;&lt;interface&gt;&gt;</a:t>
             </a:r>
             <a:br>
-              <a:rPr lang="en-US" sz="1050" dirty="0" smtClean="0">
+              <a:rPr lang="en-US" sz="1050" dirty="0">
                 <a:solidFill>
                   <a:schemeClr val="bg1"/>
                 </a:solidFill>
               </a:rPr>
             </a:br>
             <a:r>
-              <a:rPr lang="en-US" sz="1050" dirty="0" err="1" smtClean="0">
+              <a:rPr lang="en-US" sz="1050" dirty="0" err="1">
                 <a:solidFill>
                   <a:schemeClr val="bg1"/>
                 </a:solidFill>
@@ -17313,30 +17173,22 @@
           <a:p>
             <a:pPr algn="ctr"/>
             <a:r>
-              <a:rPr lang="en-US" sz="1050" dirty="0" err="1" smtClean="0">
+              <a:rPr lang="en-US" sz="1050" dirty="0" err="1">
                 <a:solidFill>
                   <a:schemeClr val="bg1"/>
                 </a:solidFill>
               </a:rPr>
               <a:t>JsonUserPrefs</a:t>
             </a:r>
-            <a:r>
-              <a:rPr lang="en-US" sz="1050" dirty="0" smtClean="0">
-                <a:solidFill>
-                  <a:schemeClr val="bg1"/>
-                </a:solidFill>
-              </a:rPr>
-              <a:t/>
-            </a:r>
             <a:br>
-              <a:rPr lang="en-US" sz="1050" dirty="0" smtClean="0">
+              <a:rPr lang="en-US" sz="1050" dirty="0">
                 <a:solidFill>
                   <a:schemeClr val="bg1"/>
                 </a:solidFill>
               </a:rPr>
             </a:br>
             <a:r>
-              <a:rPr lang="en-US" sz="1050" dirty="0" smtClean="0">
+              <a:rPr lang="en-US" sz="1050" dirty="0">
                 <a:solidFill>
                   <a:schemeClr val="bg1"/>
                 </a:solidFill>
@@ -17388,7 +17240,7 @@
           <a:p>
             <a:pPr algn="ctr"/>
             <a:r>
-              <a:rPr lang="en-US" sz="1050" b="1" dirty="0" err="1" smtClean="0">
+              <a:rPr lang="en-US" sz="1050" b="1" dirty="0" err="1">
                 <a:solidFill>
                   <a:schemeClr val="accent6">
                     <a:lumMod val="75000"/>
@@ -17397,18 +17249,8 @@
               </a:rPr>
               <a:t>XmlSerializable</a:t>
             </a:r>
-            <a:r>
-              <a:rPr lang="en-US" sz="1050" b="1" dirty="0" smtClean="0">
-                <a:solidFill>
-                  <a:schemeClr val="accent6">
-                    <a:lumMod val="75000"/>
-                  </a:schemeClr>
-                </a:solidFill>
-              </a:rPr>
-              <a:t/>
-            </a:r>
             <a:br>
-              <a:rPr lang="en-US" sz="1050" b="1" dirty="0" smtClean="0">
+              <a:rPr lang="en-US" sz="1050" b="1" dirty="0">
                 <a:solidFill>
                   <a:schemeClr val="accent6">
                     <a:lumMod val="75000"/>
@@ -17417,7 +17259,7 @@
               </a:rPr>
             </a:br>
             <a:r>
-              <a:rPr lang="en-US" sz="1050" b="1" dirty="0" err="1" smtClean="0">
+              <a:rPr lang="en-US" sz="1050" b="1" dirty="0" err="1">
                 <a:solidFill>
                   <a:schemeClr val="accent6">
                     <a:lumMod val="75000"/>
@@ -17514,7 +17356,7 @@
           <a:p>
             <a:pPr algn="ctr"/>
             <a:r>
-              <a:rPr lang="en-US" sz="1050" b="1" dirty="0" err="1" smtClean="0">
+              <a:rPr lang="en-US" sz="1050" b="1" dirty="0" err="1">
                 <a:solidFill>
                   <a:schemeClr val="accent6">
                     <a:lumMod val="75000"/>
@@ -17570,7 +17412,7 @@
           <a:p>
             <a:pPr algn="ctr"/>
             <a:r>
-              <a:rPr lang="en-US" sz="1050" b="1" dirty="0" err="1" smtClean="0">
+              <a:rPr lang="en-US" sz="1050" b="1" dirty="0" err="1">
                 <a:solidFill>
                   <a:schemeClr val="accent6">
                     <a:lumMod val="75000"/>
@@ -17640,13 +17482,6 @@
   <p:clrMapOvr>
     <a:masterClrMapping/>
   </p:clrMapOvr>
-  <p:timing>
-    <p:tnLst>
-      <p:par>
-        <p:cTn id="1" dur="indefinite" restart="never" nodeType="tmRoot"/>
-      </p:par>
-    </p:tnLst>
-  </p:timing>
 </p:sld>
 </file>
 

</xml_diff>

<commit_message>
Edit a big error in the diagram
</commit_message>
<xml_diff>
--- a/docs/diagrams/Diagrams.pptx
+++ b/docs/diagrams/Diagrams.pptx
@@ -5,7 +5,7 @@
     <p:sldMasterId id="2147483648" r:id="rId1"/>
   </p:sldMasterIdLst>
   <p:notesMasterIdLst>
-    <p:notesMasterId r:id="rId11"/>
+    <p:notesMasterId r:id="rId10"/>
   </p:notesMasterIdLst>
   <p:sldIdLst>
     <p:sldId id="256" r:id="rId2"/>
@@ -16,7 +16,6 @@
     <p:sldId id="267" r:id="rId7"/>
     <p:sldId id="263" r:id="rId8"/>
     <p:sldId id="264" r:id="rId9"/>
-    <p:sldId id="265" r:id="rId10"/>
   </p:sldIdLst>
   <p:sldSz cx="9144000" cy="6858000" type="screen4x3"/>
   <p:notesSz cx="6858000" cy="9144000"/>
@@ -3550,12 +3549,8 @@
           <a:lstStyle/>
           <a:p>
             <a:r>
-              <a:rPr lang="en-US" dirty="0" err="1"/>
-              <a:t>AddressBook</a:t>
-            </a:r>
-            <a:r>
               <a:rPr lang="en-US" dirty="0"/>
-              <a:t> – Level 4</a:t>
+              <a:t>Doer List</a:t>
             </a:r>
           </a:p>
         </p:txBody>
@@ -17476,36 +17471,6 @@
     <p:extLst>
       <p:ext uri="{BB962C8B-B14F-4D97-AF65-F5344CB8AC3E}">
         <p14:creationId xmlns:p14="http://schemas.microsoft.com/office/powerpoint/2010/main" val="1478832369"/>
-      </p:ext>
-    </p:extLst>
-  </p:cSld>
-  <p:clrMapOvr>
-    <a:masterClrMapping/>
-  </p:clrMapOvr>
-</p:sld>
-</file>
-
-<file path=ppt/slides/slide9.xml><?xml version="1.0" encoding="utf-8"?>
-<p:sld xmlns:a="http://schemas.openxmlformats.org/drawingml/2006/main" xmlns:r="http://schemas.openxmlformats.org/officeDocument/2006/relationships" xmlns:p="http://schemas.openxmlformats.org/presentationml/2006/main">
-  <p:cSld>
-    <p:spTree>
-      <p:nvGrpSpPr>
-        <p:cNvPr id="1" name=""/>
-        <p:cNvGrpSpPr/>
-        <p:nvPr/>
-      </p:nvGrpSpPr>
-      <p:grpSpPr>
-        <a:xfrm>
-          <a:off x="0" y="0"/>
-          <a:ext cx="0" cy="0"/>
-          <a:chOff x="0" y="0"/>
-          <a:chExt cx="0" cy="0"/>
-        </a:xfrm>
-      </p:grpSpPr>
-    </p:spTree>
-    <p:extLst>
-      <p:ext uri="{BB962C8B-B14F-4D97-AF65-F5344CB8AC3E}">
-        <p14:creationId xmlns:p14="http://schemas.microsoft.com/office/powerpoint/2010/main" val="2978036214"/>
       </p:ext>
     </p:extLst>
   </p:cSld>

</xml_diff>

<commit_message>
Revert "Edit a big error in the diagram"
This reverts commit 3d9b31369b27ed3df54eea10af8075da18e29dce.
</commit_message>
<xml_diff>
--- a/docs/diagrams/Diagrams.pptx
+++ b/docs/diagrams/Diagrams.pptx
@@ -5,7 +5,7 @@
     <p:sldMasterId id="2147483648" r:id="rId1"/>
   </p:sldMasterIdLst>
   <p:notesMasterIdLst>
-    <p:notesMasterId r:id="rId10"/>
+    <p:notesMasterId r:id="rId11"/>
   </p:notesMasterIdLst>
   <p:sldIdLst>
     <p:sldId id="256" r:id="rId2"/>
@@ -16,6 +16,7 @@
     <p:sldId id="267" r:id="rId7"/>
     <p:sldId id="263" r:id="rId8"/>
     <p:sldId id="264" r:id="rId9"/>
+    <p:sldId id="265" r:id="rId10"/>
   </p:sldIdLst>
   <p:sldSz cx="9144000" cy="6858000" type="screen4x3"/>
   <p:notesSz cx="6858000" cy="9144000"/>
@@ -3549,8 +3550,12 @@
           <a:lstStyle/>
           <a:p>
             <a:r>
+              <a:rPr lang="en-US" dirty="0" err="1"/>
+              <a:t>AddressBook</a:t>
+            </a:r>
+            <a:r>
               <a:rPr lang="en-US" dirty="0"/>
-              <a:t>Doer List</a:t>
+              <a:t> – Level 4</a:t>
             </a:r>
           </a:p>
         </p:txBody>
@@ -17471,6 +17476,36 @@
     <p:extLst>
       <p:ext uri="{BB962C8B-B14F-4D97-AF65-F5344CB8AC3E}">
         <p14:creationId xmlns:p14="http://schemas.microsoft.com/office/powerpoint/2010/main" val="1478832369"/>
+      </p:ext>
+    </p:extLst>
+  </p:cSld>
+  <p:clrMapOvr>
+    <a:masterClrMapping/>
+  </p:clrMapOvr>
+</p:sld>
+</file>
+
+<file path=ppt/slides/slide9.xml><?xml version="1.0" encoding="utf-8"?>
+<p:sld xmlns:a="http://schemas.openxmlformats.org/drawingml/2006/main" xmlns:r="http://schemas.openxmlformats.org/officeDocument/2006/relationships" xmlns:p="http://schemas.openxmlformats.org/presentationml/2006/main">
+  <p:cSld>
+    <p:spTree>
+      <p:nvGrpSpPr>
+        <p:cNvPr id="1" name=""/>
+        <p:cNvGrpSpPr/>
+        <p:nvPr/>
+      </p:nvGrpSpPr>
+      <p:grpSpPr>
+        <a:xfrm>
+          <a:off x="0" y="0"/>
+          <a:ext cx="0" cy="0"/>
+          <a:chOff x="0" y="0"/>
+          <a:chExt cx="0" cy="0"/>
+        </a:xfrm>
+      </p:grpSpPr>
+    </p:spTree>
+    <p:extLst>
+      <p:ext uri="{BB962C8B-B14F-4D97-AF65-F5344CB8AC3E}">
+        <p14:creationId xmlns:p14="http://schemas.microsoft.com/office/powerpoint/2010/main" val="2978036214"/>
       </p:ext>
     </p:extLst>
   </p:cSld>

</xml_diff>

<commit_message>
update storage in DG
</commit_message>
<xml_diff>
--- a/docs/diagrams/Diagrams.pptx
+++ b/docs/diagrams/Diagrams.pptx
@@ -5,7 +5,7 @@
     <p:sldMasterId id="2147483648" r:id="rId1"/>
   </p:sldMasterIdLst>
   <p:notesMasterIdLst>
-    <p:notesMasterId r:id="rId9"/>
+    <p:notesMasterId r:id="rId8"/>
   </p:notesMasterIdLst>
   <p:sldIdLst>
     <p:sldId id="256" r:id="rId2"/>
@@ -13,8 +13,7 @@
     <p:sldId id="266" r:id="rId4"/>
     <p:sldId id="261" r:id="rId5"/>
     <p:sldId id="267" r:id="rId6"/>
-    <p:sldId id="264" r:id="rId7"/>
-    <p:sldId id="265" r:id="rId8"/>
+    <p:sldId id="265" r:id="rId7"/>
   </p:sldIdLst>
   <p:sldSz cx="9144000" cy="6858000" type="screen4x3"/>
   <p:notesSz cx="6858000" cy="9144000"/>
@@ -10892,1421 +10891,6 @@
 </file>
 
 <file path=ppt/slides/slide6.xml><?xml version="1.0" encoding="utf-8"?>
-<p:sld xmlns:a="http://schemas.openxmlformats.org/drawingml/2006/main" xmlns:r="http://schemas.openxmlformats.org/officeDocument/2006/relationships" xmlns:p="http://schemas.openxmlformats.org/presentationml/2006/main">
-  <p:cSld>
-    <p:spTree>
-      <p:nvGrpSpPr>
-        <p:cNvPr id="1" name=""/>
-        <p:cNvGrpSpPr/>
-        <p:nvPr/>
-      </p:nvGrpSpPr>
-      <p:grpSpPr>
-        <a:xfrm>
-          <a:off x="0" y="0"/>
-          <a:ext cx="0" cy="0"/>
-          <a:chOff x="0" y="0"/>
-          <a:chExt cx="0" cy="0"/>
-        </a:xfrm>
-      </p:grpSpPr>
-      <p:sp>
-        <p:nvSpPr>
-          <p:cNvPr id="118" name="Rectangle 65"/>
-          <p:cNvSpPr/>
-          <p:nvPr/>
-        </p:nvSpPr>
-        <p:spPr>
-          <a:xfrm>
-            <a:off x="1119865" y="2086382"/>
-            <a:ext cx="7871735" cy="1723618"/>
-          </a:xfrm>
-          <a:prstGeom prst="roundRect">
-            <a:avLst>
-              <a:gd name="adj" fmla="val 3484"/>
-            </a:avLst>
-          </a:prstGeom>
-          <a:solidFill>
-            <a:schemeClr val="accent6">
-              <a:lumMod val="20000"/>
-              <a:lumOff val="80000"/>
-            </a:schemeClr>
-          </a:solidFill>
-          <a:ln w="19050">
-            <a:noFill/>
-          </a:ln>
-          <a:effectLst/>
-        </p:spPr>
-        <p:style>
-          <a:lnRef idx="1">
-            <a:schemeClr val="accent2"/>
-          </a:lnRef>
-          <a:fillRef idx="2">
-            <a:schemeClr val="accent2"/>
-          </a:fillRef>
-          <a:effectRef idx="1">
-            <a:schemeClr val="accent2"/>
-          </a:effectRef>
-          <a:fontRef idx="minor">
-            <a:schemeClr val="dk1"/>
-          </a:fontRef>
-        </p:style>
-        <p:txBody>
-          <a:bodyPr rtlCol="0" anchor="t"/>
-          <a:lstStyle/>
-          <a:p>
-            <a:r>
-              <a:rPr lang="en-US" sz="1200" b="1" dirty="0">
-                <a:solidFill>
-                  <a:schemeClr val="accent6">
-                    <a:lumMod val="75000"/>
-                  </a:schemeClr>
-                </a:solidFill>
-              </a:rPr>
-              <a:t>Storage</a:t>
-            </a:r>
-            <a:endParaRPr lang="en-SG" sz="1200" b="1" dirty="0">
-              <a:solidFill>
-                <a:schemeClr val="accent6">
-                  <a:lumMod val="75000"/>
-                </a:schemeClr>
-              </a:solidFill>
-            </a:endParaRPr>
-          </a:p>
-        </p:txBody>
-      </p:sp>
-      <p:sp>
-        <p:nvSpPr>
-          <p:cNvPr id="2" name="Rectangle 8"/>
-          <p:cNvSpPr/>
-          <p:nvPr/>
-        </p:nvSpPr>
-        <p:spPr>
-          <a:xfrm>
-            <a:off x="2877180" y="3158440"/>
-            <a:ext cx="1323049" cy="346760"/>
-          </a:xfrm>
-          <a:prstGeom prst="rect">
-            <a:avLst/>
-          </a:prstGeom>
-          <a:solidFill>
-            <a:schemeClr val="accent6">
-              <a:lumMod val="75000"/>
-            </a:schemeClr>
-          </a:solidFill>
-          <a:ln w="19050">
-            <a:solidFill>
-              <a:schemeClr val="accent6">
-                <a:lumMod val="75000"/>
-              </a:schemeClr>
-            </a:solidFill>
-          </a:ln>
-          <a:effectLst/>
-        </p:spPr>
-        <p:style>
-          <a:lnRef idx="1">
-            <a:schemeClr val="accent2"/>
-          </a:lnRef>
-          <a:fillRef idx="2">
-            <a:schemeClr val="accent2"/>
-          </a:fillRef>
-          <a:effectRef idx="1">
-            <a:schemeClr val="accent2"/>
-          </a:effectRef>
-          <a:fontRef idx="minor">
-            <a:schemeClr val="dk1"/>
-          </a:fontRef>
-        </p:style>
-        <p:txBody>
-          <a:bodyPr rtlCol="0" anchor="ctr"/>
-          <a:lstStyle/>
-          <a:p>
-            <a:pPr algn="ctr"/>
-            <a:r>
-              <a:rPr lang="en-US" sz="1050" dirty="0">
-                <a:solidFill>
-                  <a:schemeClr val="bg1"/>
-                </a:solidFill>
-              </a:rPr>
-              <a:t>&lt;&lt;interface&gt;&gt;</a:t>
-            </a:r>
-            <a:br>
-              <a:rPr lang="en-US" sz="1050" dirty="0">
-                <a:solidFill>
-                  <a:schemeClr val="bg1"/>
-                </a:solidFill>
-              </a:rPr>
-            </a:br>
-            <a:r>
-              <a:rPr lang="en-US" sz="1050" dirty="0" err="1">
-                <a:solidFill>
-                  <a:schemeClr val="bg1"/>
-                </a:solidFill>
-              </a:rPr>
-              <a:t>AddressBookStorage</a:t>
-            </a:r>
-            <a:endParaRPr lang="en-SG" sz="1050" dirty="0">
-              <a:solidFill>
-                <a:schemeClr val="bg1"/>
-              </a:solidFill>
-            </a:endParaRPr>
-          </a:p>
-        </p:txBody>
-      </p:sp>
-      <p:sp>
-        <p:nvSpPr>
-          <p:cNvPr id="9" name="Rectangle 62"/>
-          <p:cNvSpPr/>
-          <p:nvPr/>
-        </p:nvSpPr>
-        <p:spPr>
-          <a:xfrm rot="16200000">
-            <a:off x="1683963" y="2868687"/>
-            <a:ext cx="1093635" cy="346760"/>
-          </a:xfrm>
-          <a:prstGeom prst="rect">
-            <a:avLst/>
-          </a:prstGeom>
-          <a:solidFill>
-            <a:schemeClr val="accent6">
-              <a:lumMod val="75000"/>
-            </a:schemeClr>
-          </a:solidFill>
-          <a:ln w="19050">
-            <a:solidFill>
-              <a:schemeClr val="accent6">
-                <a:lumMod val="75000"/>
-              </a:schemeClr>
-            </a:solidFill>
-          </a:ln>
-          <a:effectLst/>
-        </p:spPr>
-        <p:style>
-          <a:lnRef idx="1">
-            <a:schemeClr val="accent2"/>
-          </a:lnRef>
-          <a:fillRef idx="2">
-            <a:schemeClr val="accent2"/>
-          </a:fillRef>
-          <a:effectRef idx="1">
-            <a:schemeClr val="accent2"/>
-          </a:effectRef>
-          <a:fontRef idx="minor">
-            <a:schemeClr val="dk1"/>
-          </a:fontRef>
-        </p:style>
-        <p:txBody>
-          <a:bodyPr rtlCol="0" anchor="ctr"/>
-          <a:lstStyle/>
-          <a:p>
-            <a:pPr algn="ctr"/>
-            <a:r>
-              <a:rPr lang="en-US" sz="1050" dirty="0" err="1">
-                <a:solidFill>
-                  <a:schemeClr val="bg1"/>
-                </a:solidFill>
-              </a:rPr>
-              <a:t>StorageManager</a:t>
-            </a:r>
-            <a:endParaRPr lang="en-SG" sz="1050" dirty="0">
-              <a:solidFill>
-                <a:schemeClr val="bg1"/>
-              </a:solidFill>
-            </a:endParaRPr>
-          </a:p>
-        </p:txBody>
-      </p:sp>
-      <p:sp>
-        <p:nvSpPr>
-          <p:cNvPr id="119" name="Rectangle 62"/>
-          <p:cNvSpPr/>
-          <p:nvPr/>
-        </p:nvSpPr>
-        <p:spPr>
-          <a:xfrm rot="16200000">
-            <a:off x="956202" y="2861202"/>
-            <a:ext cx="1093635" cy="346760"/>
-          </a:xfrm>
-          <a:prstGeom prst="rect">
-            <a:avLst/>
-          </a:prstGeom>
-          <a:solidFill>
-            <a:schemeClr val="accent6">
-              <a:lumMod val="75000"/>
-            </a:schemeClr>
-          </a:solidFill>
-          <a:ln w="19050">
-            <a:solidFill>
-              <a:schemeClr val="accent6">
-                <a:lumMod val="75000"/>
-              </a:schemeClr>
-            </a:solidFill>
-          </a:ln>
-          <a:effectLst/>
-        </p:spPr>
-        <p:style>
-          <a:lnRef idx="1">
-            <a:schemeClr val="accent2"/>
-          </a:lnRef>
-          <a:fillRef idx="2">
-            <a:schemeClr val="accent2"/>
-          </a:fillRef>
-          <a:effectRef idx="1">
-            <a:schemeClr val="accent2"/>
-          </a:effectRef>
-          <a:fontRef idx="minor">
-            <a:schemeClr val="dk1"/>
-          </a:fontRef>
-        </p:style>
-        <p:txBody>
-          <a:bodyPr rtlCol="0" anchor="ctr"/>
-          <a:lstStyle/>
-          <a:p>
-            <a:pPr algn="ctr"/>
-            <a:r>
-              <a:rPr lang="en-US" sz="1050" dirty="0">
-                <a:solidFill>
-                  <a:schemeClr val="bg1"/>
-                </a:solidFill>
-              </a:rPr>
-              <a:t>&lt;&lt;interface&gt;&gt;</a:t>
-            </a:r>
-          </a:p>
-          <a:p>
-            <a:pPr algn="ctr"/>
-            <a:r>
-              <a:rPr lang="en-US" sz="1050" dirty="0">
-                <a:solidFill>
-                  <a:schemeClr val="bg1"/>
-                </a:solidFill>
-              </a:rPr>
-              <a:t>Storage</a:t>
-            </a:r>
-            <a:endParaRPr lang="en-SG" sz="1050" dirty="0">
-              <a:solidFill>
-                <a:schemeClr val="bg1"/>
-              </a:solidFill>
-            </a:endParaRPr>
-          </a:p>
-        </p:txBody>
-      </p:sp>
-      <p:sp>
-        <p:nvSpPr>
-          <p:cNvPr id="120" name="Isosceles Triangle 102"/>
-          <p:cNvSpPr/>
-          <p:nvPr/>
-        </p:nvSpPr>
-        <p:spPr>
-          <a:xfrm rot="16200000">
-            <a:off x="1626910" y="2952291"/>
-            <a:ext cx="270504" cy="175523"/>
-          </a:xfrm>
-          <a:prstGeom prst="triangle">
-            <a:avLst/>
-          </a:prstGeom>
-          <a:solidFill>
-            <a:schemeClr val="accent6">
-              <a:lumMod val="75000"/>
-            </a:schemeClr>
-          </a:solidFill>
-          <a:ln w="19050">
-            <a:solidFill>
-              <a:schemeClr val="accent6">
-                <a:lumMod val="75000"/>
-              </a:schemeClr>
-            </a:solidFill>
-          </a:ln>
-          <a:effectLst/>
-        </p:spPr>
-        <p:style>
-          <a:lnRef idx="1">
-            <a:schemeClr val="accent2"/>
-          </a:lnRef>
-          <a:fillRef idx="2">
-            <a:schemeClr val="accent2"/>
-          </a:fillRef>
-          <a:effectRef idx="1">
-            <a:schemeClr val="accent2"/>
-          </a:effectRef>
-          <a:fontRef idx="minor">
-            <a:schemeClr val="dk1"/>
-          </a:fontRef>
-        </p:style>
-        <p:txBody>
-          <a:bodyPr rtlCol="0" anchor="ctr"/>
-          <a:lstStyle/>
-          <a:p>
-            <a:pPr algn="ctr"/>
-            <a:endParaRPr lang="en-SG" sz="1050">
-              <a:solidFill>
-                <a:schemeClr val="bg1"/>
-              </a:solidFill>
-            </a:endParaRPr>
-          </a:p>
-        </p:txBody>
-      </p:sp>
-      <p:cxnSp>
-        <p:nvCxnSpPr>
-          <p:cNvPr id="58" name="Straight Arrow Connector 57"/>
-          <p:cNvCxnSpPr>
-            <a:stCxn id="42" idx="3"/>
-            <a:endCxn id="2" idx="1"/>
-          </p:cNvCxnSpPr>
-          <p:nvPr/>
-        </p:nvCxnSpPr>
-        <p:spPr>
-          <a:xfrm>
-            <a:off x="2656370" y="3326536"/>
-            <a:ext cx="220810" cy="5284"/>
-          </a:xfrm>
-          <a:prstGeom prst="straightConnector1">
-            <a:avLst/>
-          </a:prstGeom>
-          <a:ln w="19050">
-            <a:solidFill>
-              <a:schemeClr val="accent6">
-                <a:lumMod val="75000"/>
-              </a:schemeClr>
-            </a:solidFill>
-            <a:headEnd type="none" w="med" len="med"/>
-            <a:tailEnd type="arrow" w="med" len="med"/>
-          </a:ln>
-          <a:effectLst/>
-        </p:spPr>
-        <p:style>
-          <a:lnRef idx="1">
-            <a:schemeClr val="accent2"/>
-          </a:lnRef>
-          <a:fillRef idx="2">
-            <a:schemeClr val="accent2"/>
-          </a:fillRef>
-          <a:effectRef idx="1">
-            <a:schemeClr val="accent2"/>
-          </a:effectRef>
-          <a:fontRef idx="minor">
-            <a:schemeClr val="dk1"/>
-          </a:fontRef>
-        </p:style>
-      </p:cxnSp>
-      <p:cxnSp>
-        <p:nvCxnSpPr>
-          <p:cNvPr id="75" name="Elbow Connector 122"/>
-          <p:cNvCxnSpPr/>
-          <p:nvPr/>
-        </p:nvCxnSpPr>
-        <p:spPr>
-          <a:xfrm>
-            <a:off x="910091" y="3040053"/>
-            <a:ext cx="419548" cy="2860"/>
-          </a:xfrm>
-          <a:prstGeom prst="bentConnector3">
-            <a:avLst>
-              <a:gd name="adj1" fmla="val 50000"/>
-            </a:avLst>
-          </a:prstGeom>
-          <a:ln w="19050">
-            <a:solidFill>
-              <a:schemeClr val="bg1">
-                <a:lumMod val="75000"/>
-              </a:schemeClr>
-            </a:solidFill>
-            <a:prstDash val="sysDot"/>
-            <a:headEnd type="none" w="med" len="med"/>
-            <a:tailEnd type="arrow" w="med" len="med"/>
-          </a:ln>
-          <a:effectLst/>
-        </p:spPr>
-        <p:style>
-          <a:lnRef idx="1">
-            <a:schemeClr val="accent2"/>
-          </a:lnRef>
-          <a:fillRef idx="2">
-            <a:schemeClr val="accent2"/>
-          </a:fillRef>
-          <a:effectRef idx="1">
-            <a:schemeClr val="accent2"/>
-          </a:effectRef>
-          <a:fontRef idx="minor">
-            <a:schemeClr val="dk1"/>
-          </a:fontRef>
-        </p:style>
-      </p:cxnSp>
-      <p:cxnSp>
-        <p:nvCxnSpPr>
-          <p:cNvPr id="21" name="Straight Connector 20"/>
-          <p:cNvCxnSpPr>
-            <a:stCxn id="120" idx="3"/>
-          </p:cNvCxnSpPr>
-          <p:nvPr/>
-        </p:nvCxnSpPr>
-        <p:spPr>
-          <a:xfrm flipV="1">
-            <a:off x="1849924" y="3040052"/>
-            <a:ext cx="216105" cy="1"/>
-          </a:xfrm>
-          <a:prstGeom prst="line">
-            <a:avLst/>
-          </a:prstGeom>
-          <a:ln w="19050">
-            <a:solidFill>
-              <a:schemeClr val="accent6">
-                <a:lumMod val="75000"/>
-              </a:schemeClr>
-            </a:solidFill>
-            <a:prstDash val="sysDot"/>
-            <a:headEnd type="none" w="med" len="med"/>
-            <a:tailEnd type="none" w="med" len="med"/>
-          </a:ln>
-          <a:effectLst/>
-        </p:spPr>
-        <p:style>
-          <a:lnRef idx="1">
-            <a:schemeClr val="accent2"/>
-          </a:lnRef>
-          <a:fillRef idx="2">
-            <a:schemeClr val="accent2"/>
-          </a:fillRef>
-          <a:effectRef idx="1">
-            <a:schemeClr val="accent2"/>
-          </a:effectRef>
-          <a:fontRef idx="minor">
-            <a:schemeClr val="dk1"/>
-          </a:fontRef>
-        </p:style>
-      </p:cxnSp>
-      <p:sp>
-        <p:nvSpPr>
-          <p:cNvPr id="42" name="Flowchart: Decision 96"/>
-          <p:cNvSpPr/>
-          <p:nvPr/>
-        </p:nvSpPr>
-        <p:spPr>
-          <a:xfrm>
-            <a:off x="2420322" y="3239846"/>
-            <a:ext cx="236048" cy="173380"/>
-          </a:xfrm>
-          <a:prstGeom prst="flowChartDecision">
-            <a:avLst/>
-          </a:prstGeom>
-          <a:noFill/>
-          <a:ln w="19050">
-            <a:solidFill>
-              <a:schemeClr val="accent6">
-                <a:lumMod val="75000"/>
-              </a:schemeClr>
-            </a:solidFill>
-          </a:ln>
-          <a:effectLst/>
-        </p:spPr>
-        <p:style>
-          <a:lnRef idx="1">
-            <a:schemeClr val="accent2"/>
-          </a:lnRef>
-          <a:fillRef idx="2">
-            <a:schemeClr val="accent2"/>
-          </a:fillRef>
-          <a:effectRef idx="1">
-            <a:schemeClr val="accent2"/>
-          </a:effectRef>
-          <a:fontRef idx="minor">
-            <a:schemeClr val="dk1"/>
-          </a:fontRef>
-        </p:style>
-        <p:txBody>
-          <a:bodyPr rtlCol="0" anchor="ctr"/>
-          <a:lstStyle/>
-          <a:p>
-            <a:pPr algn="ctr"/>
-            <a:endParaRPr lang="en-US" sz="1050">
-              <a:solidFill>
-                <a:schemeClr val="bg1"/>
-              </a:solidFill>
-            </a:endParaRPr>
-          </a:p>
-        </p:txBody>
-      </p:sp>
-      <p:cxnSp>
-        <p:nvCxnSpPr>
-          <p:cNvPr id="97" name="Elbow Connector 63"/>
-          <p:cNvCxnSpPr>
-            <a:stCxn id="99" idx="3"/>
-            <a:endCxn id="50" idx="1"/>
-          </p:cNvCxnSpPr>
-          <p:nvPr/>
-        </p:nvCxnSpPr>
-        <p:spPr>
-          <a:xfrm flipV="1">
-            <a:off x="4398041" y="3331820"/>
-            <a:ext cx="223324" cy="1"/>
-          </a:xfrm>
-          <a:prstGeom prst="bentConnector3">
-            <a:avLst>
-              <a:gd name="adj1" fmla="val 50000"/>
-            </a:avLst>
-          </a:prstGeom>
-          <a:ln w="19050">
-            <a:solidFill>
-              <a:schemeClr val="accent6">
-                <a:lumMod val="75000"/>
-              </a:schemeClr>
-            </a:solidFill>
-            <a:prstDash val="sysDot"/>
-            <a:headEnd type="none" w="med" len="med"/>
-            <a:tailEnd type="none" w="med" len="med"/>
-          </a:ln>
-          <a:effectLst/>
-        </p:spPr>
-        <p:style>
-          <a:lnRef idx="1">
-            <a:schemeClr val="accent2"/>
-          </a:lnRef>
-          <a:fillRef idx="2">
-            <a:schemeClr val="accent2"/>
-          </a:fillRef>
-          <a:effectRef idx="1">
-            <a:schemeClr val="accent2"/>
-          </a:effectRef>
-          <a:fontRef idx="minor">
-            <a:schemeClr val="dk1"/>
-          </a:fontRef>
-        </p:style>
-      </p:cxnSp>
-      <p:sp>
-        <p:nvSpPr>
-          <p:cNvPr id="99" name="Isosceles Triangle 102"/>
-          <p:cNvSpPr/>
-          <p:nvPr/>
-        </p:nvSpPr>
-        <p:spPr>
-          <a:xfrm rot="5400000" flipV="1">
-            <a:off x="4175027" y="3244059"/>
-            <a:ext cx="270504" cy="175523"/>
-          </a:xfrm>
-          <a:prstGeom prst="triangle">
-            <a:avLst/>
-          </a:prstGeom>
-          <a:solidFill>
-            <a:schemeClr val="accent6">
-              <a:lumMod val="75000"/>
-            </a:schemeClr>
-          </a:solidFill>
-          <a:ln w="19050">
-            <a:solidFill>
-              <a:schemeClr val="accent6">
-                <a:lumMod val="75000"/>
-              </a:schemeClr>
-            </a:solidFill>
-          </a:ln>
-          <a:effectLst/>
-        </p:spPr>
-        <p:style>
-          <a:lnRef idx="1">
-            <a:schemeClr val="accent2"/>
-          </a:lnRef>
-          <a:fillRef idx="2">
-            <a:schemeClr val="accent2"/>
-          </a:fillRef>
-          <a:effectRef idx="1">
-            <a:schemeClr val="accent2"/>
-          </a:effectRef>
-          <a:fontRef idx="minor">
-            <a:schemeClr val="dk1"/>
-          </a:fontRef>
-        </p:style>
-        <p:txBody>
-          <a:bodyPr rtlCol="0" anchor="ctr"/>
-          <a:lstStyle/>
-          <a:p>
-            <a:pPr algn="ctr"/>
-            <a:endParaRPr lang="en-SG" sz="1050">
-              <a:solidFill>
-                <a:schemeClr val="bg1"/>
-              </a:solidFill>
-            </a:endParaRPr>
-          </a:p>
-        </p:txBody>
-      </p:sp>
-      <p:cxnSp>
-        <p:nvCxnSpPr>
-          <p:cNvPr id="124" name="Elbow Connector 122"/>
-          <p:cNvCxnSpPr>
-            <a:stCxn id="50" idx="3"/>
-            <a:endCxn id="66" idx="1"/>
-          </p:cNvCxnSpPr>
-          <p:nvPr/>
-        </p:nvCxnSpPr>
-        <p:spPr>
-          <a:xfrm>
-            <a:off x="5791200" y="3331820"/>
-            <a:ext cx="228600" cy="1970"/>
-          </a:xfrm>
-          <a:prstGeom prst="bentConnector3">
-            <a:avLst>
-              <a:gd name="adj1" fmla="val 50000"/>
-            </a:avLst>
-          </a:prstGeom>
-          <a:ln w="19050">
-            <a:solidFill>
-              <a:schemeClr val="accent6">
-                <a:lumMod val="75000"/>
-              </a:schemeClr>
-            </a:solidFill>
-            <a:prstDash val="sysDot"/>
-            <a:headEnd type="none" w="med" len="med"/>
-            <a:tailEnd type="arrow" w="med" len="med"/>
-          </a:ln>
-          <a:effectLst/>
-        </p:spPr>
-        <p:style>
-          <a:lnRef idx="1">
-            <a:schemeClr val="accent2"/>
-          </a:lnRef>
-          <a:fillRef idx="2">
-            <a:schemeClr val="accent2"/>
-          </a:fillRef>
-          <a:effectRef idx="1">
-            <a:schemeClr val="accent2"/>
-          </a:effectRef>
-          <a:fontRef idx="minor">
-            <a:schemeClr val="dk1"/>
-          </a:fontRef>
-        </p:style>
-      </p:cxnSp>
-      <p:sp>
-        <p:nvSpPr>
-          <p:cNvPr id="50" name="Rectangle 8"/>
-          <p:cNvSpPr/>
-          <p:nvPr/>
-        </p:nvSpPr>
-        <p:spPr>
-          <a:xfrm>
-            <a:off x="4621365" y="3158440"/>
-            <a:ext cx="1169835" cy="346760"/>
-          </a:xfrm>
-          <a:prstGeom prst="rect">
-            <a:avLst/>
-          </a:prstGeom>
-          <a:ln w="19050"/>
-          <a:effectLst/>
-        </p:spPr>
-        <p:style>
-          <a:lnRef idx="1">
-            <a:schemeClr val="accent6"/>
-          </a:lnRef>
-          <a:fillRef idx="2">
-            <a:schemeClr val="accent6"/>
-          </a:fillRef>
-          <a:effectRef idx="1">
-            <a:schemeClr val="accent6"/>
-          </a:effectRef>
-          <a:fontRef idx="minor">
-            <a:schemeClr val="dk1"/>
-          </a:fontRef>
-        </p:style>
-        <p:txBody>
-          <a:bodyPr rtlCol="0" anchor="ctr"/>
-          <a:lstStyle/>
-          <a:p>
-            <a:pPr algn="ctr"/>
-            <a:r>
-              <a:rPr lang="en-US" sz="1050" b="1" dirty="0" err="1">
-                <a:solidFill>
-                  <a:schemeClr val="accent6">
-                    <a:lumMod val="75000"/>
-                  </a:schemeClr>
-                </a:solidFill>
-              </a:rPr>
-              <a:t>XmlAddressBook</a:t>
-            </a:r>
-            <a:r>
-              <a:rPr lang="en-US" sz="1050" b="1" dirty="0">
-                <a:solidFill>
-                  <a:schemeClr val="accent6">
-                    <a:lumMod val="75000"/>
-                  </a:schemeClr>
-                </a:solidFill>
-              </a:rPr>
-              <a:t/>
-            </a:r>
-            <a:br>
-              <a:rPr lang="en-US" sz="1050" b="1" dirty="0">
-                <a:solidFill>
-                  <a:schemeClr val="accent6">
-                    <a:lumMod val="75000"/>
-                  </a:schemeClr>
-                </a:solidFill>
-              </a:rPr>
-            </a:br>
-            <a:r>
-              <a:rPr lang="en-US" sz="1050" b="1" dirty="0">
-                <a:solidFill>
-                  <a:schemeClr val="accent6">
-                    <a:lumMod val="75000"/>
-                  </a:schemeClr>
-                </a:solidFill>
-              </a:rPr>
-              <a:t>Storage</a:t>
-            </a:r>
-            <a:endParaRPr lang="en-SG" sz="1050" b="1" dirty="0">
-              <a:solidFill>
-                <a:schemeClr val="accent6">
-                  <a:lumMod val="75000"/>
-                </a:schemeClr>
-              </a:solidFill>
-            </a:endParaRPr>
-          </a:p>
-        </p:txBody>
-      </p:sp>
-      <p:sp>
-        <p:nvSpPr>
-          <p:cNvPr id="52" name="Rectangle 8"/>
-          <p:cNvSpPr/>
-          <p:nvPr/>
-        </p:nvSpPr>
-        <p:spPr>
-          <a:xfrm>
-            <a:off x="2873943" y="2558040"/>
-            <a:ext cx="1323049" cy="346760"/>
-          </a:xfrm>
-          <a:prstGeom prst="rect">
-            <a:avLst/>
-          </a:prstGeom>
-          <a:solidFill>
-            <a:schemeClr val="accent6">
-              <a:lumMod val="75000"/>
-            </a:schemeClr>
-          </a:solidFill>
-          <a:ln w="19050">
-            <a:solidFill>
-              <a:schemeClr val="accent6">
-                <a:lumMod val="75000"/>
-              </a:schemeClr>
-            </a:solidFill>
-          </a:ln>
-          <a:effectLst/>
-        </p:spPr>
-        <p:style>
-          <a:lnRef idx="1">
-            <a:schemeClr val="accent2"/>
-          </a:lnRef>
-          <a:fillRef idx="2">
-            <a:schemeClr val="accent2"/>
-          </a:fillRef>
-          <a:effectRef idx="1">
-            <a:schemeClr val="accent2"/>
-          </a:effectRef>
-          <a:fontRef idx="minor">
-            <a:schemeClr val="dk1"/>
-          </a:fontRef>
-        </p:style>
-        <p:txBody>
-          <a:bodyPr rtlCol="0" anchor="ctr"/>
-          <a:lstStyle/>
-          <a:p>
-            <a:pPr algn="ctr"/>
-            <a:r>
-              <a:rPr lang="en-US" sz="1050" dirty="0">
-                <a:solidFill>
-                  <a:schemeClr val="bg1"/>
-                </a:solidFill>
-              </a:rPr>
-              <a:t>&lt;&lt;interface&gt;&gt;</a:t>
-            </a:r>
-            <a:br>
-              <a:rPr lang="en-US" sz="1050" dirty="0">
-                <a:solidFill>
-                  <a:schemeClr val="bg1"/>
-                </a:solidFill>
-              </a:rPr>
-            </a:br>
-            <a:r>
-              <a:rPr lang="en-US" sz="1050" dirty="0" err="1">
-                <a:solidFill>
-                  <a:schemeClr val="bg1"/>
-                </a:solidFill>
-              </a:rPr>
-              <a:t>UserPrefsStorage</a:t>
-            </a:r>
-            <a:endParaRPr lang="en-SG" sz="1050" dirty="0">
-              <a:solidFill>
-                <a:schemeClr val="bg1"/>
-              </a:solidFill>
-            </a:endParaRPr>
-          </a:p>
-        </p:txBody>
-      </p:sp>
-      <p:cxnSp>
-        <p:nvCxnSpPr>
-          <p:cNvPr id="54" name="Straight Arrow Connector 53"/>
-          <p:cNvCxnSpPr>
-            <a:stCxn id="56" idx="3"/>
-            <a:endCxn id="52" idx="1"/>
-          </p:cNvCxnSpPr>
-          <p:nvPr/>
-        </p:nvCxnSpPr>
-        <p:spPr>
-          <a:xfrm>
-            <a:off x="2653133" y="2726136"/>
-            <a:ext cx="220810" cy="5284"/>
-          </a:xfrm>
-          <a:prstGeom prst="straightConnector1">
-            <a:avLst/>
-          </a:prstGeom>
-          <a:ln w="19050">
-            <a:solidFill>
-              <a:schemeClr val="accent6">
-                <a:lumMod val="75000"/>
-              </a:schemeClr>
-            </a:solidFill>
-            <a:headEnd type="none" w="med" len="med"/>
-            <a:tailEnd type="arrow" w="med" len="med"/>
-          </a:ln>
-          <a:effectLst/>
-        </p:spPr>
-        <p:style>
-          <a:lnRef idx="1">
-            <a:schemeClr val="accent2"/>
-          </a:lnRef>
-          <a:fillRef idx="2">
-            <a:schemeClr val="accent2"/>
-          </a:fillRef>
-          <a:effectRef idx="1">
-            <a:schemeClr val="accent2"/>
-          </a:effectRef>
-          <a:fontRef idx="minor">
-            <a:schemeClr val="dk1"/>
-          </a:fontRef>
-        </p:style>
-      </p:cxnSp>
-      <p:sp>
-        <p:nvSpPr>
-          <p:cNvPr id="56" name="Flowchart: Decision 96"/>
-          <p:cNvSpPr/>
-          <p:nvPr/>
-        </p:nvSpPr>
-        <p:spPr>
-          <a:xfrm>
-            <a:off x="2417085" y="2639446"/>
-            <a:ext cx="236048" cy="173380"/>
-          </a:xfrm>
-          <a:prstGeom prst="flowChartDecision">
-            <a:avLst/>
-          </a:prstGeom>
-          <a:noFill/>
-          <a:ln w="19050">
-            <a:solidFill>
-              <a:schemeClr val="accent6">
-                <a:lumMod val="75000"/>
-              </a:schemeClr>
-            </a:solidFill>
-          </a:ln>
-          <a:effectLst/>
-        </p:spPr>
-        <p:style>
-          <a:lnRef idx="1">
-            <a:schemeClr val="accent2"/>
-          </a:lnRef>
-          <a:fillRef idx="2">
-            <a:schemeClr val="accent2"/>
-          </a:fillRef>
-          <a:effectRef idx="1">
-            <a:schemeClr val="accent2"/>
-          </a:effectRef>
-          <a:fontRef idx="minor">
-            <a:schemeClr val="dk1"/>
-          </a:fontRef>
-        </p:style>
-        <p:txBody>
-          <a:bodyPr rtlCol="0" anchor="ctr"/>
-          <a:lstStyle/>
-          <a:p>
-            <a:pPr algn="ctr"/>
-            <a:endParaRPr lang="en-US" sz="1050">
-              <a:solidFill>
-                <a:schemeClr val="bg1"/>
-              </a:solidFill>
-            </a:endParaRPr>
-          </a:p>
-        </p:txBody>
-      </p:sp>
-      <p:cxnSp>
-        <p:nvCxnSpPr>
-          <p:cNvPr id="60" name="Elbow Connector 63"/>
-          <p:cNvCxnSpPr>
-            <a:stCxn id="61" idx="3"/>
-            <a:endCxn id="65" idx="1"/>
-          </p:cNvCxnSpPr>
-          <p:nvPr/>
-        </p:nvCxnSpPr>
-        <p:spPr>
-          <a:xfrm flipV="1">
-            <a:off x="4394804" y="2731420"/>
-            <a:ext cx="223324" cy="1"/>
-          </a:xfrm>
-          <a:prstGeom prst="bentConnector3">
-            <a:avLst>
-              <a:gd name="adj1" fmla="val 50000"/>
-            </a:avLst>
-          </a:prstGeom>
-          <a:ln w="19050">
-            <a:solidFill>
-              <a:schemeClr val="accent6">
-                <a:lumMod val="75000"/>
-              </a:schemeClr>
-            </a:solidFill>
-            <a:prstDash val="sysDot"/>
-            <a:headEnd type="none" w="med" len="med"/>
-            <a:tailEnd type="none" w="med" len="med"/>
-          </a:ln>
-          <a:effectLst/>
-        </p:spPr>
-        <p:style>
-          <a:lnRef idx="1">
-            <a:schemeClr val="accent2"/>
-          </a:lnRef>
-          <a:fillRef idx="2">
-            <a:schemeClr val="accent2"/>
-          </a:fillRef>
-          <a:effectRef idx="1">
-            <a:schemeClr val="accent2"/>
-          </a:effectRef>
-          <a:fontRef idx="minor">
-            <a:schemeClr val="dk1"/>
-          </a:fontRef>
-        </p:style>
-      </p:cxnSp>
-      <p:sp>
-        <p:nvSpPr>
-          <p:cNvPr id="61" name="Isosceles Triangle 102"/>
-          <p:cNvSpPr/>
-          <p:nvPr/>
-        </p:nvSpPr>
-        <p:spPr>
-          <a:xfrm rot="5400000" flipV="1">
-            <a:off x="4171790" y="2643659"/>
-            <a:ext cx="270504" cy="175523"/>
-          </a:xfrm>
-          <a:prstGeom prst="triangle">
-            <a:avLst/>
-          </a:prstGeom>
-          <a:solidFill>
-            <a:schemeClr val="accent6">
-              <a:lumMod val="75000"/>
-            </a:schemeClr>
-          </a:solidFill>
-          <a:ln w="19050">
-            <a:solidFill>
-              <a:schemeClr val="accent6">
-                <a:lumMod val="75000"/>
-              </a:schemeClr>
-            </a:solidFill>
-          </a:ln>
-          <a:effectLst/>
-        </p:spPr>
-        <p:style>
-          <a:lnRef idx="1">
-            <a:schemeClr val="accent2"/>
-          </a:lnRef>
-          <a:fillRef idx="2">
-            <a:schemeClr val="accent2"/>
-          </a:fillRef>
-          <a:effectRef idx="1">
-            <a:schemeClr val="accent2"/>
-          </a:effectRef>
-          <a:fontRef idx="minor">
-            <a:schemeClr val="dk1"/>
-          </a:fontRef>
-        </p:style>
-        <p:txBody>
-          <a:bodyPr rtlCol="0" anchor="ctr"/>
-          <a:lstStyle/>
-          <a:p>
-            <a:pPr algn="ctr"/>
-            <a:endParaRPr lang="en-SG" sz="1050">
-              <a:solidFill>
-                <a:schemeClr val="bg1"/>
-              </a:solidFill>
-            </a:endParaRPr>
-          </a:p>
-        </p:txBody>
-      </p:sp>
-      <p:sp>
-        <p:nvSpPr>
-          <p:cNvPr id="65" name="Rectangle 8"/>
-          <p:cNvSpPr/>
-          <p:nvPr/>
-        </p:nvSpPr>
-        <p:spPr>
-          <a:xfrm>
-            <a:off x="4618128" y="2558040"/>
-            <a:ext cx="1093635" cy="346760"/>
-          </a:xfrm>
-          <a:prstGeom prst="rect">
-            <a:avLst/>
-          </a:prstGeom>
-          <a:solidFill>
-            <a:schemeClr val="accent6">
-              <a:lumMod val="75000"/>
-            </a:schemeClr>
-          </a:solidFill>
-          <a:ln w="19050">
-            <a:solidFill>
-              <a:schemeClr val="accent6">
-                <a:lumMod val="75000"/>
-              </a:schemeClr>
-            </a:solidFill>
-          </a:ln>
-          <a:effectLst/>
-        </p:spPr>
-        <p:style>
-          <a:lnRef idx="1">
-            <a:schemeClr val="accent2"/>
-          </a:lnRef>
-          <a:fillRef idx="2">
-            <a:schemeClr val="accent2"/>
-          </a:fillRef>
-          <a:effectRef idx="1">
-            <a:schemeClr val="accent2"/>
-          </a:effectRef>
-          <a:fontRef idx="minor">
-            <a:schemeClr val="dk1"/>
-          </a:fontRef>
-        </p:style>
-        <p:txBody>
-          <a:bodyPr rtlCol="0" anchor="ctr"/>
-          <a:lstStyle/>
-          <a:p>
-            <a:pPr algn="ctr"/>
-            <a:r>
-              <a:rPr lang="en-US" sz="1050" dirty="0" err="1">
-                <a:solidFill>
-                  <a:schemeClr val="bg1"/>
-                </a:solidFill>
-              </a:rPr>
-              <a:t>JsonUserPrefs</a:t>
-            </a:r>
-            <a:r>
-              <a:rPr lang="en-US" sz="1050" dirty="0">
-                <a:solidFill>
-                  <a:schemeClr val="bg1"/>
-                </a:solidFill>
-              </a:rPr>
-              <a:t/>
-            </a:r>
-            <a:br>
-              <a:rPr lang="en-US" sz="1050" dirty="0">
-                <a:solidFill>
-                  <a:schemeClr val="bg1"/>
-                </a:solidFill>
-              </a:rPr>
-            </a:br>
-            <a:r>
-              <a:rPr lang="en-US" sz="1050" dirty="0">
-                <a:solidFill>
-                  <a:schemeClr val="bg1"/>
-                </a:solidFill>
-              </a:rPr>
-              <a:t>Storage</a:t>
-            </a:r>
-            <a:endParaRPr lang="en-SG" sz="1050" dirty="0">
-              <a:solidFill>
-                <a:schemeClr val="bg1"/>
-              </a:solidFill>
-            </a:endParaRPr>
-          </a:p>
-        </p:txBody>
-      </p:sp>
-      <p:sp>
-        <p:nvSpPr>
-          <p:cNvPr id="66" name="Rectangle 8"/>
-          <p:cNvSpPr/>
-          <p:nvPr/>
-        </p:nvSpPr>
-        <p:spPr>
-          <a:xfrm>
-            <a:off x="6019800" y="3160410"/>
-            <a:ext cx="1200707" cy="346760"/>
-          </a:xfrm>
-          <a:prstGeom prst="rect">
-            <a:avLst/>
-          </a:prstGeom>
-          <a:ln w="19050"/>
-          <a:effectLst/>
-        </p:spPr>
-        <p:style>
-          <a:lnRef idx="1">
-            <a:schemeClr val="accent6"/>
-          </a:lnRef>
-          <a:fillRef idx="2">
-            <a:schemeClr val="accent6"/>
-          </a:fillRef>
-          <a:effectRef idx="1">
-            <a:schemeClr val="accent6"/>
-          </a:effectRef>
-          <a:fontRef idx="minor">
-            <a:schemeClr val="dk1"/>
-          </a:fontRef>
-        </p:style>
-        <p:txBody>
-          <a:bodyPr rtlCol="0" anchor="ctr"/>
-          <a:lstStyle/>
-          <a:p>
-            <a:pPr algn="ctr"/>
-            <a:r>
-              <a:rPr lang="en-US" sz="1050" b="1" dirty="0" err="1">
-                <a:solidFill>
-                  <a:schemeClr val="accent6">
-                    <a:lumMod val="75000"/>
-                  </a:schemeClr>
-                </a:solidFill>
-              </a:rPr>
-              <a:t>XmlSerializable</a:t>
-            </a:r>
-            <a:r>
-              <a:rPr lang="en-US" sz="1050" b="1" dirty="0">
-                <a:solidFill>
-                  <a:schemeClr val="accent6">
-                    <a:lumMod val="75000"/>
-                  </a:schemeClr>
-                </a:solidFill>
-              </a:rPr>
-              <a:t/>
-            </a:r>
-            <a:br>
-              <a:rPr lang="en-US" sz="1050" b="1" dirty="0">
-                <a:solidFill>
-                  <a:schemeClr val="accent6">
-                    <a:lumMod val="75000"/>
-                  </a:schemeClr>
-                </a:solidFill>
-              </a:rPr>
-            </a:br>
-            <a:r>
-              <a:rPr lang="en-US" sz="1050" b="1" dirty="0" err="1">
-                <a:solidFill>
-                  <a:schemeClr val="accent6">
-                    <a:lumMod val="75000"/>
-                  </a:schemeClr>
-                </a:solidFill>
-              </a:rPr>
-              <a:t>AddressBook</a:t>
-            </a:r>
-            <a:endParaRPr lang="en-SG" sz="1050" b="1" dirty="0">
-              <a:solidFill>
-                <a:schemeClr val="accent6">
-                  <a:lumMod val="75000"/>
-                </a:schemeClr>
-              </a:solidFill>
-            </a:endParaRPr>
-          </a:p>
-        </p:txBody>
-      </p:sp>
-      <p:cxnSp>
-        <p:nvCxnSpPr>
-          <p:cNvPr id="70" name="Elbow Connector 122"/>
-          <p:cNvCxnSpPr>
-            <a:stCxn id="74" idx="0"/>
-            <a:endCxn id="73" idx="2"/>
-          </p:cNvCxnSpPr>
-          <p:nvPr/>
-        </p:nvCxnSpPr>
-        <p:spPr>
-          <a:xfrm rot="5400000" flipH="1" flipV="1">
-            <a:off x="8077993" y="2992020"/>
-            <a:ext cx="335208" cy="12700"/>
-          </a:xfrm>
-          <a:prstGeom prst="bentConnector3">
-            <a:avLst>
-              <a:gd name="adj1" fmla="val 50000"/>
-            </a:avLst>
-          </a:prstGeom>
-          <a:ln w="19050">
-            <a:prstDash val="sysDot"/>
-            <a:headEnd type="none" w="med" len="med"/>
-            <a:tailEnd type="arrow" w="med" len="med"/>
-          </a:ln>
-          <a:effectLst/>
-        </p:spPr>
-        <p:style>
-          <a:lnRef idx="1">
-            <a:schemeClr val="accent6"/>
-          </a:lnRef>
-          <a:fillRef idx="2">
-            <a:schemeClr val="accent6"/>
-          </a:fillRef>
-          <a:effectRef idx="1">
-            <a:schemeClr val="accent6"/>
-          </a:effectRef>
-          <a:fontRef idx="minor">
-            <a:schemeClr val="dk1"/>
-          </a:fontRef>
-        </p:style>
-      </p:cxnSp>
-      <p:sp>
-        <p:nvSpPr>
-          <p:cNvPr id="73" name="Rectangle 8"/>
-          <p:cNvSpPr/>
-          <p:nvPr/>
-        </p:nvSpPr>
-        <p:spPr>
-          <a:xfrm>
-            <a:off x="7615738" y="2477656"/>
-            <a:ext cx="1259718" cy="346760"/>
-          </a:xfrm>
-          <a:prstGeom prst="rect">
-            <a:avLst/>
-          </a:prstGeom>
-          <a:ln w="19050"/>
-          <a:effectLst/>
-        </p:spPr>
-        <p:style>
-          <a:lnRef idx="1">
-            <a:schemeClr val="accent6"/>
-          </a:lnRef>
-          <a:fillRef idx="2">
-            <a:schemeClr val="accent6"/>
-          </a:fillRef>
-          <a:effectRef idx="1">
-            <a:schemeClr val="accent6"/>
-          </a:effectRef>
-          <a:fontRef idx="minor">
-            <a:schemeClr val="dk1"/>
-          </a:fontRef>
-        </p:style>
-        <p:txBody>
-          <a:bodyPr rtlCol="0" anchor="ctr"/>
-          <a:lstStyle/>
-          <a:p>
-            <a:pPr algn="ctr"/>
-            <a:r>
-              <a:rPr lang="en-US" sz="1050" b="1" dirty="0" err="1">
-                <a:solidFill>
-                  <a:schemeClr val="accent6">
-                    <a:lumMod val="75000"/>
-                  </a:schemeClr>
-                </a:solidFill>
-              </a:rPr>
-              <a:t>XmlAdaptedTag</a:t>
-            </a:r>
-            <a:endParaRPr lang="en-SG" sz="1050" b="1" dirty="0">
-              <a:solidFill>
-                <a:schemeClr val="accent6">
-                  <a:lumMod val="75000"/>
-                </a:schemeClr>
-              </a:solidFill>
-            </a:endParaRPr>
-          </a:p>
-        </p:txBody>
-      </p:sp>
-      <p:sp>
-        <p:nvSpPr>
-          <p:cNvPr id="74" name="Rectangle 8"/>
-          <p:cNvSpPr/>
-          <p:nvPr/>
-        </p:nvSpPr>
-        <p:spPr>
-          <a:xfrm>
-            <a:off x="7615738" y="3159624"/>
-            <a:ext cx="1259718" cy="346760"/>
-          </a:xfrm>
-          <a:prstGeom prst="rect">
-            <a:avLst/>
-          </a:prstGeom>
-          <a:ln w="19050"/>
-          <a:effectLst/>
-        </p:spPr>
-        <p:style>
-          <a:lnRef idx="1">
-            <a:schemeClr val="accent6"/>
-          </a:lnRef>
-          <a:fillRef idx="2">
-            <a:schemeClr val="accent6"/>
-          </a:fillRef>
-          <a:effectRef idx="1">
-            <a:schemeClr val="accent6"/>
-          </a:effectRef>
-          <a:fontRef idx="minor">
-            <a:schemeClr val="dk1"/>
-          </a:fontRef>
-        </p:style>
-        <p:txBody>
-          <a:bodyPr rtlCol="0" anchor="ctr"/>
-          <a:lstStyle/>
-          <a:p>
-            <a:pPr algn="ctr"/>
-            <a:r>
-              <a:rPr lang="en-US" sz="1050" b="1" dirty="0" err="1">
-                <a:solidFill>
-                  <a:schemeClr val="accent6">
-                    <a:lumMod val="75000"/>
-                  </a:schemeClr>
-                </a:solidFill>
-              </a:rPr>
-              <a:t>XmlAdaptedPerson</a:t>
-            </a:r>
-            <a:endParaRPr lang="en-SG" sz="1050" b="1" dirty="0">
-              <a:solidFill>
-                <a:schemeClr val="accent6">
-                  <a:lumMod val="75000"/>
-                </a:schemeClr>
-              </a:solidFill>
-            </a:endParaRPr>
-          </a:p>
-        </p:txBody>
-      </p:sp>
-      <p:cxnSp>
-        <p:nvCxnSpPr>
-          <p:cNvPr id="77" name="Elbow Connector 122"/>
-          <p:cNvCxnSpPr>
-            <a:stCxn id="66" idx="3"/>
-            <a:endCxn id="74" idx="1"/>
-          </p:cNvCxnSpPr>
-          <p:nvPr/>
-        </p:nvCxnSpPr>
-        <p:spPr>
-          <a:xfrm flipV="1">
-            <a:off x="7220507" y="3333004"/>
-            <a:ext cx="395231" cy="786"/>
-          </a:xfrm>
-          <a:prstGeom prst="bentConnector3">
-            <a:avLst>
-              <a:gd name="adj1" fmla="val 50000"/>
-            </a:avLst>
-          </a:prstGeom>
-          <a:ln w="19050">
-            <a:prstDash val="sysDot"/>
-            <a:headEnd type="none" w="med" len="med"/>
-            <a:tailEnd type="arrow" w="med" len="med"/>
-          </a:ln>
-          <a:effectLst/>
-        </p:spPr>
-        <p:style>
-          <a:lnRef idx="1">
-            <a:schemeClr val="accent6"/>
-          </a:lnRef>
-          <a:fillRef idx="2">
-            <a:schemeClr val="accent6"/>
-          </a:fillRef>
-          <a:effectRef idx="1">
-            <a:schemeClr val="accent6"/>
-          </a:effectRef>
-          <a:fontRef idx="minor">
-            <a:schemeClr val="dk1"/>
-          </a:fontRef>
-        </p:style>
-      </p:cxnSp>
-    </p:spTree>
-    <p:extLst>
-      <p:ext uri="{BB962C8B-B14F-4D97-AF65-F5344CB8AC3E}">
-        <p14:creationId xmlns:p14="http://schemas.microsoft.com/office/powerpoint/2010/main" val="1478832369"/>
-      </p:ext>
-    </p:extLst>
-  </p:cSld>
-  <p:clrMapOvr>
-    <a:masterClrMapping/>
-  </p:clrMapOvr>
-</p:sld>
-</file>
-
-<file path=ppt/slides/slide7.xml><?xml version="1.0" encoding="utf-8"?>
 <p:sld xmlns:a="http://schemas.openxmlformats.org/drawingml/2006/main" xmlns:r="http://schemas.openxmlformats.org/officeDocument/2006/relationships" xmlns:p="http://schemas.openxmlformats.org/presentationml/2006/main">
   <p:cSld>
     <p:spTree>

</xml_diff>